<commit_message>
KB homepage version 2 completed
</commit_message>
<xml_diff>
--- a/S3-02-Dev/KenBrowser/screenshots/KenBrowser-manual.pptx
+++ b/S3-02-Dev/KenBrowser/screenshots/KenBrowser-manual.pptx
@@ -6,7 +6,7 @@
   </p:sldMasterIdLst>
   <p:sldIdLst>
     <p:sldId id="256" r:id="rId2"/>
-    <p:sldId id="258" r:id="rId3"/>
+    <p:sldId id="261" r:id="rId3"/>
   </p:sldIdLst>
   <p:sldSz cx="12192000" cy="6858000"/>
   <p:notesSz cx="6858000" cy="9144000"/>
@@ -116,6 +116,402 @@
 <file path=ppt/changesInfos/changesInfo1.xml><?xml version="1.0" encoding="utf-8"?>
 <pc:chgInfo xmlns:a="http://schemas.openxmlformats.org/drawingml/2006/main" xmlns:r="http://schemas.openxmlformats.org/officeDocument/2006/relationships" xmlns:ac="http://schemas.microsoft.com/office/drawing/2013/main/command" xmlns:pc="http://schemas.microsoft.com/office/powerpoint/2013/main/command">
   <pc:docChgLst>
+    <pc:chgData name="ken zhao" userId="e96b2dde5c0d9c1f" providerId="LiveId" clId="{4B2407D2-4E5A-469E-8B22-9C965EE789F6}"/>
+    <pc:docChg chg="undo custSel addSld delSld modSld sldOrd">
+      <pc:chgData name="ken zhao" userId="e96b2dde5c0d9c1f" providerId="LiveId" clId="{4B2407D2-4E5A-469E-8B22-9C965EE789F6}" dt="2023-08-15T10:39:25.511" v="785" actId="692"/>
+      <pc:docMkLst>
+        <pc:docMk/>
+      </pc:docMkLst>
+      <pc:sldChg chg="addSp delSp modSp mod setBg">
+        <pc:chgData name="ken zhao" userId="e96b2dde5c0d9c1f" providerId="LiveId" clId="{4B2407D2-4E5A-469E-8B22-9C965EE789F6}" dt="2023-08-15T10:27:15.700" v="507" actId="21"/>
+        <pc:sldMkLst>
+          <pc:docMk/>
+          <pc:sldMk cId="2364028119" sldId="256"/>
+        </pc:sldMkLst>
+        <pc:spChg chg="add mod">
+          <ac:chgData name="ken zhao" userId="e96b2dde5c0d9c1f" providerId="LiveId" clId="{4B2407D2-4E5A-469E-8B22-9C965EE789F6}" dt="2023-08-15T09:46:36.541" v="146" actId="1035"/>
+          <ac:spMkLst>
+            <pc:docMk/>
+            <pc:sldMk cId="2364028119" sldId="256"/>
+            <ac:spMk id="8" creationId="{83D53958-C8F2-FBF2-B6F2-EAEFF3B98BDF}"/>
+          </ac:spMkLst>
+        </pc:spChg>
+        <pc:spChg chg="mod">
+          <ac:chgData name="ken zhao" userId="e96b2dde5c0d9c1f" providerId="LiveId" clId="{4B2407D2-4E5A-469E-8B22-9C965EE789F6}" dt="2023-08-15T10:06:11.542" v="245" actId="1582"/>
+          <ac:spMkLst>
+            <pc:docMk/>
+            <pc:sldMk cId="2364028119" sldId="256"/>
+            <ac:spMk id="10" creationId="{163B30DA-1326-2E28-3DDC-B2C081EC3C97}"/>
+          </ac:spMkLst>
+        </pc:spChg>
+        <pc:spChg chg="mod">
+          <ac:chgData name="ken zhao" userId="e96b2dde5c0d9c1f" providerId="LiveId" clId="{4B2407D2-4E5A-469E-8B22-9C965EE789F6}" dt="2023-08-15T10:06:11.542" v="245" actId="1582"/>
+          <ac:spMkLst>
+            <pc:docMk/>
+            <pc:sldMk cId="2364028119" sldId="256"/>
+            <ac:spMk id="11" creationId="{FD69B0D3-926B-E96C-8504-675697405197}"/>
+          </ac:spMkLst>
+        </pc:spChg>
+        <pc:spChg chg="mod">
+          <ac:chgData name="ken zhao" userId="e96b2dde5c0d9c1f" providerId="LiveId" clId="{4B2407D2-4E5A-469E-8B22-9C965EE789F6}" dt="2023-08-15T10:06:11.542" v="245" actId="1582"/>
+          <ac:spMkLst>
+            <pc:docMk/>
+            <pc:sldMk cId="2364028119" sldId="256"/>
+            <ac:spMk id="12" creationId="{9901362B-A071-ECFA-2B03-079F2801D174}"/>
+          </ac:spMkLst>
+        </pc:spChg>
+        <pc:spChg chg="mod">
+          <ac:chgData name="ken zhao" userId="e96b2dde5c0d9c1f" providerId="LiveId" clId="{4B2407D2-4E5A-469E-8B22-9C965EE789F6}" dt="2023-08-15T10:06:44.722" v="251" actId="14100"/>
+          <ac:spMkLst>
+            <pc:docMk/>
+            <pc:sldMk cId="2364028119" sldId="256"/>
+            <ac:spMk id="13" creationId="{A26CC81F-5250-F148-BEA5-CD76ADBD02BA}"/>
+          </ac:spMkLst>
+        </pc:spChg>
+        <pc:spChg chg="mod">
+          <ac:chgData name="ken zhao" userId="e96b2dde5c0d9c1f" providerId="LiveId" clId="{4B2407D2-4E5A-469E-8B22-9C965EE789F6}" dt="2023-08-15T10:06:11.542" v="245" actId="1582"/>
+          <ac:spMkLst>
+            <pc:docMk/>
+            <pc:sldMk cId="2364028119" sldId="256"/>
+            <ac:spMk id="14" creationId="{8C3452DB-2CA6-DB35-4945-66D83087A8EA}"/>
+          </ac:spMkLst>
+        </pc:spChg>
+        <pc:spChg chg="mod">
+          <ac:chgData name="ken zhao" userId="e96b2dde5c0d9c1f" providerId="LiveId" clId="{4B2407D2-4E5A-469E-8B22-9C965EE789F6}" dt="2023-08-15T10:06:11.542" v="245" actId="1582"/>
+          <ac:spMkLst>
+            <pc:docMk/>
+            <pc:sldMk cId="2364028119" sldId="256"/>
+            <ac:spMk id="15" creationId="{5A14B829-7003-9EB8-B26D-C43BB8F2AA40}"/>
+          </ac:spMkLst>
+        </pc:spChg>
+        <pc:spChg chg="mod">
+          <ac:chgData name="ken zhao" userId="e96b2dde5c0d9c1f" providerId="LiveId" clId="{4B2407D2-4E5A-469E-8B22-9C965EE789F6}" dt="2023-08-15T10:06:11.542" v="245" actId="1582"/>
+          <ac:spMkLst>
+            <pc:docMk/>
+            <pc:sldMk cId="2364028119" sldId="256"/>
+            <ac:spMk id="16" creationId="{7FD4998C-A147-F4A6-B43A-F95D2D53B623}"/>
+          </ac:spMkLst>
+        </pc:spChg>
+        <pc:spChg chg="mod">
+          <ac:chgData name="ken zhao" userId="e96b2dde5c0d9c1f" providerId="LiveId" clId="{4B2407D2-4E5A-469E-8B22-9C965EE789F6}" dt="2023-08-15T10:06:11.542" v="245" actId="1582"/>
+          <ac:spMkLst>
+            <pc:docMk/>
+            <pc:sldMk cId="2364028119" sldId="256"/>
+            <ac:spMk id="17" creationId="{F356445E-3DE2-3C9F-F987-0A715EB68852}"/>
+          </ac:spMkLst>
+        </pc:spChg>
+        <pc:spChg chg="mod">
+          <ac:chgData name="ken zhao" userId="e96b2dde5c0d9c1f" providerId="LiveId" clId="{4B2407D2-4E5A-469E-8B22-9C965EE789F6}" dt="2023-08-15T10:06:11.542" v="245" actId="1582"/>
+          <ac:spMkLst>
+            <pc:docMk/>
+            <pc:sldMk cId="2364028119" sldId="256"/>
+            <ac:spMk id="18" creationId="{92D35762-D227-2919-DFD7-BD95BAFAFAFB}"/>
+          </ac:spMkLst>
+        </pc:spChg>
+        <pc:spChg chg="add mod">
+          <ac:chgData name="ken zhao" userId="e96b2dde5c0d9c1f" providerId="LiveId" clId="{4B2407D2-4E5A-469E-8B22-9C965EE789F6}" dt="2023-08-15T10:23:51.456" v="493" actId="14100"/>
+          <ac:spMkLst>
+            <pc:docMk/>
+            <pc:sldMk cId="2364028119" sldId="256"/>
+            <ac:spMk id="24" creationId="{8FC3E542-1D88-E46A-043C-DB00DC23BD23}"/>
+          </ac:spMkLst>
+        </pc:spChg>
+        <pc:spChg chg="add mod">
+          <ac:chgData name="ken zhao" userId="e96b2dde5c0d9c1f" providerId="LiveId" clId="{4B2407D2-4E5A-469E-8B22-9C965EE789F6}" dt="2023-08-15T10:24:03.101" v="496" actId="14100"/>
+          <ac:spMkLst>
+            <pc:docMk/>
+            <pc:sldMk cId="2364028119" sldId="256"/>
+            <ac:spMk id="25" creationId="{1BD3268C-F57D-2E20-3B71-E34DB8780A1B}"/>
+          </ac:spMkLst>
+        </pc:spChg>
+        <pc:spChg chg="mod">
+          <ac:chgData name="ken zhao" userId="e96b2dde5c0d9c1f" providerId="LiveId" clId="{4B2407D2-4E5A-469E-8B22-9C965EE789F6}" dt="2023-08-15T09:46:36.541" v="146" actId="1035"/>
+          <ac:spMkLst>
+            <pc:docMk/>
+            <pc:sldMk cId="2364028119" sldId="256"/>
+            <ac:spMk id="39" creationId="{ECB87BF8-6EFF-80D5-3D5F-30988FB6F810}"/>
+          </ac:spMkLst>
+        </pc:spChg>
+        <pc:spChg chg="mod">
+          <ac:chgData name="ken zhao" userId="e96b2dde5c0d9c1f" providerId="LiveId" clId="{4B2407D2-4E5A-469E-8B22-9C965EE789F6}" dt="2023-08-15T09:47:18.626" v="148" actId="1076"/>
+          <ac:spMkLst>
+            <pc:docMk/>
+            <pc:sldMk cId="2364028119" sldId="256"/>
+            <ac:spMk id="41" creationId="{338CD1C2-C9D6-79E8-FF1D-2407797D379A}"/>
+          </ac:spMkLst>
+        </pc:spChg>
+        <pc:picChg chg="del">
+          <ac:chgData name="ken zhao" userId="e96b2dde5c0d9c1f" providerId="LiveId" clId="{4B2407D2-4E5A-469E-8B22-9C965EE789F6}" dt="2023-08-15T09:37:28.463" v="4" actId="478"/>
+          <ac:picMkLst>
+            <pc:docMk/>
+            <pc:sldMk cId="2364028119" sldId="256"/>
+            <ac:picMk id="3" creationId="{1DC88DAA-5811-04B3-FEA9-7EE51EA8CE23}"/>
+          </ac:picMkLst>
+        </pc:picChg>
+        <pc:picChg chg="add mod">
+          <ac:chgData name="ken zhao" userId="e96b2dde5c0d9c1f" providerId="LiveId" clId="{4B2407D2-4E5A-469E-8B22-9C965EE789F6}" dt="2023-08-15T09:46:36.541" v="146" actId="1035"/>
+          <ac:picMkLst>
+            <pc:docMk/>
+            <pc:sldMk cId="2364028119" sldId="256"/>
+            <ac:picMk id="4" creationId="{F6DF5B51-23EF-9ED5-B073-C33C2DA3FA2F}"/>
+          </ac:picMkLst>
+        </pc:picChg>
+        <pc:picChg chg="del">
+          <ac:chgData name="ken zhao" userId="e96b2dde5c0d9c1f" providerId="LiveId" clId="{4B2407D2-4E5A-469E-8B22-9C965EE789F6}" dt="2023-08-15T09:37:31.498" v="5" actId="478"/>
+          <ac:picMkLst>
+            <pc:docMk/>
+            <pc:sldMk cId="2364028119" sldId="256"/>
+            <ac:picMk id="6" creationId="{E31B51F5-8A00-0E35-FC2D-1A2A88DD72FF}"/>
+          </ac:picMkLst>
+        </pc:picChg>
+        <pc:picChg chg="add del mod ord">
+          <ac:chgData name="ken zhao" userId="e96b2dde5c0d9c1f" providerId="LiveId" clId="{4B2407D2-4E5A-469E-8B22-9C965EE789F6}" dt="2023-08-15T09:53:42.435" v="150" actId="478"/>
+          <ac:picMkLst>
+            <pc:docMk/>
+            <pc:sldMk cId="2364028119" sldId="256"/>
+            <ac:picMk id="7" creationId="{E562890A-A818-82B4-4266-FAFAD2959BCA}"/>
+          </ac:picMkLst>
+        </pc:picChg>
+        <pc:picChg chg="add del mod">
+          <ac:chgData name="ken zhao" userId="e96b2dde5c0d9c1f" providerId="LiveId" clId="{4B2407D2-4E5A-469E-8B22-9C965EE789F6}" dt="2023-08-15T10:18:33.329" v="454" actId="478"/>
+          <ac:picMkLst>
+            <pc:docMk/>
+            <pc:sldMk cId="2364028119" sldId="256"/>
+            <ac:picMk id="19" creationId="{20BFC816-5BC2-1D2B-DF71-9DC275F5A771}"/>
+          </ac:picMkLst>
+        </pc:picChg>
+        <pc:picChg chg="add mod ord">
+          <ac:chgData name="ken zhao" userId="e96b2dde5c0d9c1f" providerId="LiveId" clId="{4B2407D2-4E5A-469E-8B22-9C965EE789F6}" dt="2023-08-15T10:02:12.072" v="196" actId="1076"/>
+          <ac:picMkLst>
+            <pc:docMk/>
+            <pc:sldMk cId="2364028119" sldId="256"/>
+            <ac:picMk id="21" creationId="{B1041A44-A690-D34C-3F5E-9FF5849F05B1}"/>
+          </ac:picMkLst>
+        </pc:picChg>
+        <pc:picChg chg="add mod ord">
+          <ac:chgData name="ken zhao" userId="e96b2dde5c0d9c1f" providerId="LiveId" clId="{4B2407D2-4E5A-469E-8B22-9C965EE789F6}" dt="2023-08-15T10:19:50.986" v="474" actId="1038"/>
+          <ac:picMkLst>
+            <pc:docMk/>
+            <pc:sldMk cId="2364028119" sldId="256"/>
+            <ac:picMk id="22" creationId="{32B9A7C5-AF72-21FA-916E-2774E3141640}"/>
+          </ac:picMkLst>
+        </pc:picChg>
+        <pc:picChg chg="add mod ord">
+          <ac:chgData name="ken zhao" userId="e96b2dde5c0d9c1f" providerId="LiveId" clId="{4B2407D2-4E5A-469E-8B22-9C965EE789F6}" dt="2023-08-15T10:23:15.040" v="484" actId="1076"/>
+          <ac:picMkLst>
+            <pc:docMk/>
+            <pc:sldMk cId="2364028119" sldId="256"/>
+            <ac:picMk id="27" creationId="{8D1D9941-D7F9-D34C-96FF-8AF203F37A57}"/>
+          </ac:picMkLst>
+        </pc:picChg>
+        <pc:picChg chg="add del mod">
+          <ac:chgData name="ken zhao" userId="e96b2dde5c0d9c1f" providerId="LiveId" clId="{4B2407D2-4E5A-469E-8B22-9C965EE789F6}" dt="2023-08-15T10:27:15.700" v="507" actId="21"/>
+          <ac:picMkLst>
+            <pc:docMk/>
+            <pc:sldMk cId="2364028119" sldId="256"/>
+            <ac:picMk id="28" creationId="{1BD785C9-500A-1E59-7684-2932EDE02A19}"/>
+          </ac:picMkLst>
+        </pc:picChg>
+        <pc:cxnChg chg="add mod">
+          <ac:chgData name="ken zhao" userId="e96b2dde5c0d9c1f" providerId="LiveId" clId="{4B2407D2-4E5A-469E-8B22-9C965EE789F6}" dt="2023-08-15T10:19:50.986" v="474" actId="1038"/>
+          <ac:cxnSpMkLst>
+            <pc:docMk/>
+            <pc:sldMk cId="2364028119" sldId="256"/>
+            <ac:cxnSpMk id="23" creationId="{A8142A7D-75CF-5085-7A26-64E4E180C5EA}"/>
+          </ac:cxnSpMkLst>
+        </pc:cxnChg>
+      </pc:sldChg>
+      <pc:sldChg chg="del">
+        <pc:chgData name="ken zhao" userId="e96b2dde5c0d9c1f" providerId="LiveId" clId="{4B2407D2-4E5A-469E-8B22-9C965EE789F6}" dt="2023-08-15T10:28:46.264" v="567" actId="47"/>
+        <pc:sldMkLst>
+          <pc:docMk/>
+          <pc:sldMk cId="3544642092" sldId="258"/>
+        </pc:sldMkLst>
+      </pc:sldChg>
+      <pc:sldChg chg="new del ord">
+        <pc:chgData name="ken zhao" userId="e96b2dde5c0d9c1f" providerId="LiveId" clId="{4B2407D2-4E5A-469E-8B22-9C965EE789F6}" dt="2023-08-15T10:28:44.688" v="565" actId="47"/>
+        <pc:sldMkLst>
+          <pc:docMk/>
+          <pc:sldMk cId="4053645250" sldId="259"/>
+        </pc:sldMkLst>
+      </pc:sldChg>
+      <pc:sldChg chg="add del ord">
+        <pc:chgData name="ken zhao" userId="e96b2dde5c0d9c1f" providerId="LiveId" clId="{4B2407D2-4E5A-469E-8B22-9C965EE789F6}" dt="2023-08-15T10:28:45.281" v="566" actId="47"/>
+        <pc:sldMkLst>
+          <pc:docMk/>
+          <pc:sldMk cId="3751361573" sldId="260"/>
+        </pc:sldMkLst>
+      </pc:sldChg>
+      <pc:sldChg chg="addSp delSp modSp add mod setBg">
+        <pc:chgData name="ken zhao" userId="e96b2dde5c0d9c1f" providerId="LiveId" clId="{4B2407D2-4E5A-469E-8B22-9C965EE789F6}" dt="2023-08-15T10:39:25.511" v="785" actId="692"/>
+        <pc:sldMkLst>
+          <pc:docMk/>
+          <pc:sldMk cId="3266255870" sldId="261"/>
+        </pc:sldMkLst>
+        <pc:spChg chg="del">
+          <ac:chgData name="ken zhao" userId="e96b2dde5c0d9c1f" providerId="LiveId" clId="{4B2407D2-4E5A-469E-8B22-9C965EE789F6}" dt="2023-08-15T09:44:44.530" v="128" actId="478"/>
+          <ac:spMkLst>
+            <pc:docMk/>
+            <pc:sldMk cId="3266255870" sldId="261"/>
+            <ac:spMk id="8" creationId="{83D53958-C8F2-FBF2-B6F2-EAEFF3B98BDF}"/>
+          </ac:spMkLst>
+        </pc:spChg>
+        <pc:spChg chg="del">
+          <ac:chgData name="ken zhao" userId="e96b2dde5c0d9c1f" providerId="LiveId" clId="{4B2407D2-4E5A-469E-8B22-9C965EE789F6}" dt="2023-08-15T09:43:00.988" v="69" actId="478"/>
+          <ac:spMkLst>
+            <pc:docMk/>
+            <pc:sldMk cId="3266255870" sldId="261"/>
+            <ac:spMk id="10" creationId="{163B30DA-1326-2E28-3DDC-B2C081EC3C97}"/>
+          </ac:spMkLst>
+        </pc:spChg>
+        <pc:spChg chg="del">
+          <ac:chgData name="ken zhao" userId="e96b2dde5c0d9c1f" providerId="LiveId" clId="{4B2407D2-4E5A-469E-8B22-9C965EE789F6}" dt="2023-08-15T09:43:00.988" v="69" actId="478"/>
+          <ac:spMkLst>
+            <pc:docMk/>
+            <pc:sldMk cId="3266255870" sldId="261"/>
+            <ac:spMk id="11" creationId="{FD69B0D3-926B-E96C-8504-675697405197}"/>
+          </ac:spMkLst>
+        </pc:spChg>
+        <pc:spChg chg="del">
+          <ac:chgData name="ken zhao" userId="e96b2dde5c0d9c1f" providerId="LiveId" clId="{4B2407D2-4E5A-469E-8B22-9C965EE789F6}" dt="2023-08-15T09:43:00.988" v="69" actId="478"/>
+          <ac:spMkLst>
+            <pc:docMk/>
+            <pc:sldMk cId="3266255870" sldId="261"/>
+            <ac:spMk id="12" creationId="{9901362B-A071-ECFA-2B03-079F2801D174}"/>
+          </ac:spMkLst>
+        </pc:spChg>
+        <pc:spChg chg="del">
+          <ac:chgData name="ken zhao" userId="e96b2dde5c0d9c1f" providerId="LiveId" clId="{4B2407D2-4E5A-469E-8B22-9C965EE789F6}" dt="2023-08-15T09:43:00.988" v="69" actId="478"/>
+          <ac:spMkLst>
+            <pc:docMk/>
+            <pc:sldMk cId="3266255870" sldId="261"/>
+            <ac:spMk id="13" creationId="{A26CC81F-5250-F148-BEA5-CD76ADBD02BA}"/>
+          </ac:spMkLst>
+        </pc:spChg>
+        <pc:spChg chg="del">
+          <ac:chgData name="ken zhao" userId="e96b2dde5c0d9c1f" providerId="LiveId" clId="{4B2407D2-4E5A-469E-8B22-9C965EE789F6}" dt="2023-08-15T09:43:00.988" v="69" actId="478"/>
+          <ac:spMkLst>
+            <pc:docMk/>
+            <pc:sldMk cId="3266255870" sldId="261"/>
+            <ac:spMk id="14" creationId="{8C3452DB-2CA6-DB35-4945-66D83087A8EA}"/>
+          </ac:spMkLst>
+        </pc:spChg>
+        <pc:spChg chg="del">
+          <ac:chgData name="ken zhao" userId="e96b2dde5c0d9c1f" providerId="LiveId" clId="{4B2407D2-4E5A-469E-8B22-9C965EE789F6}" dt="2023-08-15T09:43:00.988" v="69" actId="478"/>
+          <ac:spMkLst>
+            <pc:docMk/>
+            <pc:sldMk cId="3266255870" sldId="261"/>
+            <ac:spMk id="15" creationId="{5A14B829-7003-9EB8-B26D-C43BB8F2AA40}"/>
+          </ac:spMkLst>
+        </pc:spChg>
+        <pc:spChg chg="del">
+          <ac:chgData name="ken zhao" userId="e96b2dde5c0d9c1f" providerId="LiveId" clId="{4B2407D2-4E5A-469E-8B22-9C965EE789F6}" dt="2023-08-15T09:43:00.988" v="69" actId="478"/>
+          <ac:spMkLst>
+            <pc:docMk/>
+            <pc:sldMk cId="3266255870" sldId="261"/>
+            <ac:spMk id="16" creationId="{7FD4998C-A147-F4A6-B43A-F95D2D53B623}"/>
+          </ac:spMkLst>
+        </pc:spChg>
+        <pc:spChg chg="del">
+          <ac:chgData name="ken zhao" userId="e96b2dde5c0d9c1f" providerId="LiveId" clId="{4B2407D2-4E5A-469E-8B22-9C965EE789F6}" dt="2023-08-15T09:43:00.988" v="69" actId="478"/>
+          <ac:spMkLst>
+            <pc:docMk/>
+            <pc:sldMk cId="3266255870" sldId="261"/>
+            <ac:spMk id="17" creationId="{F356445E-3DE2-3C9F-F987-0A715EB68852}"/>
+          </ac:spMkLst>
+        </pc:spChg>
+        <pc:spChg chg="del">
+          <ac:chgData name="ken zhao" userId="e96b2dde5c0d9c1f" providerId="LiveId" clId="{4B2407D2-4E5A-469E-8B22-9C965EE789F6}" dt="2023-08-15T09:43:00.988" v="69" actId="478"/>
+          <ac:spMkLst>
+            <pc:docMk/>
+            <pc:sldMk cId="3266255870" sldId="261"/>
+            <ac:spMk id="18" creationId="{92D35762-D227-2919-DFD7-BD95BAFAFAFB}"/>
+          </ac:spMkLst>
+        </pc:spChg>
+        <pc:spChg chg="add mod">
+          <ac:chgData name="ken zhao" userId="e96b2dde5c0d9c1f" providerId="LiveId" clId="{4B2407D2-4E5A-469E-8B22-9C965EE789F6}" dt="2023-08-15T10:31:00.555" v="655" actId="14100"/>
+          <ac:spMkLst>
+            <pc:docMk/>
+            <pc:sldMk cId="3266255870" sldId="261"/>
+            <ac:spMk id="19" creationId="{510CE099-146A-8CD1-E0A1-90BDBA4F0484}"/>
+          </ac:spMkLst>
+        </pc:spChg>
+        <pc:spChg chg="add mod">
+          <ac:chgData name="ken zhao" userId="e96b2dde5c0d9c1f" providerId="LiveId" clId="{4B2407D2-4E5A-469E-8B22-9C965EE789F6}" dt="2023-08-15T10:33:21.812" v="782" actId="14100"/>
+          <ac:spMkLst>
+            <pc:docMk/>
+            <pc:sldMk cId="3266255870" sldId="261"/>
+            <ac:spMk id="20" creationId="{562781F9-AE1C-A3A0-AD50-4F0D2D2A9026}"/>
+          </ac:spMkLst>
+        </pc:spChg>
+        <pc:spChg chg="add mod">
+          <ac:chgData name="ken zhao" userId="e96b2dde5c0d9c1f" providerId="LiveId" clId="{4B2407D2-4E5A-469E-8B22-9C965EE789F6}" dt="2023-08-15T10:33:17.524" v="781" actId="14100"/>
+          <ac:spMkLst>
+            <pc:docMk/>
+            <pc:sldMk cId="3266255870" sldId="261"/>
+            <ac:spMk id="21" creationId="{92664D8E-9383-3103-E205-7E90DCB32F99}"/>
+          </ac:spMkLst>
+        </pc:spChg>
+        <pc:spChg chg="mod">
+          <ac:chgData name="ken zhao" userId="e96b2dde5c0d9c1f" providerId="LiveId" clId="{4B2407D2-4E5A-469E-8B22-9C965EE789F6}" dt="2023-08-15T10:27:33.767" v="552" actId="1038"/>
+          <ac:spMkLst>
+            <pc:docMk/>
+            <pc:sldMk cId="3266255870" sldId="261"/>
+            <ac:spMk id="39" creationId="{ECB87BF8-6EFF-80D5-3D5F-30988FB6F810}"/>
+          </ac:spMkLst>
+        </pc:spChg>
+        <pc:spChg chg="mod">
+          <ac:chgData name="ken zhao" userId="e96b2dde5c0d9c1f" providerId="LiveId" clId="{4B2407D2-4E5A-469E-8B22-9C965EE789F6}" dt="2023-08-15T10:27:49.560" v="562" actId="1038"/>
+          <ac:spMkLst>
+            <pc:docMk/>
+            <pc:sldMk cId="3266255870" sldId="261"/>
+            <ac:spMk id="41" creationId="{338CD1C2-C9D6-79E8-FF1D-2407797D379A}"/>
+          </ac:spMkLst>
+        </pc:spChg>
+        <pc:picChg chg="add del mod">
+          <ac:chgData name="ken zhao" userId="e96b2dde5c0d9c1f" providerId="LiveId" clId="{4B2407D2-4E5A-469E-8B22-9C965EE789F6}" dt="2023-08-15T10:26:58.510" v="503" actId="21"/>
+          <ac:picMkLst>
+            <pc:docMk/>
+            <pc:sldMk cId="3266255870" sldId="261"/>
+            <ac:picMk id="3" creationId="{B6395E57-ECA6-2486-18A9-70CEEDD1B859}"/>
+          </ac:picMkLst>
+        </pc:picChg>
+        <pc:picChg chg="del">
+          <ac:chgData name="ken zhao" userId="e96b2dde5c0d9c1f" providerId="LiveId" clId="{4B2407D2-4E5A-469E-8B22-9C965EE789F6}" dt="2023-08-15T09:42:56.092" v="67" actId="478"/>
+          <ac:picMkLst>
+            <pc:docMk/>
+            <pc:sldMk cId="3266255870" sldId="261"/>
+            <ac:picMk id="4" creationId="{F6DF5B51-23EF-9ED5-B073-C33C2DA3FA2F}"/>
+          </ac:picMkLst>
+        </pc:picChg>
+        <pc:picChg chg="add mod">
+          <ac:chgData name="ken zhao" userId="e96b2dde5c0d9c1f" providerId="LiveId" clId="{4B2407D2-4E5A-469E-8B22-9C965EE789F6}" dt="2023-08-15T10:39:25.511" v="785" actId="692"/>
+          <ac:picMkLst>
+            <pc:docMk/>
+            <pc:sldMk cId="3266255870" sldId="261"/>
+            <ac:picMk id="6" creationId="{C955AC19-06C3-A4AB-6E8C-8C47734938EC}"/>
+          </ac:picMkLst>
+        </pc:picChg>
+        <pc:picChg chg="del">
+          <ac:chgData name="ken zhao" userId="e96b2dde5c0d9c1f" providerId="LiveId" clId="{4B2407D2-4E5A-469E-8B22-9C965EE789F6}" dt="2023-08-15T09:42:57.169" v="68" actId="478"/>
+          <ac:picMkLst>
+            <pc:docMk/>
+            <pc:sldMk cId="3266255870" sldId="261"/>
+            <ac:picMk id="7" creationId="{E562890A-A818-82B4-4266-FAFAD2959BCA}"/>
+          </ac:picMkLst>
+        </pc:picChg>
+        <pc:picChg chg="add mod">
+          <ac:chgData name="ken zhao" userId="e96b2dde5c0d9c1f" providerId="LiveId" clId="{4B2407D2-4E5A-469E-8B22-9C965EE789F6}" dt="2023-08-15T10:39:17.354" v="784" actId="692"/>
+          <ac:picMkLst>
+            <pc:docMk/>
+            <pc:sldMk cId="3266255870" sldId="261"/>
+            <ac:picMk id="9" creationId="{528EB386-7C37-B805-E741-DE603ED823F6}"/>
+          </ac:picMkLst>
+        </pc:picChg>
+      </pc:sldChg>
+    </pc:docChg>
+  </pc:docChgLst>
+  <pc:docChgLst>
     <pc:chgData name="zhao ken" userId="e96b2dde5c0d9c1f" providerId="LiveId" clId="{DA6162CB-AE16-40C2-894B-3143794A1383}"/>
     <pc:docChg chg="undo custSel addSld delSld modSld">
       <pc:chgData name="zhao ken" userId="e96b2dde5c0d9c1f" providerId="LiveId" clId="{DA6162CB-AE16-40C2-894B-3143794A1383}" dt="2023-04-05T12:42:53.446" v="700" actId="14100"/>
@@ -1029,7 +1425,7 @@
           <a:p>
             <a:fld id="{83F12504-7637-4DB2-B2FE-6E52528CC067}" type="datetimeFigureOut">
               <a:rPr lang="zh-CN" altLang="en-US" smtClean="0"/>
-              <a:t>2023/4/9</a:t>
+              <a:t>2023/8/15</a:t>
             </a:fld>
             <a:endParaRPr lang="zh-CN" altLang="en-US"/>
           </a:p>
@@ -1227,7 +1623,7 @@
           <a:p>
             <a:fld id="{83F12504-7637-4DB2-B2FE-6E52528CC067}" type="datetimeFigureOut">
               <a:rPr lang="zh-CN" altLang="en-US" smtClean="0"/>
-              <a:t>2023/4/9</a:t>
+              <a:t>2023/8/15</a:t>
             </a:fld>
             <a:endParaRPr lang="zh-CN" altLang="en-US"/>
           </a:p>
@@ -1435,7 +1831,7 @@
           <a:p>
             <a:fld id="{83F12504-7637-4DB2-B2FE-6E52528CC067}" type="datetimeFigureOut">
               <a:rPr lang="zh-CN" altLang="en-US" smtClean="0"/>
-              <a:t>2023/4/9</a:t>
+              <a:t>2023/8/15</a:t>
             </a:fld>
             <a:endParaRPr lang="zh-CN" altLang="en-US"/>
           </a:p>
@@ -1633,7 +2029,7 @@
           <a:p>
             <a:fld id="{83F12504-7637-4DB2-B2FE-6E52528CC067}" type="datetimeFigureOut">
               <a:rPr lang="zh-CN" altLang="en-US" smtClean="0"/>
-              <a:t>2023/4/9</a:t>
+              <a:t>2023/8/15</a:t>
             </a:fld>
             <a:endParaRPr lang="zh-CN" altLang="en-US"/>
           </a:p>
@@ -1908,7 +2304,7 @@
           <a:p>
             <a:fld id="{83F12504-7637-4DB2-B2FE-6E52528CC067}" type="datetimeFigureOut">
               <a:rPr lang="zh-CN" altLang="en-US" smtClean="0"/>
-              <a:t>2023/4/9</a:t>
+              <a:t>2023/8/15</a:t>
             </a:fld>
             <a:endParaRPr lang="zh-CN" altLang="en-US"/>
           </a:p>
@@ -2173,7 +2569,7 @@
           <a:p>
             <a:fld id="{83F12504-7637-4DB2-B2FE-6E52528CC067}" type="datetimeFigureOut">
               <a:rPr lang="zh-CN" altLang="en-US" smtClean="0"/>
-              <a:t>2023/4/9</a:t>
+              <a:t>2023/8/15</a:t>
             </a:fld>
             <a:endParaRPr lang="zh-CN" altLang="en-US"/>
           </a:p>
@@ -2585,7 +2981,7 @@
           <a:p>
             <a:fld id="{83F12504-7637-4DB2-B2FE-6E52528CC067}" type="datetimeFigureOut">
               <a:rPr lang="zh-CN" altLang="en-US" smtClean="0"/>
-              <a:t>2023/4/9</a:t>
+              <a:t>2023/8/15</a:t>
             </a:fld>
             <a:endParaRPr lang="zh-CN" altLang="en-US"/>
           </a:p>
@@ -2726,7 +3122,7 @@
           <a:p>
             <a:fld id="{83F12504-7637-4DB2-B2FE-6E52528CC067}" type="datetimeFigureOut">
               <a:rPr lang="zh-CN" altLang="en-US" smtClean="0"/>
-              <a:t>2023/4/9</a:t>
+              <a:t>2023/8/15</a:t>
             </a:fld>
             <a:endParaRPr lang="zh-CN" altLang="en-US"/>
           </a:p>
@@ -2839,7 +3235,7 @@
           <a:p>
             <a:fld id="{83F12504-7637-4DB2-B2FE-6E52528CC067}" type="datetimeFigureOut">
               <a:rPr lang="zh-CN" altLang="en-US" smtClean="0"/>
-              <a:t>2023/4/9</a:t>
+              <a:t>2023/8/15</a:t>
             </a:fld>
             <a:endParaRPr lang="zh-CN" altLang="en-US"/>
           </a:p>
@@ -3150,7 +3546,7 @@
           <a:p>
             <a:fld id="{83F12504-7637-4DB2-B2FE-6E52528CC067}" type="datetimeFigureOut">
               <a:rPr lang="zh-CN" altLang="en-US" smtClean="0"/>
-              <a:t>2023/4/9</a:t>
+              <a:t>2023/8/15</a:t>
             </a:fld>
             <a:endParaRPr lang="zh-CN" altLang="en-US"/>
           </a:p>
@@ -3438,7 +3834,7 @@
           <a:p>
             <a:fld id="{83F12504-7637-4DB2-B2FE-6E52528CC067}" type="datetimeFigureOut">
               <a:rPr lang="zh-CN" altLang="en-US" smtClean="0"/>
-              <a:t>2023/4/9</a:t>
+              <a:t>2023/8/15</a:t>
             </a:fld>
             <a:endParaRPr lang="zh-CN" altLang="en-US"/>
           </a:p>
@@ -3679,7 +4075,7 @@
           <a:p>
             <a:fld id="{83F12504-7637-4DB2-B2FE-6E52528CC067}" type="datetimeFigureOut">
               <a:rPr lang="zh-CN" altLang="en-US" smtClean="0"/>
-              <a:t>2023/4/9</a:t>
+              <a:t>2023/8/15</a:t>
             </a:fld>
             <a:endParaRPr lang="zh-CN" altLang="en-US"/>
           </a:p>
@@ -4106,10 +4502,10 @@
       </p:grpSpPr>
       <p:pic>
         <p:nvPicPr>
-          <p:cNvPr id="3" name="图片 2">
-            <a:extLst>
-              <a:ext uri="{FF2B5EF4-FFF2-40B4-BE49-F238E27FC236}">
-                <a16:creationId xmlns:a16="http://schemas.microsoft.com/office/drawing/2014/main" id="{1DC88DAA-5811-04B3-FEA9-7EE51EA8CE23}"/>
+          <p:cNvPr id="27" name="图片 26">
+            <a:extLst>
+              <a:ext uri="{FF2B5EF4-FFF2-40B4-BE49-F238E27FC236}">
+                <a16:creationId xmlns:a16="http://schemas.microsoft.com/office/drawing/2014/main" id="{8D1D9941-D7F9-D34C-96FF-8AF203F37A57}"/>
               </a:ext>
             </a:extLst>
           </p:cNvPr>
@@ -4132,19 +4528,60 @@
         </p:blipFill>
         <p:spPr>
           <a:xfrm>
-            <a:off x="4525555" y="148356"/>
-            <a:ext cx="3143641" cy="6176674"/>
+            <a:off x="8227720" y="322284"/>
+            <a:ext cx="2777302" cy="6017487"/>
           </a:xfrm>
           <a:prstGeom prst="rect">
             <a:avLst/>
           </a:prstGeom>
           <a:ln>
             <a:solidFill>
-              <a:schemeClr val="accent1"/>
+              <a:schemeClr val="tx1"/>
             </a:solidFill>
           </a:ln>
         </p:spPr>
       </p:pic>
+      <p:pic>
+        <p:nvPicPr>
+          <p:cNvPr id="21" name="图片 20">
+            <a:extLst>
+              <a:ext uri="{FF2B5EF4-FFF2-40B4-BE49-F238E27FC236}">
+                <a16:creationId xmlns:a16="http://schemas.microsoft.com/office/drawing/2014/main" id="{B1041A44-A690-D34C-3F5E-9FF5849F05B1}"/>
+              </a:ext>
+            </a:extLst>
+          </p:cNvPr>
+          <p:cNvPicPr>
+            <a:picLocks noChangeAspect="1"/>
+          </p:cNvPicPr>
+          <p:nvPr/>
+        </p:nvPicPr>
+        <p:blipFill>
+          <a:blip r:embed="rId3">
+            <a:extLst>
+              <a:ext uri="{28A0092B-C50C-407E-A947-70E740481C1C}">
+                <a14:useLocalDpi xmlns:a14="http://schemas.microsoft.com/office/drawing/2010/main" val="0"/>
+              </a:ext>
+            </a:extLst>
+          </a:blip>
+          <a:stretch>
+            <a:fillRect/>
+          </a:stretch>
+        </p:blipFill>
+        <p:spPr>
+          <a:xfrm>
+            <a:off x="4569400" y="322284"/>
+            <a:ext cx="2777302" cy="6017487"/>
+          </a:xfrm>
+          <a:prstGeom prst="rect">
+            <a:avLst/>
+          </a:prstGeom>
+          <a:ln>
+            <a:solidFill>
+              <a:schemeClr val="tx1"/>
+            </a:solidFill>
+          </a:ln>
+        </p:spPr>
+      </p:pic>
       <p:sp>
         <p:nvSpPr>
           <p:cNvPr id="10" name="标注: 弯曲线形 9">
@@ -4159,8 +4596,8 @@
         </p:nvSpPr>
         <p:spPr>
           <a:xfrm>
-            <a:off x="4685184" y="3530070"/>
-            <a:ext cx="880680" cy="347819"/>
+            <a:off x="4744304" y="2855149"/>
+            <a:ext cx="996464" cy="442681"/>
           </a:xfrm>
           <a:prstGeom prst="borderCallout2">
             <a:avLst>
@@ -4168,16 +4605,16 @@
               <a:gd name="adj2" fmla="val -2055"/>
               <a:gd name="adj3" fmla="val 126829"/>
               <a:gd name="adj4" fmla="val -11086"/>
-              <a:gd name="adj5" fmla="val 702315"/>
-              <a:gd name="adj6" fmla="val 2761"/>
+              <a:gd name="adj5" fmla="val 648430"/>
+              <a:gd name="adj6" fmla="val 1963"/>
             </a:avLst>
           </a:prstGeom>
           <a:solidFill>
             <a:schemeClr val="bg1"/>
           </a:solidFill>
-          <a:ln w="15875">
+          <a:ln w="12700">
             <a:solidFill>
-              <a:srgbClr val="FF0000"/>
+              <a:srgbClr val="C00000"/>
             </a:solidFill>
           </a:ln>
         </p:spPr>
@@ -4201,10 +4638,11 @@
           <a:bodyPr lIns="72000" tIns="72000" rIns="72000" bIns="72000" rtlCol="0" anchor="ctr" anchorCtr="0"/>
           <a:lstStyle/>
           <a:p>
+            <a:pPr algn="ctr"/>
             <a:r>
               <a:rPr lang="zh-CN" altLang="en-US" sz="1000" dirty="0">
                 <a:solidFill>
-                  <a:srgbClr val="FF0000"/>
+                  <a:srgbClr val="C00000"/>
                 </a:solidFill>
               </a:rPr>
               <a:t>短按</a:t>
@@ -4212,7 +4650,7 @@
             <a:r>
               <a:rPr lang="en-US" altLang="zh-CN" sz="1000" dirty="0">
                 <a:solidFill>
-                  <a:srgbClr val="FF0000"/>
+                  <a:srgbClr val="C00000"/>
                 </a:solidFill>
               </a:rPr>
               <a:t>:</a:t>
@@ -4220,22 +4658,23 @@
             <a:r>
               <a:rPr lang="zh-CN" altLang="en-US" sz="1000" dirty="0">
                 <a:solidFill>
-                  <a:srgbClr val="FF0000"/>
+                  <a:srgbClr val="C00000"/>
                 </a:solidFill>
               </a:rPr>
               <a:t>：回退</a:t>
             </a:r>
             <a:endParaRPr lang="en-US" altLang="zh-CN" sz="1000" dirty="0">
               <a:solidFill>
-                <a:srgbClr val="FF0000"/>
+                <a:srgbClr val="C00000"/>
               </a:solidFill>
             </a:endParaRPr>
           </a:p>
           <a:p>
+            <a:pPr algn="ctr"/>
             <a:r>
               <a:rPr lang="zh-CN" altLang="en-US" sz="1000" dirty="0">
                 <a:solidFill>
-                  <a:srgbClr val="FF0000"/>
+                  <a:srgbClr val="C00000"/>
                 </a:solidFill>
               </a:rPr>
               <a:t>长按</a:t>
@@ -4243,7 +4682,7 @@
             <a:r>
               <a:rPr lang="en-US" altLang="zh-CN" sz="1000" dirty="0">
                 <a:solidFill>
-                  <a:srgbClr val="FF0000"/>
+                  <a:srgbClr val="C00000"/>
                 </a:solidFill>
               </a:rPr>
               <a:t>:</a:t>
@@ -4251,7 +4690,7 @@
             <a:r>
               <a:rPr lang="zh-CN" altLang="en-US" sz="1000" dirty="0">
                 <a:solidFill>
-                  <a:srgbClr val="FF0000"/>
+                  <a:srgbClr val="C00000"/>
                 </a:solidFill>
               </a:rPr>
               <a:t>：左页</a:t>
@@ -4273,8 +4712,8 @@
         </p:nvSpPr>
         <p:spPr>
           <a:xfrm>
-            <a:off x="4875684" y="4067360"/>
-            <a:ext cx="728279" cy="347819"/>
+            <a:off x="4981297" y="3473343"/>
+            <a:ext cx="788860" cy="442682"/>
           </a:xfrm>
           <a:prstGeom prst="borderCallout2">
             <a:avLst>
@@ -4282,16 +4721,16 @@
               <a:gd name="adj2" fmla="val -1358"/>
               <a:gd name="adj3" fmla="val 120987"/>
               <a:gd name="adj4" fmla="val -11784"/>
-              <a:gd name="adj5" fmla="val 562104"/>
-              <a:gd name="adj6" fmla="val 11829"/>
+              <a:gd name="adj5" fmla="val 508388"/>
+              <a:gd name="adj6" fmla="val 3322"/>
             </a:avLst>
           </a:prstGeom>
           <a:solidFill>
             <a:schemeClr val="bg1"/>
           </a:solidFill>
-          <a:ln w="15875">
+          <a:ln w="12700">
             <a:solidFill>
-              <a:srgbClr val="FF0000"/>
+              <a:srgbClr val="C00000"/>
             </a:solidFill>
           </a:ln>
         </p:spPr>
@@ -4315,10 +4754,11 @@
           <a:bodyPr lIns="72000" tIns="72000" rIns="72000" bIns="72000" rtlCol="0" anchor="ctr" anchorCtr="0"/>
           <a:lstStyle/>
           <a:p>
+            <a:pPr algn="ctr"/>
             <a:r>
               <a:rPr lang="zh-CN" altLang="en-US" sz="1000" dirty="0">
                 <a:solidFill>
-                  <a:srgbClr val="FF0000"/>
+                  <a:srgbClr val="C00000"/>
                 </a:solidFill>
               </a:rPr>
               <a:t>短按</a:t>
@@ -4326,7 +4766,7 @@
             <a:r>
               <a:rPr lang="en-US" altLang="zh-CN" sz="1000" dirty="0">
                 <a:solidFill>
-                  <a:srgbClr val="FF0000"/>
+                  <a:srgbClr val="C00000"/>
                 </a:solidFill>
               </a:rPr>
               <a:t>: </a:t>
@@ -4334,22 +4774,23 @@
             <a:r>
               <a:rPr lang="zh-CN" altLang="en-US" sz="1000" dirty="0">
                 <a:solidFill>
-                  <a:srgbClr val="FF0000"/>
+                  <a:srgbClr val="C00000"/>
                 </a:solidFill>
               </a:rPr>
               <a:t>前进</a:t>
             </a:r>
             <a:endParaRPr lang="en-US" altLang="zh-CN" sz="1000" dirty="0">
               <a:solidFill>
-                <a:srgbClr val="FF0000"/>
+                <a:srgbClr val="C00000"/>
               </a:solidFill>
             </a:endParaRPr>
           </a:p>
           <a:p>
+            <a:pPr algn="ctr"/>
             <a:r>
               <a:rPr lang="zh-CN" altLang="en-US" sz="1000" dirty="0">
                 <a:solidFill>
-                  <a:srgbClr val="FF0000"/>
+                  <a:srgbClr val="C00000"/>
                 </a:solidFill>
               </a:rPr>
               <a:t>长按</a:t>
@@ -4357,7 +4798,7 @@
             <a:r>
               <a:rPr lang="en-US" altLang="zh-CN" sz="1000" dirty="0">
                 <a:solidFill>
-                  <a:srgbClr val="FF0000"/>
+                  <a:srgbClr val="C00000"/>
                 </a:solidFill>
               </a:rPr>
               <a:t>: </a:t>
@@ -4365,7 +4806,7 @@
             <a:r>
               <a:rPr lang="zh-CN" altLang="en-US" sz="1000" dirty="0">
                 <a:solidFill>
-                  <a:srgbClr val="FF0000"/>
+                  <a:srgbClr val="C00000"/>
                 </a:solidFill>
               </a:rPr>
               <a:t>右页</a:t>
@@ -4387,8 +4828,8 @@
         </p:nvSpPr>
         <p:spPr>
           <a:xfrm>
-            <a:off x="5125524" y="4621682"/>
-            <a:ext cx="857456" cy="347819"/>
+            <a:off x="5149330" y="4091538"/>
+            <a:ext cx="852486" cy="442682"/>
           </a:xfrm>
           <a:prstGeom prst="borderCallout2">
             <a:avLst>
@@ -4396,16 +4837,16 @@
               <a:gd name="adj2" fmla="val -2409"/>
               <a:gd name="adj3" fmla="val 115145"/>
               <a:gd name="adj4" fmla="val -9558"/>
-              <a:gd name="adj5" fmla="val 411669"/>
-              <a:gd name="adj6" fmla="val 18194"/>
+              <a:gd name="adj5" fmla="val 377542"/>
+              <a:gd name="adj6" fmla="val 10732"/>
             </a:avLst>
           </a:prstGeom>
           <a:solidFill>
             <a:schemeClr val="bg1"/>
           </a:solidFill>
-          <a:ln w="15875">
+          <a:ln w="12700">
             <a:solidFill>
-              <a:srgbClr val="FF0000"/>
+              <a:srgbClr val="C00000"/>
             </a:solidFill>
           </a:ln>
         </p:spPr>
@@ -4432,7 +4873,7 @@
             <a:r>
               <a:rPr lang="zh-CN" altLang="en-US" sz="1000" dirty="0">
                 <a:solidFill>
-                  <a:srgbClr val="FF0000"/>
+                  <a:srgbClr val="C00000"/>
                 </a:solidFill>
               </a:rPr>
               <a:t>短按</a:t>
@@ -4440,7 +4881,7 @@
             <a:r>
               <a:rPr lang="en-US" altLang="zh-CN" sz="1000" dirty="0">
                 <a:solidFill>
-                  <a:srgbClr val="FF0000"/>
+                  <a:srgbClr val="C00000"/>
                 </a:solidFill>
               </a:rPr>
               <a:t>: </a:t>
@@ -4448,14 +4889,14 @@
             <a:r>
               <a:rPr lang="zh-CN" altLang="en-US" sz="1000" dirty="0">
                 <a:solidFill>
-                  <a:srgbClr val="FF0000"/>
+                  <a:srgbClr val="C00000"/>
                 </a:solidFill>
               </a:rPr>
               <a:t>回主页</a:t>
             </a:r>
             <a:endParaRPr lang="en-US" altLang="zh-CN" sz="1000" dirty="0">
               <a:solidFill>
-                <a:srgbClr val="FF0000"/>
+                <a:srgbClr val="C00000"/>
               </a:solidFill>
             </a:endParaRPr>
           </a:p>
@@ -4463,7 +4904,7 @@
             <a:r>
               <a:rPr lang="zh-CN" altLang="en-US" sz="1000" dirty="0">
                 <a:solidFill>
-                  <a:srgbClr val="FF0000"/>
+                  <a:srgbClr val="C00000"/>
                 </a:solidFill>
               </a:rPr>
               <a:t>长按</a:t>
@@ -4471,7 +4912,7 @@
             <a:r>
               <a:rPr lang="en-US" altLang="zh-CN" sz="1000" dirty="0">
                 <a:solidFill>
-                  <a:srgbClr val="FF0000"/>
+                  <a:srgbClr val="C00000"/>
                 </a:solidFill>
               </a:rPr>
               <a:t>: </a:t>
@@ -4479,7 +4920,7 @@
             <a:r>
               <a:rPr lang="zh-CN" altLang="en-US" sz="1000" dirty="0">
                 <a:solidFill>
-                  <a:srgbClr val="FF0000"/>
+                  <a:srgbClr val="C00000"/>
                 </a:solidFill>
               </a:rPr>
               <a:t>新增页</a:t>
@@ -4501,25 +4942,25 @@
         </p:nvSpPr>
         <p:spPr>
           <a:xfrm>
-            <a:off x="6588406" y="3092953"/>
-            <a:ext cx="1045157" cy="552916"/>
+            <a:off x="5982046" y="3167629"/>
+            <a:ext cx="665480" cy="347819"/>
           </a:xfrm>
           <a:prstGeom prst="borderCallout2">
             <a:avLst>
               <a:gd name="adj1" fmla="val 103059"/>
-              <a:gd name="adj2" fmla="val 93698"/>
-              <a:gd name="adj3" fmla="val 262916"/>
-              <a:gd name="adj4" fmla="val 94185"/>
-              <a:gd name="adj5" fmla="val 435671"/>
-              <a:gd name="adj6" fmla="val 74990"/>
+              <a:gd name="adj2" fmla="val 57853"/>
+              <a:gd name="adj3" fmla="val 358930"/>
+              <a:gd name="adj4" fmla="val 42808"/>
+              <a:gd name="adj5" fmla="val 609411"/>
+              <a:gd name="adj6" fmla="val 12860"/>
             </a:avLst>
           </a:prstGeom>
           <a:solidFill>
             <a:schemeClr val="bg1"/>
           </a:solidFill>
-          <a:ln w="15875">
+          <a:ln w="12700">
             <a:solidFill>
-              <a:srgbClr val="FF0000"/>
+              <a:srgbClr val="C00000"/>
             </a:solidFill>
           </a:ln>
         </p:spPr>
@@ -4546,10 +4987,10 @@
             <a:r>
               <a:rPr lang="zh-CN" altLang="en-US" sz="1000" dirty="0">
                 <a:solidFill>
-                  <a:srgbClr val="FF0000"/>
+                  <a:srgbClr val="C00000"/>
                 </a:solidFill>
               </a:rPr>
-              <a:t>浮动按钮，轻触并滑出边界，实现上下左右翻页</a:t>
+              <a:t>浮动按钮</a:t>
             </a:r>
           </a:p>
         </p:txBody>
@@ -4568,25 +5009,25 @@
         </p:nvSpPr>
         <p:spPr>
           <a:xfrm>
-            <a:off x="6190185" y="4144337"/>
-            <a:ext cx="544390" cy="347819"/>
+            <a:off x="5305221" y="4663405"/>
+            <a:ext cx="790780" cy="268204"/>
           </a:xfrm>
           <a:prstGeom prst="borderCallout2">
             <a:avLst>
-              <a:gd name="adj1" fmla="val 102000"/>
-              <a:gd name="adj2" fmla="val 33659"/>
-              <a:gd name="adj3" fmla="val 195474"/>
-              <a:gd name="adj4" fmla="val 36522"/>
-              <a:gd name="adj5" fmla="val 566421"/>
-              <a:gd name="adj6" fmla="val -16881"/>
+              <a:gd name="adj1" fmla="val 96071"/>
+              <a:gd name="adj2" fmla="val 9926"/>
+              <a:gd name="adj3" fmla="val 239944"/>
+              <a:gd name="adj4" fmla="val 17353"/>
+              <a:gd name="adj5" fmla="val 379749"/>
+              <a:gd name="adj6" fmla="val 32049"/>
             </a:avLst>
           </a:prstGeom>
           <a:solidFill>
             <a:schemeClr val="bg1"/>
           </a:solidFill>
-          <a:ln w="15875">
+          <a:ln w="12700">
             <a:solidFill>
-              <a:srgbClr val="FF0000"/>
+              <a:srgbClr val="C00000"/>
             </a:solidFill>
           </a:ln>
         </p:spPr>
@@ -4613,10 +5054,10 @@
             <a:r>
               <a:rPr lang="zh-CN" altLang="en-US" sz="1000" dirty="0">
                 <a:solidFill>
-                  <a:srgbClr val="FF0000"/>
+                  <a:srgbClr val="C00000"/>
                 </a:solidFill>
               </a:rPr>
-              <a:t>标签页计数</a:t>
+              <a:t>标签页列表</a:t>
             </a:r>
           </a:p>
         </p:txBody>
@@ -4635,25 +5076,25 @@
         </p:nvSpPr>
         <p:spPr>
           <a:xfrm>
-            <a:off x="6496358" y="4973561"/>
+            <a:off x="6618577" y="4973165"/>
             <a:ext cx="665480" cy="347819"/>
           </a:xfrm>
           <a:prstGeom prst="borderCallout2">
             <a:avLst>
               <a:gd name="adj1" fmla="val 102000"/>
               <a:gd name="adj2" fmla="val 9988"/>
-              <a:gd name="adj3" fmla="val 138514"/>
-              <a:gd name="adj4" fmla="val -637"/>
-              <a:gd name="adj5" fmla="val 277175"/>
-              <a:gd name="adj6" fmla="val -15662"/>
+              <a:gd name="adj3" fmla="val 152230"/>
+              <a:gd name="adj4" fmla="val 5337"/>
+              <a:gd name="adj5" fmla="val 199449"/>
+              <a:gd name="adj6" fmla="val -38364"/>
             </a:avLst>
           </a:prstGeom>
           <a:solidFill>
             <a:schemeClr val="bg1"/>
           </a:solidFill>
-          <a:ln w="15875">
+          <a:ln w="12700">
             <a:solidFill>
-              <a:srgbClr val="FF0000"/>
+              <a:srgbClr val="C00000"/>
             </a:solidFill>
           </a:ln>
         </p:spPr>
@@ -4680,7 +5121,7 @@
             <a:r>
               <a:rPr lang="zh-CN" altLang="en-US" sz="1000" dirty="0">
                 <a:solidFill>
-                  <a:srgbClr val="FF0000"/>
+                  <a:srgbClr val="C00000"/>
                 </a:solidFill>
               </a:rPr>
               <a:t>指示当前页位置</a:t>
@@ -4702,25 +5143,25 @@
         </p:nvSpPr>
         <p:spPr>
           <a:xfrm>
-            <a:off x="5276814" y="5125537"/>
+            <a:off x="6391674" y="3965060"/>
             <a:ext cx="855656" cy="347819"/>
           </a:xfrm>
           <a:prstGeom prst="borderCallout2">
             <a:avLst>
               <a:gd name="adj1" fmla="val 103461"/>
-              <a:gd name="adj2" fmla="val 16008"/>
-              <a:gd name="adj3" fmla="val 144354"/>
-              <a:gd name="adj4" fmla="val 14799"/>
-              <a:gd name="adj5" fmla="val 269998"/>
-              <a:gd name="adj6" fmla="val 39021"/>
+              <a:gd name="adj2" fmla="val 51320"/>
+              <a:gd name="adj3" fmla="val 206077"/>
+              <a:gd name="adj4" fmla="val 41749"/>
+              <a:gd name="adj5" fmla="val 523749"/>
+              <a:gd name="adj6" fmla="val -48329"/>
             </a:avLst>
           </a:prstGeom>
           <a:solidFill>
             <a:schemeClr val="bg1"/>
           </a:solidFill>
-          <a:ln w="15875">
+          <a:ln w="12700">
             <a:solidFill>
-              <a:srgbClr val="FF0000"/>
+              <a:srgbClr val="C00000"/>
             </a:solidFill>
           </a:ln>
         </p:spPr>
@@ -4747,7 +5188,7 @@
             <a:r>
               <a:rPr lang="zh-CN" altLang="en-US" sz="1000" dirty="0">
                 <a:solidFill>
-                  <a:srgbClr val="FF0000"/>
+                  <a:srgbClr val="C00000"/>
                 </a:solidFill>
               </a:rPr>
               <a:t>浏览时</a:t>
@@ -4755,7 +5196,7 @@
             <a:r>
               <a:rPr lang="en-US" altLang="zh-CN" sz="1000" dirty="0">
                 <a:solidFill>
-                  <a:srgbClr val="FF0000"/>
+                  <a:srgbClr val="C00000"/>
                 </a:solidFill>
               </a:rPr>
               <a:t>: </a:t>
@@ -4763,14 +5204,14 @@
             <a:r>
               <a:rPr lang="zh-CN" altLang="en-US" sz="1000" dirty="0">
                 <a:solidFill>
-                  <a:srgbClr val="FF0000"/>
+                  <a:srgbClr val="C00000"/>
                 </a:solidFill>
               </a:rPr>
               <a:t>关闭</a:t>
             </a:r>
             <a:endParaRPr lang="en-US" altLang="zh-CN" sz="1000" dirty="0">
               <a:solidFill>
-                <a:srgbClr val="FF0000"/>
+                <a:srgbClr val="C00000"/>
               </a:solidFill>
             </a:endParaRPr>
           </a:p>
@@ -4778,7 +5219,7 @@
             <a:r>
               <a:rPr lang="zh-CN" altLang="en-US" sz="1000" dirty="0">
                 <a:solidFill>
-                  <a:srgbClr val="FF0000"/>
+                  <a:srgbClr val="C00000"/>
                 </a:solidFill>
               </a:rPr>
               <a:t>加载时</a:t>
@@ -4786,7 +5227,7 @@
             <a:r>
               <a:rPr lang="en-US" altLang="zh-CN" sz="1000" dirty="0">
                 <a:solidFill>
-                  <a:srgbClr val="FF0000"/>
+                  <a:srgbClr val="C00000"/>
                 </a:solidFill>
               </a:rPr>
               <a:t>: </a:t>
@@ -4794,7 +5235,7 @@
             <a:r>
               <a:rPr lang="zh-CN" altLang="en-US" sz="1000" dirty="0">
                 <a:solidFill>
-                  <a:srgbClr val="FF0000"/>
+                  <a:srgbClr val="C00000"/>
                 </a:solidFill>
               </a:rPr>
               <a:t>停止</a:t>
@@ -4816,7 +5257,7 @@
         </p:nvSpPr>
         <p:spPr>
           <a:xfrm>
-            <a:off x="5028085" y="690565"/>
+            <a:off x="4685184" y="982838"/>
             <a:ext cx="1706490" cy="200363"/>
           </a:xfrm>
           <a:prstGeom prst="borderCallout2">
@@ -4832,9 +5273,9 @@
           <a:solidFill>
             <a:schemeClr val="bg1"/>
           </a:solidFill>
-          <a:ln w="15875">
+          <a:ln w="12700">
             <a:solidFill>
-              <a:srgbClr val="FF0000"/>
+              <a:srgbClr val="C00000"/>
             </a:solidFill>
           </a:ln>
         </p:spPr>
@@ -4861,7 +5302,7 @@
             <a:r>
               <a:rPr lang="zh-CN" altLang="en-US" sz="1000" dirty="0">
                 <a:solidFill>
-                  <a:srgbClr val="FF0000"/>
+                  <a:srgbClr val="C00000"/>
                 </a:solidFill>
               </a:rPr>
               <a:t>网页标题。点击可输入网址</a:t>
@@ -4883,8 +5324,8 @@
         </p:nvSpPr>
         <p:spPr>
           <a:xfrm>
-            <a:off x="6680455" y="1179481"/>
-            <a:ext cx="861060" cy="507312"/>
+            <a:off x="6060941" y="1379377"/>
+            <a:ext cx="1018662" cy="489408"/>
           </a:xfrm>
           <a:prstGeom prst="borderCallout2">
             <a:avLst>
@@ -4892,16 +5333,16 @@
               <a:gd name="adj2" fmla="val 90802"/>
               <a:gd name="adj3" fmla="val -46393"/>
               <a:gd name="adj4" fmla="val 104878"/>
-              <a:gd name="adj5" fmla="val -145271"/>
-              <a:gd name="adj6" fmla="val 104570"/>
+              <a:gd name="adj5" fmla="val -133898"/>
+              <a:gd name="adj6" fmla="val 110034"/>
             </a:avLst>
           </a:prstGeom>
           <a:solidFill>
             <a:schemeClr val="bg1"/>
           </a:solidFill>
-          <a:ln w="15875">
+          <a:ln w="12700">
             <a:solidFill>
-              <a:srgbClr val="FF0000"/>
+              <a:srgbClr val="C00000"/>
             </a:solidFill>
           </a:ln>
         </p:spPr>
@@ -4925,10 +5366,11 @@
           <a:bodyPr lIns="72000" tIns="72000" rIns="72000" bIns="72000" rtlCol="0" anchor="ctr" anchorCtr="0"/>
           <a:lstStyle/>
           <a:p>
+            <a:pPr algn="ctr"/>
             <a:r>
               <a:rPr lang="zh-CN" altLang="en-US" sz="1000" dirty="0">
                 <a:solidFill>
-                  <a:srgbClr val="FF0000"/>
+                  <a:srgbClr val="C00000"/>
                 </a:solidFill>
               </a:rPr>
               <a:t>浏览时</a:t>
@@ -4936,7 +5378,7 @@
             <a:r>
               <a:rPr lang="en-US" altLang="zh-CN" sz="1000" dirty="0">
                 <a:solidFill>
-                  <a:srgbClr val="FF0000"/>
+                  <a:srgbClr val="C00000"/>
                 </a:solidFill>
               </a:rPr>
               <a:t>: </a:t>
@@ -4944,22 +5386,23 @@
             <a:r>
               <a:rPr lang="zh-CN" altLang="en-US" sz="1000" dirty="0">
                 <a:solidFill>
-                  <a:srgbClr val="FF0000"/>
+                  <a:srgbClr val="C00000"/>
                 </a:solidFill>
               </a:rPr>
               <a:t>刷新</a:t>
             </a:r>
             <a:endParaRPr lang="en-US" altLang="zh-CN" sz="1000" dirty="0">
               <a:solidFill>
-                <a:srgbClr val="FF0000"/>
+                <a:srgbClr val="C00000"/>
               </a:solidFill>
             </a:endParaRPr>
           </a:p>
           <a:p>
+            <a:pPr algn="ctr"/>
             <a:r>
               <a:rPr lang="zh-CN" altLang="en-US" sz="1000" dirty="0">
                 <a:solidFill>
-                  <a:srgbClr val="FF0000"/>
+                  <a:srgbClr val="C00000"/>
                 </a:solidFill>
               </a:rPr>
               <a:t>加载时</a:t>
@@ -4967,7 +5410,7 @@
             <a:r>
               <a:rPr lang="en-US" altLang="zh-CN" sz="1000" dirty="0">
                 <a:solidFill>
-                  <a:srgbClr val="FF0000"/>
+                  <a:srgbClr val="C00000"/>
                 </a:solidFill>
               </a:rPr>
               <a:t>: </a:t>
@@ -4975,22 +5418,23 @@
             <a:r>
               <a:rPr lang="zh-CN" altLang="en-US" sz="1000" dirty="0">
                 <a:solidFill>
-                  <a:srgbClr val="FF0000"/>
+                  <a:srgbClr val="C00000"/>
                 </a:solidFill>
               </a:rPr>
               <a:t>停止</a:t>
             </a:r>
             <a:endParaRPr lang="en-US" altLang="zh-CN" sz="1000" dirty="0">
               <a:solidFill>
-                <a:srgbClr val="FF0000"/>
+                <a:srgbClr val="C00000"/>
               </a:solidFill>
             </a:endParaRPr>
           </a:p>
           <a:p>
+            <a:pPr algn="ctr"/>
             <a:r>
               <a:rPr lang="zh-CN" altLang="en-US" sz="1000" dirty="0">
                 <a:solidFill>
-                  <a:srgbClr val="FF0000"/>
+                  <a:srgbClr val="C00000"/>
                 </a:solidFill>
               </a:rPr>
               <a:t>输入时</a:t>
@@ -4998,7 +5442,7 @@
             <a:r>
               <a:rPr lang="en-US" altLang="zh-CN" sz="1000" dirty="0">
                 <a:solidFill>
-                  <a:srgbClr val="FF0000"/>
+                  <a:srgbClr val="C00000"/>
                 </a:solidFill>
               </a:rPr>
               <a:t>: </a:t>
@@ -5006,7 +5450,7 @@
             <a:r>
               <a:rPr lang="zh-CN" altLang="en-US" sz="1000" dirty="0">
                 <a:solidFill>
-                  <a:srgbClr val="FF0000"/>
+                  <a:srgbClr val="C00000"/>
                 </a:solidFill>
               </a:rPr>
               <a:t>打开</a:t>
@@ -5014,12 +5458,92 @@
           </a:p>
         </p:txBody>
       </p:sp>
+      <p:sp>
+        <p:nvSpPr>
+          <p:cNvPr id="39" name="文本框 38">
+            <a:extLst>
+              <a:ext uri="{FF2B5EF4-FFF2-40B4-BE49-F238E27FC236}">
+                <a16:creationId xmlns:a16="http://schemas.microsoft.com/office/drawing/2014/main" id="{ECB87BF8-6EFF-80D5-3D5F-30988FB6F810}"/>
+              </a:ext>
+            </a:extLst>
+          </p:cNvPr>
+          <p:cNvSpPr txBox="1"/>
+          <p:nvPr/>
+        </p:nvSpPr>
+        <p:spPr>
+          <a:xfrm>
+            <a:off x="1757680" y="6345184"/>
+            <a:ext cx="1066800" cy="276999"/>
+          </a:xfrm>
+          <a:prstGeom prst="rect">
+            <a:avLst/>
+          </a:prstGeom>
+          <a:noFill/>
+        </p:spPr>
+        <p:txBody>
+          <a:bodyPr wrap="square" rtlCol="0">
+            <a:spAutoFit/>
+          </a:bodyPr>
+          <a:lstStyle/>
+          <a:p>
+            <a:pPr algn="ctr"/>
+            <a:r>
+              <a:rPr lang="en-US" altLang="zh-CN" sz="1200" b="1" dirty="0"/>
+              <a:t>1.</a:t>
+            </a:r>
+            <a:r>
+              <a:rPr lang="zh-CN" altLang="en-US" sz="1200" b="1" dirty="0"/>
+              <a:t>程序主界面</a:t>
+            </a:r>
+          </a:p>
+        </p:txBody>
+      </p:sp>
+      <p:sp>
+        <p:nvSpPr>
+          <p:cNvPr id="41" name="文本框 40">
+            <a:extLst>
+              <a:ext uri="{FF2B5EF4-FFF2-40B4-BE49-F238E27FC236}">
+                <a16:creationId xmlns:a16="http://schemas.microsoft.com/office/drawing/2014/main" id="{338CD1C2-C9D6-79E8-FF1D-2407797D379A}"/>
+              </a:ext>
+            </a:extLst>
+          </p:cNvPr>
+          <p:cNvSpPr txBox="1"/>
+          <p:nvPr/>
+        </p:nvSpPr>
+        <p:spPr>
+          <a:xfrm>
+            <a:off x="5357531" y="6339771"/>
+            <a:ext cx="1230875" cy="276999"/>
+          </a:xfrm>
+          <a:prstGeom prst="rect">
+            <a:avLst/>
+          </a:prstGeom>
+          <a:noFill/>
+        </p:spPr>
+        <p:txBody>
+          <a:bodyPr wrap="square" rtlCol="0">
+            <a:spAutoFit/>
+          </a:bodyPr>
+          <a:lstStyle/>
+          <a:p>
+            <a:pPr algn="ctr"/>
+            <a:r>
+              <a:rPr lang="en-US" altLang="zh-CN" sz="1200" b="1" dirty="0"/>
+              <a:t>2.</a:t>
+            </a:r>
+            <a:r>
+              <a:rPr lang="zh-CN" altLang="en-US" sz="1200" b="1" dirty="0"/>
+              <a:t>界面元素说明</a:t>
+            </a:r>
+          </a:p>
+        </p:txBody>
+      </p:sp>
       <p:pic>
         <p:nvPicPr>
-          <p:cNvPr id="6" name="图片 5">
-            <a:extLst>
-              <a:ext uri="{FF2B5EF4-FFF2-40B4-BE49-F238E27FC236}">
-                <a16:creationId xmlns:a16="http://schemas.microsoft.com/office/drawing/2014/main" id="{E31B51F5-8A00-0E35-FC2D-1A2A88DD72FF}"/>
+          <p:cNvPr id="4" name="图片 3">
+            <a:extLst>
+              <a:ext uri="{FF2B5EF4-FFF2-40B4-BE49-F238E27FC236}">
+                <a16:creationId xmlns:a16="http://schemas.microsoft.com/office/drawing/2014/main" id="{F6DF5B51-23EF-9ED5-B073-C33C2DA3FA2F}"/>
               </a:ext>
             </a:extLst>
           </p:cNvPr>
@@ -5029,7 +5553,7 @@
           <p:nvPr/>
         </p:nvPicPr>
         <p:blipFill>
-          <a:blip r:embed="rId3">
+          <a:blip r:embed="rId4">
             <a:extLst>
               <a:ext uri="{28A0092B-C50C-407E-A947-70E740481C1C}">
                 <a14:useLocalDpi xmlns:a14="http://schemas.microsoft.com/office/drawing/2010/main" val="0"/>
@@ -5042,27 +5566,25 @@
         </p:blipFill>
         <p:spPr>
           <a:xfrm>
-            <a:off x="841761" y="148356"/>
-            <a:ext cx="3120569" cy="6176674"/>
+            <a:off x="875637" y="322284"/>
+            <a:ext cx="2787005" cy="6038510"/>
           </a:xfrm>
           <a:prstGeom prst="rect">
             <a:avLst/>
           </a:prstGeom>
           <a:ln>
             <a:solidFill>
-              <a:schemeClr val="tx2">
-                <a:lumMod val="50000"/>
-              </a:schemeClr>
+              <a:schemeClr val="tx1"/>
             </a:solidFill>
           </a:ln>
         </p:spPr>
       </p:pic>
       <p:sp>
         <p:nvSpPr>
-          <p:cNvPr id="39" name="文本框 38">
-            <a:extLst>
-              <a:ext uri="{FF2B5EF4-FFF2-40B4-BE49-F238E27FC236}">
-                <a16:creationId xmlns:a16="http://schemas.microsoft.com/office/drawing/2014/main" id="{ECB87BF8-6EFF-80D5-3D5F-30988FB6F810}"/>
+          <p:cNvPr id="8" name="文本框 7">
+            <a:extLst>
+              <a:ext uri="{FF2B5EF4-FFF2-40B4-BE49-F238E27FC236}">
+                <a16:creationId xmlns:a16="http://schemas.microsoft.com/office/drawing/2014/main" id="{83D53958-C8F2-FBF2-B6F2-EAEFF3B98BDF}"/>
               </a:ext>
             </a:extLst>
           </p:cNvPr>
@@ -5071,8 +5593,8 @@
         </p:nvSpPr>
         <p:spPr>
           <a:xfrm>
-            <a:off x="1757680" y="6432645"/>
-            <a:ext cx="1066800" cy="276999"/>
+            <a:off x="8946855" y="6339771"/>
+            <a:ext cx="1230876" cy="276999"/>
           </a:xfrm>
           <a:prstGeom prst="rect">
             <a:avLst/>
@@ -5087,48 +5609,295 @@
           <a:p>
             <a:pPr algn="ctr"/>
             <a:r>
+              <a:rPr lang="en-US" altLang="zh-CN" sz="1200" b="1" dirty="0"/>
+              <a:t>3.</a:t>
+            </a:r>
+            <a:r>
               <a:rPr lang="zh-CN" altLang="en-US" sz="1200" b="1" dirty="0"/>
-              <a:t>程序主界面</a:t>
-            </a:r>
-          </a:p>
-        </p:txBody>
-      </p:sp>
-      <p:sp>
-        <p:nvSpPr>
-          <p:cNvPr id="41" name="文本框 40">
-            <a:extLst>
-              <a:ext uri="{FF2B5EF4-FFF2-40B4-BE49-F238E27FC236}">
-                <a16:creationId xmlns:a16="http://schemas.microsoft.com/office/drawing/2014/main" id="{338CD1C2-C9D6-79E8-FF1D-2407797D379A}"/>
-              </a:ext>
-            </a:extLst>
-          </p:cNvPr>
-          <p:cNvSpPr txBox="1"/>
+              <a:t>浮动按钮</a:t>
+            </a:r>
+          </a:p>
+        </p:txBody>
+      </p:sp>
+      <p:cxnSp>
+        <p:nvCxnSpPr>
+          <p:cNvPr id="23" name="直接箭头连接符 22">
+            <a:extLst>
+              <a:ext uri="{FF2B5EF4-FFF2-40B4-BE49-F238E27FC236}">
+                <a16:creationId xmlns:a16="http://schemas.microsoft.com/office/drawing/2014/main" id="{A8142A7D-75CF-5085-7A26-64E4E180C5EA}"/>
+              </a:ext>
+            </a:extLst>
+          </p:cNvPr>
+          <p:cNvCxnSpPr>
+            <a:cxnSpLocks/>
+          </p:cNvCxnSpPr>
+          <p:nvPr/>
+        </p:nvCxnSpPr>
+        <p:spPr>
+          <a:xfrm flipH="1">
+            <a:off x="9612672" y="4718750"/>
+            <a:ext cx="309310" cy="0"/>
+          </a:xfrm>
+          <a:prstGeom prst="straightConnector1">
+            <a:avLst/>
+          </a:prstGeom>
+          <a:ln w="28575">
+            <a:solidFill>
+              <a:srgbClr val="C00000"/>
+            </a:solidFill>
+            <a:prstDash val="solid"/>
+            <a:tailEnd type="triangle"/>
+          </a:ln>
+        </p:spPr>
+        <p:style>
+          <a:lnRef idx="1">
+            <a:schemeClr val="accent1"/>
+          </a:lnRef>
+          <a:fillRef idx="0">
+            <a:schemeClr val="accent1"/>
+          </a:fillRef>
+          <a:effectRef idx="0">
+            <a:schemeClr val="accent1"/>
+          </a:effectRef>
+          <a:fontRef idx="minor">
+            <a:schemeClr val="tx1"/>
+          </a:fontRef>
+        </p:style>
+      </p:cxnSp>
+      <p:sp>
+        <p:nvSpPr>
+          <p:cNvPr id="24" name="标注: 弯曲线形 23">
+            <a:extLst>
+              <a:ext uri="{FF2B5EF4-FFF2-40B4-BE49-F238E27FC236}">
+                <a16:creationId xmlns:a16="http://schemas.microsoft.com/office/drawing/2014/main" id="{8FC3E542-1D88-E46A-043C-DB00DC23BD23}"/>
+              </a:ext>
+            </a:extLst>
+          </p:cNvPr>
+          <p:cNvSpPr/>
           <p:nvPr/>
         </p:nvSpPr>
         <p:spPr>
           <a:xfrm>
-            <a:off x="5449579" y="6427233"/>
-            <a:ext cx="1230875" cy="276999"/>
+            <a:off x="8360077" y="3346987"/>
+            <a:ext cx="1052464" cy="826029"/>
+          </a:xfrm>
+          <a:prstGeom prst="borderCallout2">
+            <a:avLst>
+              <a:gd name="adj1" fmla="val 101561"/>
+              <a:gd name="adj2" fmla="val 75635"/>
+              <a:gd name="adj3" fmla="val 128500"/>
+              <a:gd name="adj4" fmla="val 78586"/>
+              <a:gd name="adj5" fmla="val 161296"/>
+              <a:gd name="adj6" fmla="val 123970"/>
+            </a:avLst>
+          </a:prstGeom>
+          <a:solidFill>
+            <a:schemeClr val="bg1"/>
+          </a:solidFill>
+          <a:ln w="12700">
+            <a:solidFill>
+              <a:srgbClr val="C00000"/>
+            </a:solidFill>
+          </a:ln>
+        </p:spPr>
+        <p:style>
+          <a:lnRef idx="2">
+            <a:schemeClr val="accent1">
+              <a:shade val="50000"/>
+            </a:schemeClr>
+          </a:lnRef>
+          <a:fillRef idx="1">
+            <a:schemeClr val="accent1"/>
+          </a:fillRef>
+          <a:effectRef idx="0">
+            <a:schemeClr val="accent1"/>
+          </a:effectRef>
+          <a:fontRef idx="minor">
+            <a:schemeClr val="lt1"/>
+          </a:fontRef>
+        </p:style>
+        <p:txBody>
+          <a:bodyPr lIns="72000" tIns="72000" rIns="72000" bIns="72000" rtlCol="0" anchor="ctr" anchorCtr="0"/>
+          <a:lstStyle/>
+          <a:p>
+            <a:r>
+              <a:rPr lang="zh-CN" altLang="en-US" sz="1000" dirty="0">
+                <a:solidFill>
+                  <a:srgbClr val="C00000"/>
+                </a:solidFill>
+              </a:rPr>
+              <a:t>轻触浮动按钮并划出按钮边界，可实现上下左右翻页</a:t>
+            </a:r>
+          </a:p>
+        </p:txBody>
+      </p:sp>
+      <p:sp>
+        <p:nvSpPr>
+          <p:cNvPr id="25" name="标注: 弯曲线形 24">
+            <a:extLst>
+              <a:ext uri="{FF2B5EF4-FFF2-40B4-BE49-F238E27FC236}">
+                <a16:creationId xmlns:a16="http://schemas.microsoft.com/office/drawing/2014/main" id="{1BD3268C-F57D-2E20-3B71-E34DB8780A1B}"/>
+              </a:ext>
+            </a:extLst>
+          </p:cNvPr>
+          <p:cNvSpPr/>
+          <p:nvPr/>
+        </p:nvSpPr>
+        <p:spPr>
+          <a:xfrm>
+            <a:off x="9767327" y="2458282"/>
+            <a:ext cx="1100047" cy="883256"/>
+          </a:xfrm>
+          <a:prstGeom prst="borderCallout2">
+            <a:avLst>
+              <a:gd name="adj1" fmla="val 100357"/>
+              <a:gd name="adj2" fmla="val 67622"/>
+              <a:gd name="adj3" fmla="val 151863"/>
+              <a:gd name="adj4" fmla="val 59718"/>
+              <a:gd name="adj5" fmla="val 222479"/>
+              <a:gd name="adj6" fmla="val 26821"/>
+            </a:avLst>
+          </a:prstGeom>
+          <a:solidFill>
+            <a:schemeClr val="bg1"/>
+          </a:solidFill>
+          <a:ln w="12700">
+            <a:solidFill>
+              <a:srgbClr val="C00000"/>
+            </a:solidFill>
+          </a:ln>
+        </p:spPr>
+        <p:style>
+          <a:lnRef idx="2">
+            <a:schemeClr val="accent1">
+              <a:shade val="50000"/>
+            </a:schemeClr>
+          </a:lnRef>
+          <a:fillRef idx="1">
+            <a:schemeClr val="accent1"/>
+          </a:fillRef>
+          <a:effectRef idx="0">
+            <a:schemeClr val="accent1"/>
+          </a:effectRef>
+          <a:fontRef idx="minor">
+            <a:schemeClr val="lt1"/>
+          </a:fontRef>
+        </p:style>
+        <p:txBody>
+          <a:bodyPr lIns="72000" tIns="72000" rIns="72000" bIns="72000" rtlCol="0" anchor="ctr" anchorCtr="0"/>
+          <a:lstStyle/>
+          <a:p>
+            <a:r>
+              <a:rPr lang="zh-CN" altLang="en-US" sz="1000" dirty="0">
+                <a:solidFill>
+                  <a:srgbClr val="C00000"/>
+                </a:solidFill>
+              </a:rPr>
+              <a:t>浮动按钮：</a:t>
+            </a:r>
+            <a:endParaRPr lang="en-US" altLang="zh-CN" sz="1000" dirty="0">
+              <a:solidFill>
+                <a:srgbClr val="C00000"/>
+              </a:solidFill>
+            </a:endParaRPr>
+          </a:p>
+          <a:p>
+            <a:r>
+              <a:rPr lang="zh-CN" altLang="en-US" sz="1000" dirty="0">
+                <a:solidFill>
+                  <a:srgbClr val="C00000"/>
+                </a:solidFill>
+              </a:rPr>
+              <a:t>单击：上滚</a:t>
+            </a:r>
+            <a:endParaRPr lang="en-US" altLang="zh-CN" sz="1000" dirty="0">
+              <a:solidFill>
+                <a:srgbClr val="C00000"/>
+              </a:solidFill>
+            </a:endParaRPr>
+          </a:p>
+          <a:p>
+            <a:r>
+              <a:rPr lang="zh-CN" altLang="en-US" sz="1000" dirty="0">
+                <a:solidFill>
+                  <a:srgbClr val="C00000"/>
+                </a:solidFill>
+              </a:rPr>
+              <a:t>双击：自动滚动</a:t>
+            </a:r>
+            <a:endParaRPr lang="en-US" altLang="zh-CN" sz="1000" dirty="0">
+              <a:solidFill>
+                <a:srgbClr val="C00000"/>
+              </a:solidFill>
+            </a:endParaRPr>
+          </a:p>
+          <a:p>
+            <a:r>
+              <a:rPr lang="zh-CN" altLang="en-US" sz="1000" dirty="0">
+                <a:solidFill>
+                  <a:srgbClr val="C00000"/>
+                </a:solidFill>
+              </a:rPr>
+              <a:t>长按：拖动</a:t>
+            </a:r>
+            <a:endParaRPr lang="en-US" altLang="zh-CN" sz="1000" dirty="0">
+              <a:solidFill>
+                <a:srgbClr val="C00000"/>
+              </a:solidFill>
+            </a:endParaRPr>
+          </a:p>
+          <a:p>
+            <a:r>
+              <a:rPr lang="zh-CN" altLang="en-US" sz="1000" dirty="0">
+                <a:solidFill>
+                  <a:srgbClr val="C00000"/>
+                </a:solidFill>
+              </a:rPr>
+              <a:t>划动：翻页</a:t>
+            </a:r>
+          </a:p>
+        </p:txBody>
+      </p:sp>
+      <p:pic>
+        <p:nvPicPr>
+          <p:cNvPr id="22" name="图片 21">
+            <a:extLst>
+              <a:ext uri="{FF2B5EF4-FFF2-40B4-BE49-F238E27FC236}">
+                <a16:creationId xmlns:a16="http://schemas.microsoft.com/office/drawing/2014/main" id="{32B9A7C5-AF72-21FA-916E-2774E3141640}"/>
+              </a:ext>
+            </a:extLst>
+          </p:cNvPr>
+          <p:cNvPicPr>
+            <a:picLocks noChangeAspect="1"/>
+          </p:cNvPicPr>
+          <p:nvPr/>
+        </p:nvPicPr>
+        <p:blipFill>
+          <a:blip r:embed="rId5">
+            <a:extLst>
+              <a:ext uri="{28A0092B-C50C-407E-A947-70E740481C1C}">
+                <a14:useLocalDpi xmlns:a14="http://schemas.microsoft.com/office/drawing/2010/main" val="0"/>
+              </a:ext>
+            </a:extLst>
+          </a:blip>
+          <a:stretch>
+            <a:fillRect/>
+          </a:stretch>
+        </p:blipFill>
+        <p:spPr>
+          <a:xfrm>
+            <a:off x="9898447" y="4641262"/>
+            <a:ext cx="336647" cy="336647"/>
           </a:xfrm>
           <a:prstGeom prst="rect">
             <a:avLst/>
           </a:prstGeom>
           <a:noFill/>
+          <a:ln>
+            <a:noFill/>
+          </a:ln>
         </p:spPr>
-        <p:txBody>
-          <a:bodyPr wrap="square" rtlCol="0">
-            <a:spAutoFit/>
-          </a:bodyPr>
-          <a:lstStyle/>
-          <a:p>
-            <a:pPr algn="ctr"/>
-            <a:r>
-              <a:rPr lang="zh-CN" altLang="en-US" sz="1200" b="1" dirty="0"/>
-              <a:t>界面元素说明</a:t>
-            </a:r>
-          </a:p>
-        </p:txBody>
-      </p:sp>
+      </p:pic>
     </p:spTree>
     <p:extLst>
       <p:ext uri="{BB962C8B-B14F-4D97-AF65-F5344CB8AC3E}">
@@ -5159,12 +5928,92 @@
           <a:chExt cx="0" cy="0"/>
         </a:xfrm>
       </p:grpSpPr>
+      <p:sp>
+        <p:nvSpPr>
+          <p:cNvPr id="39" name="文本框 38">
+            <a:extLst>
+              <a:ext uri="{FF2B5EF4-FFF2-40B4-BE49-F238E27FC236}">
+                <a16:creationId xmlns:a16="http://schemas.microsoft.com/office/drawing/2014/main" id="{ECB87BF8-6EFF-80D5-3D5F-30988FB6F810}"/>
+              </a:ext>
+            </a:extLst>
+          </p:cNvPr>
+          <p:cNvSpPr txBox="1"/>
+          <p:nvPr/>
+        </p:nvSpPr>
+        <p:spPr>
+          <a:xfrm>
+            <a:off x="1737359" y="6351365"/>
+            <a:ext cx="1184303" cy="276999"/>
+          </a:xfrm>
+          <a:prstGeom prst="rect">
+            <a:avLst/>
+          </a:prstGeom>
+          <a:noFill/>
+        </p:spPr>
+        <p:txBody>
+          <a:bodyPr wrap="square" rtlCol="0">
+            <a:spAutoFit/>
+          </a:bodyPr>
+          <a:lstStyle/>
+          <a:p>
+            <a:pPr algn="ctr"/>
+            <a:r>
+              <a:rPr lang="en-US" altLang="zh-CN" sz="1200" b="1" dirty="0"/>
+              <a:t>4.</a:t>
+            </a:r>
+            <a:r>
+              <a:rPr lang="zh-CN" altLang="en-US" sz="1200" b="1" dirty="0"/>
+              <a:t>隐藏收藏夹</a:t>
+            </a:r>
+          </a:p>
+        </p:txBody>
+      </p:sp>
+      <p:sp>
+        <p:nvSpPr>
+          <p:cNvPr id="41" name="文本框 40">
+            <a:extLst>
+              <a:ext uri="{FF2B5EF4-FFF2-40B4-BE49-F238E27FC236}">
+                <a16:creationId xmlns:a16="http://schemas.microsoft.com/office/drawing/2014/main" id="{338CD1C2-C9D6-79E8-FF1D-2407797D379A}"/>
+              </a:ext>
+            </a:extLst>
+          </p:cNvPr>
+          <p:cNvSpPr txBox="1"/>
+          <p:nvPr/>
+        </p:nvSpPr>
+        <p:spPr>
+          <a:xfrm>
+            <a:off x="5459739" y="6356113"/>
+            <a:ext cx="1794059" cy="276999"/>
+          </a:xfrm>
+          <a:prstGeom prst="rect">
+            <a:avLst/>
+          </a:prstGeom>
+          <a:noFill/>
+        </p:spPr>
+        <p:txBody>
+          <a:bodyPr wrap="square" rtlCol="0">
+            <a:spAutoFit/>
+          </a:bodyPr>
+          <a:lstStyle/>
+          <a:p>
+            <a:pPr algn="ctr"/>
+            <a:r>
+              <a:rPr lang="en-US" altLang="zh-CN" sz="1200" b="1" dirty="0"/>
+              <a:t>5.Javascript</a:t>
+            </a:r>
+            <a:r>
+              <a:rPr lang="zh-CN" altLang="en-US" sz="1200" b="1" dirty="0"/>
+              <a:t>脚本注入</a:t>
+            </a:r>
+          </a:p>
+        </p:txBody>
+      </p:sp>
       <p:pic>
         <p:nvPicPr>
-          <p:cNvPr id="8" name="图片 7">
-            <a:extLst>
-              <a:ext uri="{FF2B5EF4-FFF2-40B4-BE49-F238E27FC236}">
-                <a16:creationId xmlns:a16="http://schemas.microsoft.com/office/drawing/2014/main" id="{BB5F65D0-4D03-8BF8-6FDC-1A53F332EE1D}"/>
+          <p:cNvPr id="6" name="图片 5">
+            <a:extLst>
+              <a:ext uri="{FF2B5EF4-FFF2-40B4-BE49-F238E27FC236}">
+                <a16:creationId xmlns:a16="http://schemas.microsoft.com/office/drawing/2014/main" id="{C955AC19-06C3-A4AB-6E8C-8C47734938EC}"/>
               </a:ext>
             </a:extLst>
           </p:cNvPr>
@@ -5187,17 +6036,15 @@
         </p:blipFill>
         <p:spPr>
           <a:xfrm>
-            <a:off x="689799" y="120470"/>
-            <a:ext cx="2930465" cy="6349340"/>
+            <a:off x="4841630" y="310449"/>
+            <a:ext cx="2786849" cy="6038172"/>
           </a:xfrm>
           <a:prstGeom prst="rect">
             <a:avLst/>
           </a:prstGeom>
           <a:ln>
             <a:solidFill>
-              <a:schemeClr val="tx2">
-                <a:lumMod val="50000"/>
-              </a:schemeClr>
+              <a:schemeClr val="tx1"/>
             </a:solidFill>
           </a:ln>
         </p:spPr>
@@ -5207,7 +6054,7 @@
           <p:cNvPr id="9" name="图片 8">
             <a:extLst>
               <a:ext uri="{FF2B5EF4-FFF2-40B4-BE49-F238E27FC236}">
-                <a16:creationId xmlns:a16="http://schemas.microsoft.com/office/drawing/2014/main" id="{08758F51-A26A-5536-62D7-98C0A449FEBE}"/>
+                <a16:creationId xmlns:a16="http://schemas.microsoft.com/office/drawing/2014/main" id="{528EB386-7C37-B805-E741-DE603ED823F6}"/>
               </a:ext>
             </a:extLst>
           </p:cNvPr>
@@ -5230,66 +6077,25 @@
         </p:blipFill>
         <p:spPr>
           <a:xfrm>
-            <a:off x="2919164" y="4009711"/>
-            <a:ext cx="407343" cy="407343"/>
+            <a:off x="885503" y="310449"/>
+            <a:ext cx="2786849" cy="6038173"/>
           </a:xfrm>
           <a:prstGeom prst="rect">
             <a:avLst/>
           </a:prstGeom>
-          <a:noFill/>
+          <a:ln>
+            <a:solidFill>
+              <a:schemeClr val="tx1"/>
+            </a:solidFill>
+          </a:ln>
         </p:spPr>
       </p:pic>
-      <p:cxnSp>
-        <p:nvCxnSpPr>
-          <p:cNvPr id="26" name="直接箭头连接符 25">
-            <a:extLst>
-              <a:ext uri="{FF2B5EF4-FFF2-40B4-BE49-F238E27FC236}">
-                <a16:creationId xmlns:a16="http://schemas.microsoft.com/office/drawing/2014/main" id="{9921817F-4C73-42BC-A363-ADB1CA477B44}"/>
-              </a:ext>
-            </a:extLst>
-          </p:cNvPr>
-          <p:cNvCxnSpPr>
-            <a:cxnSpLocks/>
-          </p:cNvCxnSpPr>
-          <p:nvPr/>
-        </p:nvCxnSpPr>
-        <p:spPr>
-          <a:xfrm flipH="1">
-            <a:off x="2662641" y="4116451"/>
-            <a:ext cx="309310" cy="0"/>
-          </a:xfrm>
-          <a:prstGeom prst="straightConnector1">
-            <a:avLst/>
-          </a:prstGeom>
-          <a:ln w="19050">
-            <a:solidFill>
-              <a:srgbClr val="FF0000"/>
-            </a:solidFill>
-            <a:prstDash val="sysDot"/>
-            <a:tailEnd type="triangle"/>
-          </a:ln>
-        </p:spPr>
-        <p:style>
-          <a:lnRef idx="1">
-            <a:schemeClr val="accent1"/>
-          </a:lnRef>
-          <a:fillRef idx="0">
-            <a:schemeClr val="accent1"/>
-          </a:fillRef>
-          <a:effectRef idx="0">
-            <a:schemeClr val="accent1"/>
-          </a:effectRef>
-          <a:fontRef idx="minor">
-            <a:schemeClr val="tx1"/>
-          </a:fontRef>
-        </p:style>
-      </p:cxnSp>
-      <p:sp>
-        <p:nvSpPr>
-          <p:cNvPr id="27" name="标注: 弯曲线形 26">
-            <a:extLst>
-              <a:ext uri="{FF2B5EF4-FFF2-40B4-BE49-F238E27FC236}">
-                <a16:creationId xmlns:a16="http://schemas.microsoft.com/office/drawing/2014/main" id="{F1290657-7C49-6099-2069-D1E969502A7F}"/>
+      <p:sp>
+        <p:nvSpPr>
+          <p:cNvPr id="19" name="标注: 弯曲线形 18">
+            <a:extLst>
+              <a:ext uri="{FF2B5EF4-FFF2-40B4-BE49-F238E27FC236}">
+                <a16:creationId xmlns:a16="http://schemas.microsoft.com/office/drawing/2014/main" id="{510CE099-146A-8CD1-E0A1-90BDBA4F0484}"/>
               </a:ext>
             </a:extLst>
           </p:cNvPr>
@@ -5298,25 +6104,25 @@
         </p:nvSpPr>
         <p:spPr>
           <a:xfrm>
-            <a:off x="788176" y="3839083"/>
-            <a:ext cx="1219200" cy="554736"/>
+            <a:off x="2329510" y="3429000"/>
+            <a:ext cx="1291035" cy="632898"/>
           </a:xfrm>
           <a:prstGeom prst="borderCallout2">
             <a:avLst>
-              <a:gd name="adj1" fmla="val 27784"/>
-              <a:gd name="adj2" fmla="val 100323"/>
-              <a:gd name="adj3" fmla="val 16762"/>
-              <a:gd name="adj4" fmla="val 127685"/>
-              <a:gd name="adj5" fmla="val 33509"/>
-              <a:gd name="adj6" fmla="val 148430"/>
+              <a:gd name="adj1" fmla="val 101561"/>
+              <a:gd name="adj2" fmla="val 93002"/>
+              <a:gd name="adj3" fmla="val 160291"/>
+              <a:gd name="adj4" fmla="val 91000"/>
+              <a:gd name="adj5" fmla="val 224887"/>
+              <a:gd name="adj6" fmla="val 78761"/>
             </a:avLst>
           </a:prstGeom>
           <a:solidFill>
             <a:schemeClr val="bg1"/>
           </a:solidFill>
-          <a:ln w="15875">
+          <a:ln w="12700">
             <a:solidFill>
-              <a:srgbClr val="FF0000"/>
+              <a:srgbClr val="C00000"/>
             </a:solidFill>
           </a:ln>
         </p:spPr>
@@ -5343,20 +6149,36 @@
             <a:r>
               <a:rPr lang="zh-CN" altLang="en-US" sz="1000" dirty="0">
                 <a:solidFill>
-                  <a:srgbClr val="FF0000"/>
+                  <a:srgbClr val="C00000"/>
                 </a:solidFill>
               </a:rPr>
-              <a:t>轻触浮动按钮并滑出按钮边界，可实现上下左右翻页</a:t>
-            </a:r>
-          </a:p>
-        </p:txBody>
-      </p:sp>
-      <p:sp>
-        <p:nvSpPr>
-          <p:cNvPr id="28" name="标注: 弯曲线形 27">
-            <a:extLst>
-              <a:ext uri="{FF2B5EF4-FFF2-40B4-BE49-F238E27FC236}">
-                <a16:creationId xmlns:a16="http://schemas.microsoft.com/office/drawing/2014/main" id="{0577FA6A-8D97-74DC-4D54-A70B968E2609}"/>
+              <a:t>在显示隐藏列表时，点击菜单项切换显示</a:t>
+            </a:r>
+            <a:r>
+              <a:rPr lang="en-US" altLang="zh-CN" sz="1000" dirty="0">
+                <a:solidFill>
+                  <a:srgbClr val="C00000"/>
+                </a:solidFill>
+              </a:rPr>
+              <a:t>/</a:t>
+            </a:r>
+            <a:r>
+              <a:rPr lang="zh-CN" altLang="en-US" sz="1000" dirty="0">
+                <a:solidFill>
+                  <a:srgbClr val="C00000"/>
+                </a:solidFill>
+              </a:rPr>
+              <a:t>隐藏属性</a:t>
+            </a:r>
+          </a:p>
+        </p:txBody>
+      </p:sp>
+      <p:sp>
+        <p:nvSpPr>
+          <p:cNvPr id="20" name="标注: 弯曲线形 19">
+            <a:extLst>
+              <a:ext uri="{FF2B5EF4-FFF2-40B4-BE49-F238E27FC236}">
+                <a16:creationId xmlns:a16="http://schemas.microsoft.com/office/drawing/2014/main" id="{562781F9-AE1C-A3A0-AD50-4F0D2D2A9026}"/>
               </a:ext>
             </a:extLst>
           </p:cNvPr>
@@ -5365,25 +6187,25 @@
         </p:nvSpPr>
         <p:spPr>
           <a:xfrm>
-            <a:off x="792851" y="2376481"/>
-            <a:ext cx="1874515" cy="1051555"/>
+            <a:off x="2093290" y="1592580"/>
+            <a:ext cx="1291035" cy="259080"/>
           </a:xfrm>
           <a:prstGeom prst="borderCallout2">
             <a:avLst>
-              <a:gd name="adj1" fmla="val 27784"/>
-              <a:gd name="adj2" fmla="val 100323"/>
-              <a:gd name="adj3" fmla="val 32871"/>
-              <a:gd name="adj4" fmla="val 106639"/>
-              <a:gd name="adj5" fmla="val 74315"/>
-              <a:gd name="adj6" fmla="val 117188"/>
+              <a:gd name="adj1" fmla="val 104502"/>
+              <a:gd name="adj2" fmla="val 65261"/>
+              <a:gd name="adj3" fmla="val 222056"/>
+              <a:gd name="adj4" fmla="val 59718"/>
+              <a:gd name="adj5" fmla="val 383710"/>
+              <a:gd name="adj6" fmla="val 24066"/>
             </a:avLst>
           </a:prstGeom>
           <a:solidFill>
             <a:schemeClr val="bg1"/>
           </a:solidFill>
-          <a:ln w="15875">
+          <a:ln w="12700">
             <a:solidFill>
-              <a:srgbClr val="FF0000"/>
+              <a:srgbClr val="C00000"/>
             </a:solidFill>
           </a:ln>
         </p:spPr>
@@ -5407,110 +6229,23 @@
           <a:bodyPr lIns="72000" tIns="72000" rIns="72000" bIns="72000" rtlCol="0" anchor="ctr" anchorCtr="0"/>
           <a:lstStyle/>
           <a:p>
-            <a:pPr marL="171450" indent="-171450">
-              <a:buFont typeface="Arial" panose="020B0604020202020204" pitchFamily="34" charset="0"/>
-              <a:buChar char="•"/>
-            </a:pPr>
             <a:r>
               <a:rPr lang="zh-CN" altLang="en-US" sz="1000" dirty="0">
                 <a:solidFill>
-                  <a:srgbClr val="FF0000"/>
+                  <a:srgbClr val="C00000"/>
                 </a:solidFill>
               </a:rPr>
-              <a:t>轻触浮动按钮并向上滑动一段距离至轻微震动，触发网页自动滚动</a:t>
-            </a:r>
-            <a:endParaRPr lang="en-US" altLang="zh-CN" sz="1000" dirty="0">
-              <a:solidFill>
-                <a:srgbClr val="FF0000"/>
-              </a:solidFill>
-            </a:endParaRPr>
-          </a:p>
-          <a:p>
-            <a:pPr marL="171450" indent="-171450">
-              <a:buFont typeface="Arial" panose="020B0604020202020204" pitchFamily="34" charset="0"/>
-              <a:buChar char="•"/>
-            </a:pPr>
-            <a:r>
-              <a:rPr lang="zh-CN" altLang="en-US" sz="1000" dirty="0">
-                <a:solidFill>
-                  <a:srgbClr val="FF0000"/>
-                </a:solidFill>
-              </a:rPr>
-              <a:t>再次点击浮动按钮停止滚动</a:t>
-            </a:r>
-            <a:endParaRPr lang="en-US" altLang="zh-CN" sz="1000" dirty="0">
-              <a:solidFill>
-                <a:srgbClr val="FF0000"/>
-              </a:solidFill>
-            </a:endParaRPr>
-          </a:p>
-          <a:p>
-            <a:pPr marL="171450" indent="-171450">
-              <a:buFont typeface="Arial" panose="020B0604020202020204" pitchFamily="34" charset="0"/>
-              <a:buChar char="•"/>
-            </a:pPr>
-            <a:r>
-              <a:rPr lang="zh-CN" altLang="en-US" sz="1000" dirty="0">
-                <a:solidFill>
-                  <a:srgbClr val="FF0000"/>
-                </a:solidFill>
-              </a:rPr>
-              <a:t>自动滚动时可调速，调至负值时网页反向滚动</a:t>
-            </a:r>
-          </a:p>
-        </p:txBody>
-      </p:sp>
-      <p:cxnSp>
-        <p:nvCxnSpPr>
-          <p:cNvPr id="29" name="直接箭头连接符 28">
-            <a:extLst>
-              <a:ext uri="{FF2B5EF4-FFF2-40B4-BE49-F238E27FC236}">
-                <a16:creationId xmlns:a16="http://schemas.microsoft.com/office/drawing/2014/main" id="{69E3508A-FC81-2450-D5F3-18CE802DDD61}"/>
-              </a:ext>
-            </a:extLst>
-          </p:cNvPr>
-          <p:cNvCxnSpPr>
-            <a:cxnSpLocks/>
-          </p:cNvCxnSpPr>
-          <p:nvPr/>
-        </p:nvCxnSpPr>
-        <p:spPr>
-          <a:xfrm flipV="1">
-            <a:off x="3069675" y="2825868"/>
-            <a:ext cx="0" cy="1056522"/>
-          </a:xfrm>
-          <a:prstGeom prst="straightConnector1">
-            <a:avLst/>
-          </a:prstGeom>
-          <a:ln w="19050">
-            <a:solidFill>
-              <a:srgbClr val="FF0000"/>
-            </a:solidFill>
-            <a:prstDash val="sysDot"/>
-            <a:tailEnd type="triangle" w="lg" len="med"/>
-          </a:ln>
-        </p:spPr>
-        <p:style>
-          <a:lnRef idx="1">
-            <a:schemeClr val="accent1"/>
-          </a:lnRef>
-          <a:fillRef idx="0">
-            <a:schemeClr val="accent1"/>
-          </a:fillRef>
-          <a:effectRef idx="0">
-            <a:schemeClr val="accent1"/>
-          </a:effectRef>
-          <a:fontRef idx="minor">
-            <a:schemeClr val="tx1"/>
-          </a:fontRef>
-        </p:style>
-      </p:cxnSp>
-      <p:sp>
-        <p:nvSpPr>
-          <p:cNvPr id="36" name="圆: 空心 35">
-            <a:extLst>
-              <a:ext uri="{FF2B5EF4-FFF2-40B4-BE49-F238E27FC236}">
-                <a16:creationId xmlns:a16="http://schemas.microsoft.com/office/drawing/2014/main" id="{93C54928-A7CA-A2FA-12A9-9A9857C83819}"/>
+              <a:t>双击显示隐藏的书签</a:t>
+            </a:r>
+          </a:p>
+        </p:txBody>
+      </p:sp>
+      <p:sp>
+        <p:nvSpPr>
+          <p:cNvPr id="21" name="标注: 弯曲线形 20">
+            <a:extLst>
+              <a:ext uri="{FF2B5EF4-FFF2-40B4-BE49-F238E27FC236}">
+                <a16:creationId xmlns:a16="http://schemas.microsoft.com/office/drawing/2014/main" id="{92664D8E-9383-3103-E205-7E90DCB32F99}"/>
               </a:ext>
             </a:extLst>
           </p:cNvPr>
@@ -5519,16 +6254,25 @@
         </p:nvSpPr>
         <p:spPr>
           <a:xfrm>
-            <a:off x="3023005" y="3167433"/>
-            <a:ext cx="93341" cy="95251"/>
+            <a:off x="1925320" y="1584960"/>
+            <a:ext cx="1625600" cy="259080"/>
           </a:xfrm>
-          <a:prstGeom prst="donut">
-            <a:avLst/>
+          <a:prstGeom prst="borderCallout2">
+            <a:avLst>
+              <a:gd name="adj1" fmla="val 100090"/>
+              <a:gd name="adj2" fmla="val 37520"/>
+              <a:gd name="adj3" fmla="val 164703"/>
+              <a:gd name="adj4" fmla="val 18698"/>
+              <a:gd name="adj5" fmla="val 225768"/>
+              <a:gd name="adj6" fmla="val -11782"/>
+            </a:avLst>
           </a:prstGeom>
-          <a:noFill/>
-          <a:ln w="9525">
+          <a:solidFill>
+            <a:schemeClr val="bg1"/>
+          </a:solidFill>
+          <a:ln w="12700">
             <a:solidFill>
-              <a:srgbClr val="FF0000"/>
+              <a:srgbClr val="C00000"/>
             </a:solidFill>
           </a:ln>
         </p:spPr>
@@ -5549,556 +6293,24 @@
           </a:fontRef>
         </p:style>
         <p:txBody>
-          <a:bodyPr rtlCol="0" anchor="ctr"/>
-          <a:lstStyle/>
-          <a:p>
-            <a:pPr algn="ctr"/>
-            <a:endParaRPr lang="zh-CN" altLang="en-US">
-              <a:solidFill>
-                <a:schemeClr val="tx1"/>
-              </a:solidFill>
-            </a:endParaRPr>
-          </a:p>
-        </p:txBody>
-      </p:sp>
-      <p:sp>
-        <p:nvSpPr>
-          <p:cNvPr id="38" name="标注: 弯曲线形 37">
-            <a:extLst>
-              <a:ext uri="{FF2B5EF4-FFF2-40B4-BE49-F238E27FC236}">
-                <a16:creationId xmlns:a16="http://schemas.microsoft.com/office/drawing/2014/main" id="{043B3786-7AD9-B281-5EBE-A5A19A3002EC}"/>
-              </a:ext>
-            </a:extLst>
-          </p:cNvPr>
-          <p:cNvSpPr/>
-          <p:nvPr/>
-        </p:nvSpPr>
-        <p:spPr>
-          <a:xfrm>
-            <a:off x="1480970" y="4785248"/>
-            <a:ext cx="1181671" cy="537148"/>
-          </a:xfrm>
-          <a:prstGeom prst="borderCallout2">
-            <a:avLst>
-              <a:gd name="adj1" fmla="val 27784"/>
-              <a:gd name="adj2" fmla="val 100323"/>
-              <a:gd name="adj3" fmla="val 28111"/>
-              <a:gd name="adj4" fmla="val 100924"/>
-              <a:gd name="adj5" fmla="val 59103"/>
-              <a:gd name="adj6" fmla="val 100506"/>
-            </a:avLst>
-          </a:prstGeom>
-          <a:solidFill>
-            <a:schemeClr val="bg1"/>
-          </a:solidFill>
-          <a:ln w="15875">
-            <a:solidFill>
-              <a:srgbClr val="FF0000"/>
-            </a:solidFill>
-          </a:ln>
-        </p:spPr>
-        <p:style>
-          <a:lnRef idx="2">
-            <a:schemeClr val="accent1">
-              <a:shade val="50000"/>
-            </a:schemeClr>
-          </a:lnRef>
-          <a:fillRef idx="1">
-            <a:schemeClr val="accent1"/>
-          </a:fillRef>
-          <a:effectRef idx="0">
-            <a:schemeClr val="accent1"/>
-          </a:effectRef>
-          <a:fontRef idx="minor">
-            <a:schemeClr val="lt1"/>
-          </a:fontRef>
-        </p:style>
-        <p:txBody>
           <a:bodyPr lIns="72000" tIns="72000" rIns="72000" bIns="72000" rtlCol="0" anchor="ctr" anchorCtr="0"/>
           <a:lstStyle/>
           <a:p>
             <a:r>
               <a:rPr lang="zh-CN" altLang="en-US" sz="1000" dirty="0">
                 <a:solidFill>
-                  <a:srgbClr val="FF0000"/>
+                  <a:srgbClr val="C00000"/>
                 </a:solidFill>
               </a:rPr>
-              <a:t>长按浮动按钮至轻微震动，可移动按钮到任意位置</a:t>
-            </a:r>
-          </a:p>
-        </p:txBody>
-      </p:sp>
-      <p:pic>
-        <p:nvPicPr>
-          <p:cNvPr id="4" name="图片 3">
-            <a:extLst>
-              <a:ext uri="{FF2B5EF4-FFF2-40B4-BE49-F238E27FC236}">
-                <a16:creationId xmlns:a16="http://schemas.microsoft.com/office/drawing/2014/main" id="{87EB5C88-C5B4-57BF-62E9-DE0A8FC69B44}"/>
-              </a:ext>
-            </a:extLst>
-          </p:cNvPr>
-          <p:cNvPicPr>
-            <a:picLocks noChangeAspect="1"/>
-          </p:cNvPicPr>
-          <p:nvPr/>
-        </p:nvPicPr>
-        <p:blipFill>
-          <a:blip r:embed="rId4">
-            <a:extLst>
-              <a:ext uri="{28A0092B-C50C-407E-A947-70E740481C1C}">
-                <a14:useLocalDpi xmlns:a14="http://schemas.microsoft.com/office/drawing/2010/main" val="0"/>
-              </a:ext>
-            </a:extLst>
-          </a:blip>
-          <a:stretch>
-            <a:fillRect/>
-          </a:stretch>
-        </p:blipFill>
-        <p:spPr>
-          <a:xfrm>
-            <a:off x="4034251" y="120470"/>
-            <a:ext cx="2930466" cy="6349343"/>
-          </a:xfrm>
-          <a:prstGeom prst="rect">
-            <a:avLst/>
-          </a:prstGeom>
-          <a:ln>
-            <a:solidFill>
-              <a:schemeClr val="tx2">
-                <a:lumMod val="50000"/>
-              </a:schemeClr>
-            </a:solidFill>
-          </a:ln>
-        </p:spPr>
-      </p:pic>
-      <p:pic>
-        <p:nvPicPr>
-          <p:cNvPr id="7" name="图片 6">
-            <a:extLst>
-              <a:ext uri="{FF2B5EF4-FFF2-40B4-BE49-F238E27FC236}">
-                <a16:creationId xmlns:a16="http://schemas.microsoft.com/office/drawing/2014/main" id="{49662BD0-4C59-EB4B-3AD6-368BA3FD4E4D}"/>
-              </a:ext>
-            </a:extLst>
-          </p:cNvPr>
-          <p:cNvPicPr>
-            <a:picLocks noChangeAspect="1"/>
-          </p:cNvPicPr>
-          <p:nvPr/>
-        </p:nvPicPr>
-        <p:blipFill>
-          <a:blip r:embed="rId5">
-            <a:extLst>
-              <a:ext uri="{28A0092B-C50C-407E-A947-70E740481C1C}">
-                <a14:useLocalDpi xmlns:a14="http://schemas.microsoft.com/office/drawing/2010/main" val="0"/>
-              </a:ext>
-            </a:extLst>
-          </a:blip>
-          <a:stretch>
-            <a:fillRect/>
-          </a:stretch>
-        </p:blipFill>
-        <p:spPr>
-          <a:xfrm>
-            <a:off x="7928061" y="120470"/>
-            <a:ext cx="3024048" cy="5964094"/>
-          </a:xfrm>
-          <a:prstGeom prst="rect">
-            <a:avLst/>
-          </a:prstGeom>
-          <a:ln>
-            <a:solidFill>
-              <a:schemeClr val="bg2">
-                <a:lumMod val="10000"/>
-              </a:schemeClr>
-            </a:solidFill>
-          </a:ln>
-        </p:spPr>
-      </p:pic>
-      <p:sp>
-        <p:nvSpPr>
-          <p:cNvPr id="19" name="标注: 弯曲线形 18">
-            <a:extLst>
-              <a:ext uri="{FF2B5EF4-FFF2-40B4-BE49-F238E27FC236}">
-                <a16:creationId xmlns:a16="http://schemas.microsoft.com/office/drawing/2014/main" id="{D9936C9C-3E6D-DE45-2555-23827546EBCA}"/>
-              </a:ext>
-            </a:extLst>
-          </p:cNvPr>
-          <p:cNvSpPr/>
-          <p:nvPr/>
-        </p:nvSpPr>
-        <p:spPr>
-          <a:xfrm>
-            <a:off x="8074175" y="964119"/>
-            <a:ext cx="2110901" cy="729574"/>
-          </a:xfrm>
-          <a:prstGeom prst="borderCallout2">
-            <a:avLst>
-              <a:gd name="adj1" fmla="val 99784"/>
-              <a:gd name="adj2" fmla="val 94332"/>
-              <a:gd name="adj3" fmla="val 140871"/>
-              <a:gd name="adj4" fmla="val 90510"/>
-              <a:gd name="adj5" fmla="val 158315"/>
-              <a:gd name="adj6" fmla="val 57280"/>
-            </a:avLst>
-          </a:prstGeom>
-          <a:solidFill>
-            <a:schemeClr val="bg1"/>
-          </a:solidFill>
-          <a:ln w="15875">
-            <a:solidFill>
-              <a:srgbClr val="FF0000"/>
-            </a:solidFill>
-          </a:ln>
-        </p:spPr>
-        <p:style>
-          <a:lnRef idx="2">
-            <a:schemeClr val="accent1">
-              <a:shade val="50000"/>
-            </a:schemeClr>
-          </a:lnRef>
-          <a:fillRef idx="1">
-            <a:schemeClr val="accent1"/>
-          </a:fillRef>
-          <a:effectRef idx="0">
-            <a:schemeClr val="accent1"/>
-          </a:effectRef>
-          <a:fontRef idx="minor">
-            <a:schemeClr val="lt1"/>
-          </a:fontRef>
-        </p:style>
-        <p:txBody>
-          <a:bodyPr lIns="72000" tIns="72000" rIns="72000" bIns="72000" rtlCol="0" anchor="ctr" anchorCtr="0"/>
-          <a:lstStyle/>
-          <a:p>
-            <a:pPr marL="171450" indent="-171450">
-              <a:buFont typeface="Arial" panose="020B0604020202020204" pitchFamily="34" charset="0"/>
-              <a:buChar char="•"/>
-            </a:pPr>
-            <a:r>
-              <a:rPr lang="zh-CN" altLang="en-US" sz="1000" dirty="0">
-                <a:solidFill>
-                  <a:srgbClr val="FF0000"/>
-                </a:solidFill>
-              </a:rPr>
-              <a:t>长按网页任意位置可弹出菜单，根据长按内容关联不同菜单项</a:t>
-            </a:r>
-            <a:endParaRPr lang="en-US" altLang="zh-CN" sz="1000" dirty="0">
-              <a:solidFill>
-                <a:srgbClr val="FF0000"/>
-              </a:solidFill>
-            </a:endParaRPr>
-          </a:p>
-          <a:p>
-            <a:pPr marL="171450" indent="-171450">
-              <a:buFont typeface="Arial" panose="020B0604020202020204" pitchFamily="34" charset="0"/>
-              <a:buChar char="•"/>
-            </a:pPr>
-            <a:r>
-              <a:rPr lang="en-US" altLang="zh-CN" sz="1000" dirty="0">
-                <a:solidFill>
-                  <a:srgbClr val="FF0000"/>
-                </a:solidFill>
-              </a:rPr>
-              <a:t>2</a:t>
-            </a:r>
-            <a:r>
-              <a:rPr lang="zh-CN" altLang="en-US" sz="1000" dirty="0">
-                <a:solidFill>
-                  <a:srgbClr val="FF0000"/>
-                </a:solidFill>
-              </a:rPr>
-              <a:t>级菜单实现多种网页保存和分享功能</a:t>
-            </a:r>
-          </a:p>
-        </p:txBody>
-      </p:sp>
-      <p:sp>
-        <p:nvSpPr>
-          <p:cNvPr id="20" name="标注: 弯曲线形 19">
-            <a:extLst>
-              <a:ext uri="{FF2B5EF4-FFF2-40B4-BE49-F238E27FC236}">
-                <a16:creationId xmlns:a16="http://schemas.microsoft.com/office/drawing/2014/main" id="{1DFC88B4-22E6-E428-FAC5-06B797240D45}"/>
-              </a:ext>
-            </a:extLst>
-          </p:cNvPr>
-          <p:cNvSpPr/>
-          <p:nvPr/>
-        </p:nvSpPr>
-        <p:spPr>
-          <a:xfrm>
-            <a:off x="8074175" y="4234654"/>
-            <a:ext cx="1200207" cy="1270129"/>
-          </a:xfrm>
-          <a:prstGeom prst="borderCallout2">
-            <a:avLst>
-              <a:gd name="adj1" fmla="val 99784"/>
-              <a:gd name="adj2" fmla="val 94332"/>
-              <a:gd name="adj3" fmla="val 99671"/>
-              <a:gd name="adj4" fmla="val 76625"/>
-              <a:gd name="adj5" fmla="val 100125"/>
-              <a:gd name="adj6" fmla="val 33820"/>
-            </a:avLst>
-          </a:prstGeom>
-          <a:solidFill>
-            <a:schemeClr val="bg1"/>
-          </a:solidFill>
-          <a:ln w="15875">
-            <a:solidFill>
-              <a:srgbClr val="FF0000"/>
-            </a:solidFill>
-          </a:ln>
-        </p:spPr>
-        <p:style>
-          <a:lnRef idx="2">
-            <a:schemeClr val="accent1">
-              <a:shade val="50000"/>
-            </a:schemeClr>
-          </a:lnRef>
-          <a:fillRef idx="1">
-            <a:schemeClr val="accent1"/>
-          </a:fillRef>
-          <a:effectRef idx="0">
-            <a:schemeClr val="accent1"/>
-          </a:effectRef>
-          <a:fontRef idx="minor">
-            <a:schemeClr val="lt1"/>
-          </a:fontRef>
-        </p:style>
-        <p:txBody>
-          <a:bodyPr lIns="72000" tIns="72000" rIns="72000" bIns="72000" rtlCol="0" anchor="ctr" anchorCtr="0"/>
-          <a:lstStyle/>
-          <a:p>
-            <a:r>
-              <a:rPr lang="zh-CN" altLang="en-US" sz="1000" dirty="0">
-                <a:solidFill>
-                  <a:srgbClr val="FF0000"/>
-                </a:solidFill>
-              </a:rPr>
-              <a:t>长按菜单配合浮动按钮，可仅用一个手指，以最少的移动距离，即可实现网页的滚动、翻页、打开、关闭、刷新等常用功能</a:t>
-            </a:r>
-            <a:endParaRPr lang="en-US" altLang="zh-CN" sz="1000" dirty="0">
-              <a:solidFill>
-                <a:srgbClr val="FF0000"/>
-              </a:solidFill>
-            </a:endParaRPr>
-          </a:p>
-        </p:txBody>
-      </p:sp>
-      <p:sp>
-        <p:nvSpPr>
-          <p:cNvPr id="21" name="文本框 20">
-            <a:extLst>
-              <a:ext uri="{FF2B5EF4-FFF2-40B4-BE49-F238E27FC236}">
-                <a16:creationId xmlns:a16="http://schemas.microsoft.com/office/drawing/2014/main" id="{53F7BDEB-D6A8-EA6B-EB96-8AC6E4436814}"/>
-              </a:ext>
-            </a:extLst>
-          </p:cNvPr>
-          <p:cNvSpPr txBox="1"/>
-          <p:nvPr/>
-        </p:nvSpPr>
-        <p:spPr>
-          <a:xfrm>
-            <a:off x="1480970" y="6430979"/>
-            <a:ext cx="1066800" cy="276999"/>
-          </a:xfrm>
-          <a:prstGeom prst="rect">
-            <a:avLst/>
-          </a:prstGeom>
-          <a:noFill/>
-        </p:spPr>
-        <p:txBody>
-          <a:bodyPr wrap="square" rtlCol="0">
-            <a:spAutoFit/>
-          </a:bodyPr>
-          <a:lstStyle/>
-          <a:p>
-            <a:pPr algn="ctr"/>
-            <a:r>
-              <a:rPr lang="zh-CN" altLang="en-US" sz="1200" b="1" dirty="0"/>
-              <a:t>浮动按钮</a:t>
-            </a:r>
-          </a:p>
-        </p:txBody>
-      </p:sp>
-      <p:sp>
-        <p:nvSpPr>
-          <p:cNvPr id="22" name="文本框 21">
-            <a:extLst>
-              <a:ext uri="{FF2B5EF4-FFF2-40B4-BE49-F238E27FC236}">
-                <a16:creationId xmlns:a16="http://schemas.microsoft.com/office/drawing/2014/main" id="{B8235FF4-47C0-298F-7288-7F1A2E2AF608}"/>
-              </a:ext>
-            </a:extLst>
-          </p:cNvPr>
-          <p:cNvSpPr txBox="1"/>
-          <p:nvPr/>
-        </p:nvSpPr>
-        <p:spPr>
-          <a:xfrm>
-            <a:off x="4793130" y="6460531"/>
-            <a:ext cx="1617830" cy="276999"/>
-          </a:xfrm>
-          <a:prstGeom prst="rect">
-            <a:avLst/>
-          </a:prstGeom>
-          <a:noFill/>
-        </p:spPr>
-        <p:txBody>
-          <a:bodyPr wrap="square" rtlCol="0">
-            <a:spAutoFit/>
-          </a:bodyPr>
-          <a:lstStyle/>
-          <a:p>
-            <a:pPr algn="ctr"/>
-            <a:r>
-              <a:rPr lang="zh-CN" altLang="en-US" sz="1200" b="1" dirty="0"/>
-              <a:t>浮动按钮</a:t>
-            </a:r>
-            <a:r>
-              <a:rPr lang="en-US" altLang="zh-CN" sz="1200" b="1" dirty="0"/>
-              <a:t>-</a:t>
-            </a:r>
-            <a:r>
-              <a:rPr lang="zh-CN" altLang="en-US" sz="1200" b="1" dirty="0"/>
-              <a:t>自动滚动</a:t>
-            </a:r>
-          </a:p>
-        </p:txBody>
-      </p:sp>
-      <p:sp>
-        <p:nvSpPr>
-          <p:cNvPr id="23" name="文本框 22">
-            <a:extLst>
-              <a:ext uri="{FF2B5EF4-FFF2-40B4-BE49-F238E27FC236}">
-                <a16:creationId xmlns:a16="http://schemas.microsoft.com/office/drawing/2014/main" id="{1124026F-992F-9F67-D247-15E59C14C110}"/>
-              </a:ext>
-            </a:extLst>
-          </p:cNvPr>
-          <p:cNvSpPr txBox="1"/>
-          <p:nvPr/>
-        </p:nvSpPr>
-        <p:spPr>
-          <a:xfrm>
-            <a:off x="8812102" y="6321729"/>
-            <a:ext cx="1444094" cy="276999"/>
-          </a:xfrm>
-          <a:prstGeom prst="rect">
-            <a:avLst/>
-          </a:prstGeom>
-          <a:noFill/>
-        </p:spPr>
-        <p:txBody>
-          <a:bodyPr wrap="square" rtlCol="0">
-            <a:spAutoFit/>
-          </a:bodyPr>
-          <a:lstStyle/>
-          <a:p>
-            <a:pPr algn="ctr"/>
-            <a:r>
-              <a:rPr lang="zh-CN" altLang="en-US" sz="1200" b="1" dirty="0"/>
-              <a:t>长按弹出菜单</a:t>
-            </a:r>
-          </a:p>
-        </p:txBody>
-      </p:sp>
-      <p:sp>
-        <p:nvSpPr>
-          <p:cNvPr id="6" name="标注: 弯曲线形 5">
-            <a:extLst>
-              <a:ext uri="{FF2B5EF4-FFF2-40B4-BE49-F238E27FC236}">
-                <a16:creationId xmlns:a16="http://schemas.microsoft.com/office/drawing/2014/main" id="{05C97380-2472-3445-CEA0-159E8BEAD6BF}"/>
-              </a:ext>
-            </a:extLst>
-          </p:cNvPr>
-          <p:cNvSpPr/>
-          <p:nvPr/>
-        </p:nvSpPr>
-        <p:spPr>
-          <a:xfrm>
-            <a:off x="4236741" y="3568244"/>
-            <a:ext cx="1665513" cy="772259"/>
-          </a:xfrm>
-          <a:prstGeom prst="borderCallout2">
-            <a:avLst>
-              <a:gd name="adj1" fmla="val 27784"/>
-              <a:gd name="adj2" fmla="val 100323"/>
-              <a:gd name="adj3" fmla="val 39186"/>
-              <a:gd name="adj4" fmla="val 111763"/>
-              <a:gd name="adj5" fmla="val 126413"/>
-              <a:gd name="adj6" fmla="val 134024"/>
-            </a:avLst>
-          </a:prstGeom>
-          <a:solidFill>
-            <a:schemeClr val="bg1"/>
-          </a:solidFill>
-          <a:ln w="15875">
-            <a:solidFill>
-              <a:srgbClr val="FF0000"/>
-            </a:solidFill>
-          </a:ln>
-        </p:spPr>
-        <p:style>
-          <a:lnRef idx="2">
-            <a:schemeClr val="accent1">
-              <a:shade val="50000"/>
-            </a:schemeClr>
-          </a:lnRef>
-          <a:fillRef idx="1">
-            <a:schemeClr val="accent1"/>
-          </a:fillRef>
-          <a:effectRef idx="0">
-            <a:schemeClr val="accent1"/>
-          </a:effectRef>
-          <a:fontRef idx="minor">
-            <a:schemeClr val="lt1"/>
-          </a:fontRef>
-        </p:style>
-        <p:txBody>
-          <a:bodyPr lIns="72000" tIns="72000" rIns="72000" bIns="72000" rtlCol="0" anchor="ctr" anchorCtr="0"/>
-          <a:lstStyle/>
-          <a:p>
-            <a:pPr marL="171450" indent="-171450">
-              <a:buFont typeface="Arial" panose="020B0604020202020204" pitchFamily="34" charset="0"/>
-              <a:buChar char="•"/>
-            </a:pPr>
-            <a:r>
-              <a:rPr lang="zh-CN" altLang="en-US" sz="1000" dirty="0">
-                <a:solidFill>
-                  <a:srgbClr val="FF0000"/>
-                </a:solidFill>
-              </a:rPr>
-              <a:t>调速按钮。调至负值反向滚动</a:t>
-            </a:r>
-            <a:endParaRPr lang="en-US" altLang="zh-CN" sz="1000" dirty="0">
-              <a:solidFill>
-                <a:srgbClr val="FF0000"/>
-              </a:solidFill>
-            </a:endParaRPr>
-          </a:p>
-          <a:p>
-            <a:pPr marL="171450" indent="-171450">
-              <a:buFont typeface="Arial" panose="020B0604020202020204" pitchFamily="34" charset="0"/>
-              <a:buChar char="•"/>
-            </a:pPr>
-            <a:r>
-              <a:rPr lang="zh-CN" altLang="en-US" sz="1000" dirty="0">
-                <a:solidFill>
-                  <a:srgbClr val="FF0000"/>
-                </a:solidFill>
-              </a:rPr>
-              <a:t>自动滚动时，仍然可以同时操作浮动按钮实现翻页</a:t>
-            </a:r>
-            <a:endParaRPr lang="en-US" altLang="zh-CN" sz="1000" dirty="0">
-              <a:solidFill>
-                <a:srgbClr val="FF0000"/>
-              </a:solidFill>
-            </a:endParaRPr>
+              <a:t>双击标题显示隐藏的书签</a:t>
+            </a:r>
           </a:p>
         </p:txBody>
       </p:sp>
     </p:spTree>
     <p:extLst>
       <p:ext uri="{BB962C8B-B14F-4D97-AF65-F5344CB8AC3E}">
-        <p14:creationId xmlns:p14="http://schemas.microsoft.com/office/powerpoint/2010/main" val="3544642092"/>
+        <p14:creationId xmlns:p14="http://schemas.microsoft.com/office/powerpoint/2010/main" val="3266255870"/>
       </p:ext>
     </p:extLst>
   </p:cSld>

</xml_diff>

<commit_message>
KB homepage English version completed
</commit_message>
<xml_diff>
--- a/S3-02-Dev/KenBrowser/screenshots/KenBrowser-manual.pptx
+++ b/S3-02-Dev/KenBrowser/screenshots/KenBrowser-manual.pptx
@@ -7,6 +7,8 @@
   <p:sldIdLst>
     <p:sldId id="256" r:id="rId2"/>
     <p:sldId id="261" r:id="rId3"/>
+    <p:sldId id="262" r:id="rId4"/>
+    <p:sldId id="263" r:id="rId5"/>
   </p:sldIdLst>
   <p:sldSz cx="12192000" cy="6858000"/>
   <p:notesSz cx="6858000" cy="9144000"/>
@@ -118,7 +120,7 @@
   <pc:docChgLst>
     <pc:chgData name="ken zhao" userId="e96b2dde5c0d9c1f" providerId="LiveId" clId="{4B2407D2-4E5A-469E-8B22-9C965EE789F6}"/>
     <pc:docChg chg="undo custSel addSld delSld modSld sldOrd">
-      <pc:chgData name="ken zhao" userId="e96b2dde5c0d9c1f" providerId="LiveId" clId="{4B2407D2-4E5A-469E-8B22-9C965EE789F6}" dt="2023-08-15T10:39:25.511" v="785" actId="692"/>
+      <pc:chgData name="ken zhao" userId="e96b2dde5c0d9c1f" providerId="LiveId" clId="{4B2407D2-4E5A-469E-8B22-9C965EE789F6}" dt="2023-08-16T03:53:24.138" v="1642" actId="20577"/>
       <pc:docMkLst>
         <pc:docMk/>
       </pc:docMkLst>
@@ -508,6 +510,164 @@
             <ac:picMk id="9" creationId="{528EB386-7C37-B805-E741-DE603ED823F6}"/>
           </ac:picMkLst>
         </pc:picChg>
+      </pc:sldChg>
+      <pc:sldChg chg="modSp add mod ord setBg">
+        <pc:chgData name="ken zhao" userId="e96b2dde5c0d9c1f" providerId="LiveId" clId="{4B2407D2-4E5A-469E-8B22-9C965EE789F6}" dt="2023-08-16T03:50:54.609" v="1449" actId="14100"/>
+        <pc:sldMkLst>
+          <pc:docMk/>
+          <pc:sldMk cId="7805284" sldId="262"/>
+        </pc:sldMkLst>
+        <pc:spChg chg="mod">
+          <ac:chgData name="ken zhao" userId="e96b2dde5c0d9c1f" providerId="LiveId" clId="{4B2407D2-4E5A-469E-8B22-9C965EE789F6}" dt="2023-08-16T03:29:34.793" v="869" actId="1037"/>
+          <ac:spMkLst>
+            <pc:docMk/>
+            <pc:sldMk cId="7805284" sldId="262"/>
+            <ac:spMk id="8" creationId="{83D53958-C8F2-FBF2-B6F2-EAEFF3B98BDF}"/>
+          </ac:spMkLst>
+        </pc:spChg>
+        <pc:spChg chg="mod">
+          <ac:chgData name="ken zhao" userId="e96b2dde5c0d9c1f" providerId="LiveId" clId="{4B2407D2-4E5A-469E-8B22-9C965EE789F6}" dt="2023-08-16T03:40:47.426" v="1114" actId="14100"/>
+          <ac:spMkLst>
+            <pc:docMk/>
+            <pc:sldMk cId="7805284" sldId="262"/>
+            <ac:spMk id="10" creationId="{163B30DA-1326-2E28-3DDC-B2C081EC3C97}"/>
+          </ac:spMkLst>
+        </pc:spChg>
+        <pc:spChg chg="mod">
+          <ac:chgData name="ken zhao" userId="e96b2dde5c0d9c1f" providerId="LiveId" clId="{4B2407D2-4E5A-469E-8B22-9C965EE789F6}" dt="2023-08-16T03:40:54.119" v="1115" actId="14100"/>
+          <ac:spMkLst>
+            <pc:docMk/>
+            <pc:sldMk cId="7805284" sldId="262"/>
+            <ac:spMk id="11" creationId="{FD69B0D3-926B-E96C-8504-675697405197}"/>
+          </ac:spMkLst>
+        </pc:spChg>
+        <pc:spChg chg="mod">
+          <ac:chgData name="ken zhao" userId="e96b2dde5c0d9c1f" providerId="LiveId" clId="{4B2407D2-4E5A-469E-8B22-9C965EE789F6}" dt="2023-08-16T03:45:24.669" v="1242" actId="14100"/>
+          <ac:spMkLst>
+            <pc:docMk/>
+            <pc:sldMk cId="7805284" sldId="262"/>
+            <ac:spMk id="12" creationId="{9901362B-A071-ECFA-2B03-079F2801D174}"/>
+          </ac:spMkLst>
+        </pc:spChg>
+        <pc:spChg chg="mod">
+          <ac:chgData name="ken zhao" userId="e96b2dde5c0d9c1f" providerId="LiveId" clId="{4B2407D2-4E5A-469E-8B22-9C965EE789F6}" dt="2023-08-16T03:43:49.134" v="1222" actId="14100"/>
+          <ac:spMkLst>
+            <pc:docMk/>
+            <pc:sldMk cId="7805284" sldId="262"/>
+            <ac:spMk id="13" creationId="{A26CC81F-5250-F148-BEA5-CD76ADBD02BA}"/>
+          </ac:spMkLst>
+        </pc:spChg>
+        <pc:spChg chg="mod">
+          <ac:chgData name="ken zhao" userId="e96b2dde5c0d9c1f" providerId="LiveId" clId="{4B2407D2-4E5A-469E-8B22-9C965EE789F6}" dt="2023-08-16T03:44:23.992" v="1236" actId="14100"/>
+          <ac:spMkLst>
+            <pc:docMk/>
+            <pc:sldMk cId="7805284" sldId="262"/>
+            <ac:spMk id="14" creationId="{8C3452DB-2CA6-DB35-4945-66D83087A8EA}"/>
+          </ac:spMkLst>
+        </pc:spChg>
+        <pc:spChg chg="mod">
+          <ac:chgData name="ken zhao" userId="e96b2dde5c0d9c1f" providerId="LiveId" clId="{4B2407D2-4E5A-469E-8B22-9C965EE789F6}" dt="2023-08-16T03:45:36.304" v="1243" actId="14100"/>
+          <ac:spMkLst>
+            <pc:docMk/>
+            <pc:sldMk cId="7805284" sldId="262"/>
+            <ac:spMk id="15" creationId="{5A14B829-7003-9EB8-B26D-C43BB8F2AA40}"/>
+          </ac:spMkLst>
+        </pc:spChg>
+        <pc:spChg chg="mod">
+          <ac:chgData name="ken zhao" userId="e96b2dde5c0d9c1f" providerId="LiveId" clId="{4B2407D2-4E5A-469E-8B22-9C965EE789F6}" dt="2023-08-16T03:43:28.926" v="1219" actId="20577"/>
+          <ac:spMkLst>
+            <pc:docMk/>
+            <pc:sldMk cId="7805284" sldId="262"/>
+            <ac:spMk id="16" creationId="{7FD4998C-A147-F4A6-B43A-F95D2D53B623}"/>
+          </ac:spMkLst>
+        </pc:spChg>
+        <pc:spChg chg="mod">
+          <ac:chgData name="ken zhao" userId="e96b2dde5c0d9c1f" providerId="LiveId" clId="{4B2407D2-4E5A-469E-8B22-9C965EE789F6}" dt="2023-08-16T03:37:21.809" v="1006" actId="20577"/>
+          <ac:spMkLst>
+            <pc:docMk/>
+            <pc:sldMk cId="7805284" sldId="262"/>
+            <ac:spMk id="17" creationId="{F356445E-3DE2-3C9F-F987-0A715EB68852}"/>
+          </ac:spMkLst>
+        </pc:spChg>
+        <pc:spChg chg="mod">
+          <ac:chgData name="ken zhao" userId="e96b2dde5c0d9c1f" providerId="LiveId" clId="{4B2407D2-4E5A-469E-8B22-9C965EE789F6}" dt="2023-08-16T03:44:43.764" v="1237" actId="14100"/>
+          <ac:spMkLst>
+            <pc:docMk/>
+            <pc:sldMk cId="7805284" sldId="262"/>
+            <ac:spMk id="18" creationId="{92D35762-D227-2919-DFD7-BD95BAFAFAFB}"/>
+          </ac:spMkLst>
+        </pc:spChg>
+        <pc:spChg chg="mod">
+          <ac:chgData name="ken zhao" userId="e96b2dde5c0d9c1f" providerId="LiveId" clId="{4B2407D2-4E5A-469E-8B22-9C965EE789F6}" dt="2023-08-16T03:50:54.609" v="1449" actId="14100"/>
+          <ac:spMkLst>
+            <pc:docMk/>
+            <pc:sldMk cId="7805284" sldId="262"/>
+            <ac:spMk id="24" creationId="{8FC3E542-1D88-E46A-043C-DB00DC23BD23}"/>
+          </ac:spMkLst>
+        </pc:spChg>
+        <pc:spChg chg="mod">
+          <ac:chgData name="ken zhao" userId="e96b2dde5c0d9c1f" providerId="LiveId" clId="{4B2407D2-4E5A-469E-8B22-9C965EE789F6}" dt="2023-08-16T03:50:40.915" v="1445" actId="14100"/>
+          <ac:spMkLst>
+            <pc:docMk/>
+            <pc:sldMk cId="7805284" sldId="262"/>
+            <ac:spMk id="25" creationId="{1BD3268C-F57D-2E20-3B71-E34DB8780A1B}"/>
+          </ac:spMkLst>
+        </pc:spChg>
+        <pc:spChg chg="mod">
+          <ac:chgData name="ken zhao" userId="e96b2dde5c0d9c1f" providerId="LiveId" clId="{4B2407D2-4E5A-469E-8B22-9C965EE789F6}" dt="2023-08-16T03:29:41.313" v="871" actId="1037"/>
+          <ac:spMkLst>
+            <pc:docMk/>
+            <pc:sldMk cId="7805284" sldId="262"/>
+            <ac:spMk id="39" creationId="{ECB87BF8-6EFF-80D5-3D5F-30988FB6F810}"/>
+          </ac:spMkLst>
+        </pc:spChg>
+        <pc:spChg chg="mod">
+          <ac:chgData name="ken zhao" userId="e96b2dde5c0d9c1f" providerId="LiveId" clId="{4B2407D2-4E5A-469E-8B22-9C965EE789F6}" dt="2023-08-16T03:29:19.642" v="842" actId="1037"/>
+          <ac:spMkLst>
+            <pc:docMk/>
+            <pc:sldMk cId="7805284" sldId="262"/>
+            <ac:spMk id="41" creationId="{338CD1C2-C9D6-79E8-FF1D-2407797D379A}"/>
+          </ac:spMkLst>
+        </pc:spChg>
+      </pc:sldChg>
+      <pc:sldChg chg="modSp add mod">
+        <pc:chgData name="ken zhao" userId="e96b2dde5c0d9c1f" providerId="LiveId" clId="{4B2407D2-4E5A-469E-8B22-9C965EE789F6}" dt="2023-08-16T03:53:24.138" v="1642" actId="20577"/>
+        <pc:sldMkLst>
+          <pc:docMk/>
+          <pc:sldMk cId="1279963789" sldId="263"/>
+        </pc:sldMkLst>
+        <pc:spChg chg="mod">
+          <ac:chgData name="ken zhao" userId="e96b2dde5c0d9c1f" providerId="LiveId" clId="{4B2407D2-4E5A-469E-8B22-9C965EE789F6}" dt="2023-08-16T03:52:33.794" v="1569" actId="20577"/>
+          <ac:spMkLst>
+            <pc:docMk/>
+            <pc:sldMk cId="1279963789" sldId="263"/>
+            <ac:spMk id="19" creationId="{510CE099-146A-8CD1-E0A1-90BDBA4F0484}"/>
+          </ac:spMkLst>
+        </pc:spChg>
+        <pc:spChg chg="mod">
+          <ac:chgData name="ken zhao" userId="e96b2dde5c0d9c1f" providerId="LiveId" clId="{4B2407D2-4E5A-469E-8B22-9C965EE789F6}" dt="2023-08-16T03:51:50.535" v="1506" actId="14100"/>
+          <ac:spMkLst>
+            <pc:docMk/>
+            <pc:sldMk cId="1279963789" sldId="263"/>
+            <ac:spMk id="21" creationId="{92664D8E-9383-3103-E205-7E90DCB32F99}"/>
+          </ac:spMkLst>
+        </pc:spChg>
+        <pc:spChg chg="mod">
+          <ac:chgData name="ken zhao" userId="e96b2dde5c0d9c1f" providerId="LiveId" clId="{4B2407D2-4E5A-469E-8B22-9C965EE789F6}" dt="2023-08-16T03:53:07.536" v="1628" actId="1038"/>
+          <ac:spMkLst>
+            <pc:docMk/>
+            <pc:sldMk cId="1279963789" sldId="263"/>
+            <ac:spMk id="39" creationId="{ECB87BF8-6EFF-80D5-3D5F-30988FB6F810}"/>
+          </ac:spMkLst>
+        </pc:spChg>
+        <pc:spChg chg="mod">
+          <ac:chgData name="ken zhao" userId="e96b2dde5c0d9c1f" providerId="LiveId" clId="{4B2407D2-4E5A-469E-8B22-9C965EE789F6}" dt="2023-08-16T03:53:24.138" v="1642" actId="20577"/>
+          <ac:spMkLst>
+            <pc:docMk/>
+            <pc:sldMk cId="1279963789" sldId="263"/>
+            <ac:spMk id="41" creationId="{338CD1C2-C9D6-79E8-FF1D-2407797D379A}"/>
+          </ac:spMkLst>
+        </pc:spChg>
       </pc:sldChg>
     </pc:docChg>
   </pc:docChgLst>
@@ -1425,7 +1585,7 @@
           <a:p>
             <a:fld id="{83F12504-7637-4DB2-B2FE-6E52528CC067}" type="datetimeFigureOut">
               <a:rPr lang="zh-CN" altLang="en-US" smtClean="0"/>
-              <a:t>2023/8/15</a:t>
+              <a:t>2023/8/16</a:t>
             </a:fld>
             <a:endParaRPr lang="zh-CN" altLang="en-US"/>
           </a:p>
@@ -1623,7 +1783,7 @@
           <a:p>
             <a:fld id="{83F12504-7637-4DB2-B2FE-6E52528CC067}" type="datetimeFigureOut">
               <a:rPr lang="zh-CN" altLang="en-US" smtClean="0"/>
-              <a:t>2023/8/15</a:t>
+              <a:t>2023/8/16</a:t>
             </a:fld>
             <a:endParaRPr lang="zh-CN" altLang="en-US"/>
           </a:p>
@@ -1831,7 +1991,7 @@
           <a:p>
             <a:fld id="{83F12504-7637-4DB2-B2FE-6E52528CC067}" type="datetimeFigureOut">
               <a:rPr lang="zh-CN" altLang="en-US" smtClean="0"/>
-              <a:t>2023/8/15</a:t>
+              <a:t>2023/8/16</a:t>
             </a:fld>
             <a:endParaRPr lang="zh-CN" altLang="en-US"/>
           </a:p>
@@ -2029,7 +2189,7 @@
           <a:p>
             <a:fld id="{83F12504-7637-4DB2-B2FE-6E52528CC067}" type="datetimeFigureOut">
               <a:rPr lang="zh-CN" altLang="en-US" smtClean="0"/>
-              <a:t>2023/8/15</a:t>
+              <a:t>2023/8/16</a:t>
             </a:fld>
             <a:endParaRPr lang="zh-CN" altLang="en-US"/>
           </a:p>
@@ -2304,7 +2464,7 @@
           <a:p>
             <a:fld id="{83F12504-7637-4DB2-B2FE-6E52528CC067}" type="datetimeFigureOut">
               <a:rPr lang="zh-CN" altLang="en-US" smtClean="0"/>
-              <a:t>2023/8/15</a:t>
+              <a:t>2023/8/16</a:t>
             </a:fld>
             <a:endParaRPr lang="zh-CN" altLang="en-US"/>
           </a:p>
@@ -2569,7 +2729,7 @@
           <a:p>
             <a:fld id="{83F12504-7637-4DB2-B2FE-6E52528CC067}" type="datetimeFigureOut">
               <a:rPr lang="zh-CN" altLang="en-US" smtClean="0"/>
-              <a:t>2023/8/15</a:t>
+              <a:t>2023/8/16</a:t>
             </a:fld>
             <a:endParaRPr lang="zh-CN" altLang="en-US"/>
           </a:p>
@@ -2981,7 +3141,7 @@
           <a:p>
             <a:fld id="{83F12504-7637-4DB2-B2FE-6E52528CC067}" type="datetimeFigureOut">
               <a:rPr lang="zh-CN" altLang="en-US" smtClean="0"/>
-              <a:t>2023/8/15</a:t>
+              <a:t>2023/8/16</a:t>
             </a:fld>
             <a:endParaRPr lang="zh-CN" altLang="en-US"/>
           </a:p>
@@ -3122,7 +3282,7 @@
           <a:p>
             <a:fld id="{83F12504-7637-4DB2-B2FE-6E52528CC067}" type="datetimeFigureOut">
               <a:rPr lang="zh-CN" altLang="en-US" smtClean="0"/>
-              <a:t>2023/8/15</a:t>
+              <a:t>2023/8/16</a:t>
             </a:fld>
             <a:endParaRPr lang="zh-CN" altLang="en-US"/>
           </a:p>
@@ -3235,7 +3395,7 @@
           <a:p>
             <a:fld id="{83F12504-7637-4DB2-B2FE-6E52528CC067}" type="datetimeFigureOut">
               <a:rPr lang="zh-CN" altLang="en-US" smtClean="0"/>
-              <a:t>2023/8/15</a:t>
+              <a:t>2023/8/16</a:t>
             </a:fld>
             <a:endParaRPr lang="zh-CN" altLang="en-US"/>
           </a:p>
@@ -3546,7 +3706,7 @@
           <a:p>
             <a:fld id="{83F12504-7637-4DB2-B2FE-6E52528CC067}" type="datetimeFigureOut">
               <a:rPr lang="zh-CN" altLang="en-US" smtClean="0"/>
-              <a:t>2023/8/15</a:t>
+              <a:t>2023/8/16</a:t>
             </a:fld>
             <a:endParaRPr lang="zh-CN" altLang="en-US"/>
           </a:p>
@@ -3834,7 +3994,7 @@
           <a:p>
             <a:fld id="{83F12504-7637-4DB2-B2FE-6E52528CC067}" type="datetimeFigureOut">
               <a:rPr lang="zh-CN" altLang="en-US" smtClean="0"/>
-              <a:t>2023/8/15</a:t>
+              <a:t>2023/8/16</a:t>
             </a:fld>
             <a:endParaRPr lang="zh-CN" altLang="en-US"/>
           </a:p>
@@ -4075,7 +4235,7 @@
           <a:p>
             <a:fld id="{83F12504-7637-4DB2-B2FE-6E52528CC067}" type="datetimeFigureOut">
               <a:rPr lang="zh-CN" altLang="en-US" smtClean="0"/>
-              <a:t>2023/8/15</a:t>
+              <a:t>2023/8/16</a:t>
             </a:fld>
             <a:endParaRPr lang="zh-CN" altLang="en-US"/>
           </a:p>
@@ -6320,6 +6480,1633 @@
 </p:sld>
 </file>
 
+<file path=ppt/slides/slide3.xml><?xml version="1.0" encoding="utf-8"?>
+<p:sld xmlns:a="http://schemas.openxmlformats.org/drawingml/2006/main" xmlns:r="http://schemas.openxmlformats.org/officeDocument/2006/relationships" xmlns:p="http://schemas.openxmlformats.org/presentationml/2006/main">
+  <p:cSld>
+    <p:spTree>
+      <p:nvGrpSpPr>
+        <p:cNvPr id="1" name=""/>
+        <p:cNvGrpSpPr/>
+        <p:nvPr/>
+      </p:nvGrpSpPr>
+      <p:grpSpPr>
+        <a:xfrm>
+          <a:off x="0" y="0"/>
+          <a:ext cx="0" cy="0"/>
+          <a:chOff x="0" y="0"/>
+          <a:chExt cx="0" cy="0"/>
+        </a:xfrm>
+      </p:grpSpPr>
+      <p:pic>
+        <p:nvPicPr>
+          <p:cNvPr id="27" name="图片 26">
+            <a:extLst>
+              <a:ext uri="{FF2B5EF4-FFF2-40B4-BE49-F238E27FC236}">
+                <a16:creationId xmlns:a16="http://schemas.microsoft.com/office/drawing/2014/main" id="{8D1D9941-D7F9-D34C-96FF-8AF203F37A57}"/>
+              </a:ext>
+            </a:extLst>
+          </p:cNvPr>
+          <p:cNvPicPr>
+            <a:picLocks noChangeAspect="1"/>
+          </p:cNvPicPr>
+          <p:nvPr/>
+        </p:nvPicPr>
+        <p:blipFill>
+          <a:blip r:embed="rId2">
+            <a:extLst>
+              <a:ext uri="{28A0092B-C50C-407E-A947-70E740481C1C}">
+                <a14:useLocalDpi xmlns:a14="http://schemas.microsoft.com/office/drawing/2010/main" val="0"/>
+              </a:ext>
+            </a:extLst>
+          </a:blip>
+          <a:stretch>
+            <a:fillRect/>
+          </a:stretch>
+        </p:blipFill>
+        <p:spPr>
+          <a:xfrm>
+            <a:off x="8227720" y="322284"/>
+            <a:ext cx="2777302" cy="6017487"/>
+          </a:xfrm>
+          <a:prstGeom prst="rect">
+            <a:avLst/>
+          </a:prstGeom>
+          <a:ln>
+            <a:solidFill>
+              <a:schemeClr val="tx1"/>
+            </a:solidFill>
+          </a:ln>
+        </p:spPr>
+      </p:pic>
+      <p:pic>
+        <p:nvPicPr>
+          <p:cNvPr id="21" name="图片 20">
+            <a:extLst>
+              <a:ext uri="{FF2B5EF4-FFF2-40B4-BE49-F238E27FC236}">
+                <a16:creationId xmlns:a16="http://schemas.microsoft.com/office/drawing/2014/main" id="{B1041A44-A690-D34C-3F5E-9FF5849F05B1}"/>
+              </a:ext>
+            </a:extLst>
+          </p:cNvPr>
+          <p:cNvPicPr>
+            <a:picLocks noChangeAspect="1"/>
+          </p:cNvPicPr>
+          <p:nvPr/>
+        </p:nvPicPr>
+        <p:blipFill>
+          <a:blip r:embed="rId3">
+            <a:extLst>
+              <a:ext uri="{28A0092B-C50C-407E-A947-70E740481C1C}">
+                <a14:useLocalDpi xmlns:a14="http://schemas.microsoft.com/office/drawing/2010/main" val="0"/>
+              </a:ext>
+            </a:extLst>
+          </a:blip>
+          <a:stretch>
+            <a:fillRect/>
+          </a:stretch>
+        </p:blipFill>
+        <p:spPr>
+          <a:xfrm>
+            <a:off x="4569400" y="322284"/>
+            <a:ext cx="2777302" cy="6017487"/>
+          </a:xfrm>
+          <a:prstGeom prst="rect">
+            <a:avLst/>
+          </a:prstGeom>
+          <a:ln>
+            <a:solidFill>
+              <a:schemeClr val="tx1"/>
+            </a:solidFill>
+          </a:ln>
+        </p:spPr>
+      </p:pic>
+      <p:sp>
+        <p:nvSpPr>
+          <p:cNvPr id="10" name="标注: 弯曲线形 9">
+            <a:extLst>
+              <a:ext uri="{FF2B5EF4-FFF2-40B4-BE49-F238E27FC236}">
+                <a16:creationId xmlns:a16="http://schemas.microsoft.com/office/drawing/2014/main" id="{163B30DA-1326-2E28-3DDC-B2C081EC3C97}"/>
+              </a:ext>
+            </a:extLst>
+          </p:cNvPr>
+          <p:cNvSpPr/>
+          <p:nvPr/>
+        </p:nvSpPr>
+        <p:spPr>
+          <a:xfrm>
+            <a:off x="4744304" y="2635411"/>
+            <a:ext cx="1351696" cy="442681"/>
+          </a:xfrm>
+          <a:prstGeom prst="borderCallout2">
+            <a:avLst>
+              <a:gd name="adj1" fmla="val 85934"/>
+              <a:gd name="adj2" fmla="val -2055"/>
+              <a:gd name="adj3" fmla="val 134014"/>
+              <a:gd name="adj4" fmla="val -6968"/>
+              <a:gd name="adj5" fmla="val 689742"/>
+              <a:gd name="adj6" fmla="val 1963"/>
+            </a:avLst>
+          </a:prstGeom>
+          <a:solidFill>
+            <a:schemeClr val="bg1"/>
+          </a:solidFill>
+          <a:ln w="12700">
+            <a:solidFill>
+              <a:srgbClr val="C00000"/>
+            </a:solidFill>
+          </a:ln>
+        </p:spPr>
+        <p:style>
+          <a:lnRef idx="2">
+            <a:schemeClr val="accent1">
+              <a:shade val="50000"/>
+            </a:schemeClr>
+          </a:lnRef>
+          <a:fillRef idx="1">
+            <a:schemeClr val="accent1"/>
+          </a:fillRef>
+          <a:effectRef idx="0">
+            <a:schemeClr val="accent1"/>
+          </a:effectRef>
+          <a:fontRef idx="minor">
+            <a:schemeClr val="lt1"/>
+          </a:fontRef>
+        </p:style>
+        <p:txBody>
+          <a:bodyPr lIns="72000" tIns="72000" rIns="72000" bIns="72000" rtlCol="0" anchor="ctr" anchorCtr="0"/>
+          <a:lstStyle/>
+          <a:p>
+            <a:r>
+              <a:rPr lang="en-US" altLang="zh-CN" sz="1000" dirty="0">
+                <a:solidFill>
+                  <a:srgbClr val="C00000"/>
+                </a:solidFill>
+              </a:rPr>
+              <a:t>Click: backward</a:t>
+            </a:r>
+          </a:p>
+          <a:p>
+            <a:r>
+              <a:rPr lang="en-US" altLang="zh-CN" sz="1000" dirty="0">
+                <a:solidFill>
+                  <a:srgbClr val="C00000"/>
+                </a:solidFill>
+              </a:rPr>
+              <a:t>Long-click: left page</a:t>
+            </a:r>
+            <a:endParaRPr lang="zh-CN" altLang="en-US" sz="1000" dirty="0">
+              <a:solidFill>
+                <a:srgbClr val="C00000"/>
+              </a:solidFill>
+            </a:endParaRPr>
+          </a:p>
+        </p:txBody>
+      </p:sp>
+      <p:sp>
+        <p:nvSpPr>
+          <p:cNvPr id="11" name="标注: 弯曲线形 10">
+            <a:extLst>
+              <a:ext uri="{FF2B5EF4-FFF2-40B4-BE49-F238E27FC236}">
+                <a16:creationId xmlns:a16="http://schemas.microsoft.com/office/drawing/2014/main" id="{FD69B0D3-926B-E96C-8504-675697405197}"/>
+              </a:ext>
+            </a:extLst>
+          </p:cNvPr>
+          <p:cNvSpPr/>
+          <p:nvPr/>
+        </p:nvSpPr>
+        <p:spPr>
+          <a:xfrm>
+            <a:off x="4744304" y="3473343"/>
+            <a:ext cx="1351695" cy="442682"/>
+          </a:xfrm>
+          <a:prstGeom prst="borderCallout2">
+            <a:avLst>
+              <a:gd name="adj1" fmla="val 102553"/>
+              <a:gd name="adj2" fmla="val 11584"/>
+              <a:gd name="adj3" fmla="val 171280"/>
+              <a:gd name="adj4" fmla="val 8216"/>
+              <a:gd name="adj5" fmla="val 517369"/>
+              <a:gd name="adj6" fmla="val 15675"/>
+            </a:avLst>
+          </a:prstGeom>
+          <a:solidFill>
+            <a:schemeClr val="bg1"/>
+          </a:solidFill>
+          <a:ln w="12700">
+            <a:solidFill>
+              <a:srgbClr val="C00000"/>
+            </a:solidFill>
+          </a:ln>
+        </p:spPr>
+        <p:style>
+          <a:lnRef idx="2">
+            <a:schemeClr val="accent1">
+              <a:shade val="50000"/>
+            </a:schemeClr>
+          </a:lnRef>
+          <a:fillRef idx="1">
+            <a:schemeClr val="accent1"/>
+          </a:fillRef>
+          <a:effectRef idx="0">
+            <a:schemeClr val="accent1"/>
+          </a:effectRef>
+          <a:fontRef idx="minor">
+            <a:schemeClr val="lt1"/>
+          </a:fontRef>
+        </p:style>
+        <p:txBody>
+          <a:bodyPr lIns="72000" tIns="72000" rIns="72000" bIns="72000" rtlCol="0" anchor="ctr" anchorCtr="0"/>
+          <a:lstStyle/>
+          <a:p>
+            <a:r>
+              <a:rPr lang="en-US" altLang="zh-CN" sz="1000" dirty="0">
+                <a:solidFill>
+                  <a:srgbClr val="C00000"/>
+                </a:solidFill>
+              </a:rPr>
+              <a:t>Click: forward</a:t>
+            </a:r>
+          </a:p>
+          <a:p>
+            <a:r>
+              <a:rPr lang="en-US" altLang="zh-CN" sz="1000" dirty="0">
+                <a:solidFill>
+                  <a:srgbClr val="C00000"/>
+                </a:solidFill>
+              </a:rPr>
+              <a:t>Long-click: right page</a:t>
+            </a:r>
+            <a:endParaRPr lang="zh-CN" altLang="en-US" sz="1000" dirty="0">
+              <a:solidFill>
+                <a:srgbClr val="C00000"/>
+              </a:solidFill>
+            </a:endParaRPr>
+          </a:p>
+        </p:txBody>
+      </p:sp>
+      <p:sp>
+        <p:nvSpPr>
+          <p:cNvPr id="12" name="标注: 弯曲线形 11">
+            <a:extLst>
+              <a:ext uri="{FF2B5EF4-FFF2-40B4-BE49-F238E27FC236}">
+                <a16:creationId xmlns:a16="http://schemas.microsoft.com/office/drawing/2014/main" id="{9901362B-A071-ECFA-2B03-079F2801D174}"/>
+              </a:ext>
+            </a:extLst>
+          </p:cNvPr>
+          <p:cNvSpPr/>
+          <p:nvPr/>
+        </p:nvSpPr>
+        <p:spPr>
+          <a:xfrm>
+            <a:off x="5114866" y="4096879"/>
+            <a:ext cx="1094670" cy="412759"/>
+          </a:xfrm>
+          <a:prstGeom prst="borderCallout2">
+            <a:avLst>
+              <a:gd name="adj1" fmla="val 96687"/>
+              <a:gd name="adj2" fmla="val 8486"/>
+              <a:gd name="adj3" fmla="val 184568"/>
+              <a:gd name="adj4" fmla="val -2294"/>
+              <a:gd name="adj5" fmla="val 385478"/>
+              <a:gd name="adj6" fmla="val 10006"/>
+            </a:avLst>
+          </a:prstGeom>
+          <a:solidFill>
+            <a:schemeClr val="bg1"/>
+          </a:solidFill>
+          <a:ln w="12700">
+            <a:solidFill>
+              <a:srgbClr val="C00000"/>
+            </a:solidFill>
+          </a:ln>
+        </p:spPr>
+        <p:style>
+          <a:lnRef idx="2">
+            <a:schemeClr val="accent1">
+              <a:shade val="50000"/>
+            </a:schemeClr>
+          </a:lnRef>
+          <a:fillRef idx="1">
+            <a:schemeClr val="accent1"/>
+          </a:fillRef>
+          <a:effectRef idx="0">
+            <a:schemeClr val="accent1"/>
+          </a:effectRef>
+          <a:fontRef idx="minor">
+            <a:schemeClr val="lt1"/>
+          </a:fontRef>
+        </p:style>
+        <p:txBody>
+          <a:bodyPr lIns="72000" tIns="72000" rIns="72000" bIns="72000" rtlCol="0" anchor="ctr" anchorCtr="0"/>
+          <a:lstStyle/>
+          <a:p>
+            <a:r>
+              <a:rPr lang="en-US" altLang="zh-CN" sz="1000" dirty="0">
+                <a:solidFill>
+                  <a:srgbClr val="C00000"/>
+                </a:solidFill>
+              </a:rPr>
+              <a:t>Click: homepage</a:t>
+            </a:r>
+          </a:p>
+          <a:p>
+            <a:r>
+              <a:rPr lang="en-US" altLang="zh-CN" sz="1000" dirty="0">
+                <a:solidFill>
+                  <a:srgbClr val="C00000"/>
+                </a:solidFill>
+              </a:rPr>
+              <a:t>Long: new page</a:t>
+            </a:r>
+            <a:endParaRPr lang="zh-CN" altLang="en-US" sz="1000" dirty="0">
+              <a:solidFill>
+                <a:srgbClr val="C00000"/>
+              </a:solidFill>
+            </a:endParaRPr>
+          </a:p>
+        </p:txBody>
+      </p:sp>
+      <p:sp>
+        <p:nvSpPr>
+          <p:cNvPr id="14" name="标注: 弯曲线形 13">
+            <a:extLst>
+              <a:ext uri="{FF2B5EF4-FFF2-40B4-BE49-F238E27FC236}">
+                <a16:creationId xmlns:a16="http://schemas.microsoft.com/office/drawing/2014/main" id="{8C3452DB-2CA6-DB35-4945-66D83087A8EA}"/>
+              </a:ext>
+            </a:extLst>
+          </p:cNvPr>
+          <p:cNvSpPr/>
+          <p:nvPr/>
+        </p:nvSpPr>
+        <p:spPr>
+          <a:xfrm>
+            <a:off x="6209536" y="3107847"/>
+            <a:ext cx="665480" cy="347819"/>
+          </a:xfrm>
+          <a:prstGeom prst="borderCallout2">
+            <a:avLst>
+              <a:gd name="adj1" fmla="val 107631"/>
+              <a:gd name="adj2" fmla="val 50684"/>
+              <a:gd name="adj3" fmla="val 237770"/>
+              <a:gd name="adj4" fmla="val 44003"/>
+              <a:gd name="adj5" fmla="val 620841"/>
+              <a:gd name="adj6" fmla="val -32543"/>
+            </a:avLst>
+          </a:prstGeom>
+          <a:solidFill>
+            <a:schemeClr val="bg1"/>
+          </a:solidFill>
+          <a:ln w="12700">
+            <a:solidFill>
+              <a:srgbClr val="C00000"/>
+            </a:solidFill>
+          </a:ln>
+        </p:spPr>
+        <p:style>
+          <a:lnRef idx="2">
+            <a:schemeClr val="accent1">
+              <a:shade val="50000"/>
+            </a:schemeClr>
+          </a:lnRef>
+          <a:fillRef idx="1">
+            <a:schemeClr val="accent1"/>
+          </a:fillRef>
+          <a:effectRef idx="0">
+            <a:schemeClr val="accent1"/>
+          </a:effectRef>
+          <a:fontRef idx="minor">
+            <a:schemeClr val="lt1"/>
+          </a:fontRef>
+        </p:style>
+        <p:txBody>
+          <a:bodyPr lIns="72000" tIns="72000" rIns="72000" bIns="72000" rtlCol="0" anchor="ctr" anchorCtr="0"/>
+          <a:lstStyle/>
+          <a:p>
+            <a:r>
+              <a:rPr lang="en-US" altLang="zh-CN" sz="1000" dirty="0">
+                <a:solidFill>
+                  <a:srgbClr val="C00000"/>
+                </a:solidFill>
+              </a:rPr>
+              <a:t>Floating button</a:t>
+            </a:r>
+            <a:endParaRPr lang="zh-CN" altLang="en-US" sz="1000" dirty="0">
+              <a:solidFill>
+                <a:srgbClr val="C00000"/>
+              </a:solidFill>
+            </a:endParaRPr>
+          </a:p>
+        </p:txBody>
+      </p:sp>
+      <p:sp>
+        <p:nvSpPr>
+          <p:cNvPr id="15" name="标注: 弯曲线形 14">
+            <a:extLst>
+              <a:ext uri="{FF2B5EF4-FFF2-40B4-BE49-F238E27FC236}">
+                <a16:creationId xmlns:a16="http://schemas.microsoft.com/office/drawing/2014/main" id="{5A14B829-7003-9EB8-B26D-C43BB8F2AA40}"/>
+              </a:ext>
+            </a:extLst>
+          </p:cNvPr>
+          <p:cNvSpPr/>
+          <p:nvPr/>
+        </p:nvSpPr>
+        <p:spPr>
+          <a:xfrm>
+            <a:off x="5264407" y="4641262"/>
+            <a:ext cx="565952" cy="268204"/>
+          </a:xfrm>
+          <a:prstGeom prst="borderCallout2">
+            <a:avLst>
+              <a:gd name="adj1" fmla="val 96071"/>
+              <a:gd name="adj2" fmla="val 9926"/>
+              <a:gd name="adj3" fmla="val 239944"/>
+              <a:gd name="adj4" fmla="val 17353"/>
+              <a:gd name="adj5" fmla="val 421253"/>
+              <a:gd name="adj6" fmla="val 53123"/>
+            </a:avLst>
+          </a:prstGeom>
+          <a:solidFill>
+            <a:schemeClr val="bg1"/>
+          </a:solidFill>
+          <a:ln w="12700">
+            <a:solidFill>
+              <a:srgbClr val="C00000"/>
+            </a:solidFill>
+          </a:ln>
+        </p:spPr>
+        <p:style>
+          <a:lnRef idx="2">
+            <a:schemeClr val="accent1">
+              <a:shade val="50000"/>
+            </a:schemeClr>
+          </a:lnRef>
+          <a:fillRef idx="1">
+            <a:schemeClr val="accent1"/>
+          </a:fillRef>
+          <a:effectRef idx="0">
+            <a:schemeClr val="accent1"/>
+          </a:effectRef>
+          <a:fontRef idx="minor">
+            <a:schemeClr val="lt1"/>
+          </a:fontRef>
+        </p:style>
+        <p:txBody>
+          <a:bodyPr lIns="72000" tIns="72000" rIns="72000" bIns="72000" rtlCol="0" anchor="ctr" anchorCtr="0"/>
+          <a:lstStyle/>
+          <a:p>
+            <a:r>
+              <a:rPr lang="en-US" altLang="zh-CN" sz="1000" dirty="0">
+                <a:solidFill>
+                  <a:srgbClr val="C00000"/>
+                </a:solidFill>
+              </a:rPr>
+              <a:t>Tab list</a:t>
+            </a:r>
+            <a:endParaRPr lang="zh-CN" altLang="en-US" sz="1000" dirty="0">
+              <a:solidFill>
+                <a:srgbClr val="C00000"/>
+              </a:solidFill>
+            </a:endParaRPr>
+          </a:p>
+        </p:txBody>
+      </p:sp>
+      <p:sp>
+        <p:nvSpPr>
+          <p:cNvPr id="16" name="标注: 弯曲线形 15">
+            <a:extLst>
+              <a:ext uri="{FF2B5EF4-FFF2-40B4-BE49-F238E27FC236}">
+                <a16:creationId xmlns:a16="http://schemas.microsoft.com/office/drawing/2014/main" id="{7FD4998C-A147-F4A6-B43A-F95D2D53B623}"/>
+              </a:ext>
+            </a:extLst>
+          </p:cNvPr>
+          <p:cNvSpPr/>
+          <p:nvPr/>
+        </p:nvSpPr>
+        <p:spPr>
+          <a:xfrm>
+            <a:off x="6618577" y="4973165"/>
+            <a:ext cx="665480" cy="347819"/>
+          </a:xfrm>
+          <a:prstGeom prst="borderCallout2">
+            <a:avLst>
+              <a:gd name="adj1" fmla="val 102000"/>
+              <a:gd name="adj2" fmla="val 9988"/>
+              <a:gd name="adj3" fmla="val 152230"/>
+              <a:gd name="adj4" fmla="val 5337"/>
+              <a:gd name="adj5" fmla="val 199449"/>
+              <a:gd name="adj6" fmla="val -38364"/>
+            </a:avLst>
+          </a:prstGeom>
+          <a:solidFill>
+            <a:schemeClr val="bg1"/>
+          </a:solidFill>
+          <a:ln w="12700">
+            <a:solidFill>
+              <a:srgbClr val="C00000"/>
+            </a:solidFill>
+          </a:ln>
+        </p:spPr>
+        <p:style>
+          <a:lnRef idx="2">
+            <a:schemeClr val="accent1">
+              <a:shade val="50000"/>
+            </a:schemeClr>
+          </a:lnRef>
+          <a:fillRef idx="1">
+            <a:schemeClr val="accent1"/>
+          </a:fillRef>
+          <a:effectRef idx="0">
+            <a:schemeClr val="accent1"/>
+          </a:effectRef>
+          <a:fontRef idx="minor">
+            <a:schemeClr val="lt1"/>
+          </a:fontRef>
+        </p:style>
+        <p:txBody>
+          <a:bodyPr lIns="72000" tIns="72000" rIns="72000" bIns="72000" rtlCol="0" anchor="ctr" anchorCtr="0"/>
+          <a:lstStyle/>
+          <a:p>
+            <a:r>
+              <a:rPr lang="en-US" altLang="zh-CN" sz="1000" dirty="0">
+                <a:solidFill>
+                  <a:srgbClr val="C00000"/>
+                </a:solidFill>
+              </a:rPr>
+              <a:t>Position indicator</a:t>
+            </a:r>
+            <a:endParaRPr lang="zh-CN" altLang="en-US" sz="1000" dirty="0">
+              <a:solidFill>
+                <a:srgbClr val="C00000"/>
+              </a:solidFill>
+            </a:endParaRPr>
+          </a:p>
+        </p:txBody>
+      </p:sp>
+      <p:sp>
+        <p:nvSpPr>
+          <p:cNvPr id="13" name="标注: 弯曲线形 12">
+            <a:extLst>
+              <a:ext uri="{FF2B5EF4-FFF2-40B4-BE49-F238E27FC236}">
+                <a16:creationId xmlns:a16="http://schemas.microsoft.com/office/drawing/2014/main" id="{A26CC81F-5250-F148-BEA5-CD76ADBD02BA}"/>
+              </a:ext>
+            </a:extLst>
+          </p:cNvPr>
+          <p:cNvSpPr/>
+          <p:nvPr/>
+        </p:nvSpPr>
+        <p:spPr>
+          <a:xfrm>
+            <a:off x="6428401" y="4320607"/>
+            <a:ext cx="855656" cy="347819"/>
+          </a:xfrm>
+          <a:prstGeom prst="borderCallout2">
+            <a:avLst>
+              <a:gd name="adj1" fmla="val 108033"/>
+              <a:gd name="adj2" fmla="val 28088"/>
+              <a:gd name="adj3" fmla="val 167214"/>
+              <a:gd name="adj4" fmla="val 16659"/>
+              <a:gd name="adj5" fmla="val 418591"/>
+              <a:gd name="adj6" fmla="val -52046"/>
+            </a:avLst>
+          </a:prstGeom>
+          <a:solidFill>
+            <a:schemeClr val="bg1"/>
+          </a:solidFill>
+          <a:ln w="12700">
+            <a:solidFill>
+              <a:srgbClr val="C00000"/>
+            </a:solidFill>
+          </a:ln>
+        </p:spPr>
+        <p:style>
+          <a:lnRef idx="2">
+            <a:schemeClr val="accent1">
+              <a:shade val="50000"/>
+            </a:schemeClr>
+          </a:lnRef>
+          <a:fillRef idx="1">
+            <a:schemeClr val="accent1"/>
+          </a:fillRef>
+          <a:effectRef idx="0">
+            <a:schemeClr val="accent1"/>
+          </a:effectRef>
+          <a:fontRef idx="minor">
+            <a:schemeClr val="lt1"/>
+          </a:fontRef>
+        </p:style>
+        <p:txBody>
+          <a:bodyPr lIns="72000" tIns="72000" rIns="72000" bIns="72000" rtlCol="0" anchor="ctr" anchorCtr="0"/>
+          <a:lstStyle/>
+          <a:p>
+            <a:pPr algn="ctr"/>
+            <a:r>
+              <a:rPr lang="en-US" altLang="zh-CN" sz="1000" dirty="0">
+                <a:solidFill>
+                  <a:srgbClr val="C00000"/>
+                </a:solidFill>
+              </a:rPr>
+              <a:t>Close/Stop</a:t>
+            </a:r>
+          </a:p>
+        </p:txBody>
+      </p:sp>
+      <p:sp>
+        <p:nvSpPr>
+          <p:cNvPr id="17" name="标注: 弯曲线形 16">
+            <a:extLst>
+              <a:ext uri="{FF2B5EF4-FFF2-40B4-BE49-F238E27FC236}">
+                <a16:creationId xmlns:a16="http://schemas.microsoft.com/office/drawing/2014/main" id="{F356445E-3DE2-3C9F-F987-0A715EB68852}"/>
+              </a:ext>
+            </a:extLst>
+          </p:cNvPr>
+          <p:cNvSpPr/>
+          <p:nvPr/>
+        </p:nvSpPr>
+        <p:spPr>
+          <a:xfrm>
+            <a:off x="4685183" y="982838"/>
+            <a:ext cx="1962343" cy="221026"/>
+          </a:xfrm>
+          <a:prstGeom prst="borderCallout2">
+            <a:avLst>
+              <a:gd name="adj1" fmla="val -237"/>
+              <a:gd name="adj2" fmla="val 21528"/>
+              <a:gd name="adj3" fmla="val -60147"/>
+              <a:gd name="adj4" fmla="val 13686"/>
+              <a:gd name="adj5" fmla="val -142754"/>
+              <a:gd name="adj6" fmla="val 9486"/>
+            </a:avLst>
+          </a:prstGeom>
+          <a:solidFill>
+            <a:schemeClr val="bg1"/>
+          </a:solidFill>
+          <a:ln w="12700">
+            <a:solidFill>
+              <a:srgbClr val="C00000"/>
+            </a:solidFill>
+          </a:ln>
+        </p:spPr>
+        <p:style>
+          <a:lnRef idx="2">
+            <a:schemeClr val="accent1">
+              <a:shade val="50000"/>
+            </a:schemeClr>
+          </a:lnRef>
+          <a:fillRef idx="1">
+            <a:schemeClr val="accent1"/>
+          </a:fillRef>
+          <a:effectRef idx="0">
+            <a:schemeClr val="accent1"/>
+          </a:effectRef>
+          <a:fontRef idx="minor">
+            <a:schemeClr val="lt1"/>
+          </a:fontRef>
+        </p:style>
+        <p:txBody>
+          <a:bodyPr lIns="72000" tIns="72000" rIns="72000" bIns="72000" rtlCol="0" anchor="ctr" anchorCtr="0"/>
+          <a:lstStyle/>
+          <a:p>
+            <a:r>
+              <a:rPr lang="en-US" altLang="zh-CN" sz="1000" dirty="0">
+                <a:solidFill>
+                  <a:srgbClr val="C00000"/>
+                </a:solidFill>
+              </a:rPr>
+              <a:t>Webpage title. Click to input URL</a:t>
+            </a:r>
+            <a:endParaRPr lang="zh-CN" altLang="en-US" sz="1000" dirty="0">
+              <a:solidFill>
+                <a:srgbClr val="C00000"/>
+              </a:solidFill>
+            </a:endParaRPr>
+          </a:p>
+        </p:txBody>
+      </p:sp>
+      <p:sp>
+        <p:nvSpPr>
+          <p:cNvPr id="18" name="标注: 弯曲线形 17">
+            <a:extLst>
+              <a:ext uri="{FF2B5EF4-FFF2-40B4-BE49-F238E27FC236}">
+                <a16:creationId xmlns:a16="http://schemas.microsoft.com/office/drawing/2014/main" id="{92D35762-D227-2919-DFD7-BD95BAFAFAFB}"/>
+              </a:ext>
+            </a:extLst>
+          </p:cNvPr>
+          <p:cNvSpPr/>
+          <p:nvPr/>
+        </p:nvSpPr>
+        <p:spPr>
+          <a:xfrm>
+            <a:off x="5486399" y="1466884"/>
+            <a:ext cx="1663709" cy="640295"/>
+          </a:xfrm>
+          <a:prstGeom prst="borderCallout2">
+            <a:avLst>
+              <a:gd name="adj1" fmla="val -3449"/>
+              <a:gd name="adj2" fmla="val 90802"/>
+              <a:gd name="adj3" fmla="val -42668"/>
+              <a:gd name="adj4" fmla="val 100397"/>
+              <a:gd name="adj5" fmla="val -117754"/>
+              <a:gd name="adj6" fmla="val 103760"/>
+            </a:avLst>
+          </a:prstGeom>
+          <a:solidFill>
+            <a:schemeClr val="bg1"/>
+          </a:solidFill>
+          <a:ln w="12700">
+            <a:solidFill>
+              <a:srgbClr val="C00000"/>
+            </a:solidFill>
+          </a:ln>
+        </p:spPr>
+        <p:style>
+          <a:lnRef idx="2">
+            <a:schemeClr val="accent1">
+              <a:shade val="50000"/>
+            </a:schemeClr>
+          </a:lnRef>
+          <a:fillRef idx="1">
+            <a:schemeClr val="accent1"/>
+          </a:fillRef>
+          <a:effectRef idx="0">
+            <a:schemeClr val="accent1"/>
+          </a:effectRef>
+          <a:fontRef idx="minor">
+            <a:schemeClr val="lt1"/>
+          </a:fontRef>
+        </p:style>
+        <p:txBody>
+          <a:bodyPr lIns="72000" tIns="72000" rIns="72000" bIns="72000" rtlCol="0" anchor="ctr" anchorCtr="0"/>
+          <a:lstStyle/>
+          <a:p>
+            <a:r>
+              <a:rPr lang="en-US" altLang="zh-CN" sz="1000" dirty="0">
+                <a:solidFill>
+                  <a:srgbClr val="C00000"/>
+                </a:solidFill>
+              </a:rPr>
+              <a:t>Refresh when browsing, or</a:t>
+            </a:r>
+          </a:p>
+          <a:p>
+            <a:r>
+              <a:rPr lang="en-US" altLang="zh-CN" sz="1000" dirty="0">
+                <a:solidFill>
+                  <a:srgbClr val="C00000"/>
+                </a:solidFill>
+              </a:rPr>
+              <a:t>Stop when loading, or</a:t>
+            </a:r>
+          </a:p>
+          <a:p>
+            <a:r>
+              <a:rPr lang="en-US" altLang="zh-CN" sz="1000" dirty="0">
+                <a:solidFill>
+                  <a:srgbClr val="C00000"/>
+                </a:solidFill>
+              </a:rPr>
+              <a:t>Open when inputting URL</a:t>
+            </a:r>
+            <a:endParaRPr lang="zh-CN" altLang="en-US" sz="1000" dirty="0">
+              <a:solidFill>
+                <a:srgbClr val="C00000"/>
+              </a:solidFill>
+            </a:endParaRPr>
+          </a:p>
+        </p:txBody>
+      </p:sp>
+      <p:sp>
+        <p:nvSpPr>
+          <p:cNvPr id="39" name="文本框 38">
+            <a:extLst>
+              <a:ext uri="{FF2B5EF4-FFF2-40B4-BE49-F238E27FC236}">
+                <a16:creationId xmlns:a16="http://schemas.microsoft.com/office/drawing/2014/main" id="{ECB87BF8-6EFF-80D5-3D5F-30988FB6F810}"/>
+              </a:ext>
+            </a:extLst>
+          </p:cNvPr>
+          <p:cNvSpPr txBox="1"/>
+          <p:nvPr/>
+        </p:nvSpPr>
+        <p:spPr>
+          <a:xfrm>
+            <a:off x="1741778" y="6345184"/>
+            <a:ext cx="1066800" cy="276999"/>
+          </a:xfrm>
+          <a:prstGeom prst="rect">
+            <a:avLst/>
+          </a:prstGeom>
+          <a:noFill/>
+        </p:spPr>
+        <p:txBody>
+          <a:bodyPr wrap="square" rtlCol="0">
+            <a:spAutoFit/>
+          </a:bodyPr>
+          <a:lstStyle/>
+          <a:p>
+            <a:pPr algn="ctr"/>
+            <a:r>
+              <a:rPr lang="en-US" altLang="zh-CN" sz="1200" b="1" dirty="0"/>
+              <a:t>1.Main UI</a:t>
+            </a:r>
+            <a:endParaRPr lang="zh-CN" altLang="en-US" sz="1200" b="1" dirty="0"/>
+          </a:p>
+        </p:txBody>
+      </p:sp>
+      <p:sp>
+        <p:nvSpPr>
+          <p:cNvPr id="41" name="文本框 40">
+            <a:extLst>
+              <a:ext uri="{FF2B5EF4-FFF2-40B4-BE49-F238E27FC236}">
+                <a16:creationId xmlns:a16="http://schemas.microsoft.com/office/drawing/2014/main" id="{338CD1C2-C9D6-79E8-FF1D-2407797D379A}"/>
+              </a:ext>
+            </a:extLst>
+          </p:cNvPr>
+          <p:cNvSpPr txBox="1"/>
+          <p:nvPr/>
+        </p:nvSpPr>
+        <p:spPr>
+          <a:xfrm>
+            <a:off x="5079236" y="6339771"/>
+            <a:ext cx="1814546" cy="276999"/>
+          </a:xfrm>
+          <a:prstGeom prst="rect">
+            <a:avLst/>
+          </a:prstGeom>
+          <a:noFill/>
+        </p:spPr>
+        <p:txBody>
+          <a:bodyPr wrap="square" rtlCol="0">
+            <a:spAutoFit/>
+          </a:bodyPr>
+          <a:lstStyle/>
+          <a:p>
+            <a:pPr algn="ctr"/>
+            <a:r>
+              <a:rPr lang="en-US" altLang="zh-CN" sz="1200" b="1" dirty="0"/>
+              <a:t>2.Main UI Description</a:t>
+            </a:r>
+            <a:endParaRPr lang="zh-CN" altLang="en-US" sz="1200" b="1" dirty="0"/>
+          </a:p>
+        </p:txBody>
+      </p:sp>
+      <p:pic>
+        <p:nvPicPr>
+          <p:cNvPr id="4" name="图片 3">
+            <a:extLst>
+              <a:ext uri="{FF2B5EF4-FFF2-40B4-BE49-F238E27FC236}">
+                <a16:creationId xmlns:a16="http://schemas.microsoft.com/office/drawing/2014/main" id="{F6DF5B51-23EF-9ED5-B073-C33C2DA3FA2F}"/>
+              </a:ext>
+            </a:extLst>
+          </p:cNvPr>
+          <p:cNvPicPr>
+            <a:picLocks noChangeAspect="1"/>
+          </p:cNvPicPr>
+          <p:nvPr/>
+        </p:nvPicPr>
+        <p:blipFill>
+          <a:blip r:embed="rId4">
+            <a:extLst>
+              <a:ext uri="{28A0092B-C50C-407E-A947-70E740481C1C}">
+                <a14:useLocalDpi xmlns:a14="http://schemas.microsoft.com/office/drawing/2010/main" val="0"/>
+              </a:ext>
+            </a:extLst>
+          </a:blip>
+          <a:stretch>
+            <a:fillRect/>
+          </a:stretch>
+        </p:blipFill>
+        <p:spPr>
+          <a:xfrm>
+            <a:off x="875637" y="322284"/>
+            <a:ext cx="2787005" cy="6038510"/>
+          </a:xfrm>
+          <a:prstGeom prst="rect">
+            <a:avLst/>
+          </a:prstGeom>
+          <a:ln>
+            <a:solidFill>
+              <a:schemeClr val="tx1"/>
+            </a:solidFill>
+          </a:ln>
+        </p:spPr>
+      </p:pic>
+      <p:sp>
+        <p:nvSpPr>
+          <p:cNvPr id="8" name="文本框 7">
+            <a:extLst>
+              <a:ext uri="{FF2B5EF4-FFF2-40B4-BE49-F238E27FC236}">
+                <a16:creationId xmlns:a16="http://schemas.microsoft.com/office/drawing/2014/main" id="{83D53958-C8F2-FBF2-B6F2-EAEFF3B98BDF}"/>
+              </a:ext>
+            </a:extLst>
+          </p:cNvPr>
+          <p:cNvSpPr txBox="1"/>
+          <p:nvPr/>
+        </p:nvSpPr>
+        <p:spPr>
+          <a:xfrm>
+            <a:off x="8803732" y="6339771"/>
+            <a:ext cx="1652234" cy="276999"/>
+          </a:xfrm>
+          <a:prstGeom prst="rect">
+            <a:avLst/>
+          </a:prstGeom>
+          <a:noFill/>
+        </p:spPr>
+        <p:txBody>
+          <a:bodyPr wrap="square" rtlCol="0">
+            <a:spAutoFit/>
+          </a:bodyPr>
+          <a:lstStyle/>
+          <a:p>
+            <a:pPr algn="ctr"/>
+            <a:r>
+              <a:rPr lang="en-US" altLang="zh-CN" sz="1200" b="1" dirty="0"/>
+              <a:t>3.Floating Button</a:t>
+            </a:r>
+            <a:endParaRPr lang="zh-CN" altLang="en-US" sz="1200" b="1" dirty="0"/>
+          </a:p>
+        </p:txBody>
+      </p:sp>
+      <p:cxnSp>
+        <p:nvCxnSpPr>
+          <p:cNvPr id="23" name="直接箭头连接符 22">
+            <a:extLst>
+              <a:ext uri="{FF2B5EF4-FFF2-40B4-BE49-F238E27FC236}">
+                <a16:creationId xmlns:a16="http://schemas.microsoft.com/office/drawing/2014/main" id="{A8142A7D-75CF-5085-7A26-64E4E180C5EA}"/>
+              </a:ext>
+            </a:extLst>
+          </p:cNvPr>
+          <p:cNvCxnSpPr>
+            <a:cxnSpLocks/>
+          </p:cNvCxnSpPr>
+          <p:nvPr/>
+        </p:nvCxnSpPr>
+        <p:spPr>
+          <a:xfrm flipH="1">
+            <a:off x="9612672" y="4718750"/>
+            <a:ext cx="309310" cy="0"/>
+          </a:xfrm>
+          <a:prstGeom prst="straightConnector1">
+            <a:avLst/>
+          </a:prstGeom>
+          <a:ln w="28575">
+            <a:solidFill>
+              <a:srgbClr val="C00000"/>
+            </a:solidFill>
+            <a:prstDash val="solid"/>
+            <a:tailEnd type="triangle"/>
+          </a:ln>
+        </p:spPr>
+        <p:style>
+          <a:lnRef idx="1">
+            <a:schemeClr val="accent1"/>
+          </a:lnRef>
+          <a:fillRef idx="0">
+            <a:schemeClr val="accent1"/>
+          </a:fillRef>
+          <a:effectRef idx="0">
+            <a:schemeClr val="accent1"/>
+          </a:effectRef>
+          <a:fontRef idx="minor">
+            <a:schemeClr val="tx1"/>
+          </a:fontRef>
+        </p:style>
+      </p:cxnSp>
+      <p:sp>
+        <p:nvSpPr>
+          <p:cNvPr id="24" name="标注: 弯曲线形 23">
+            <a:extLst>
+              <a:ext uri="{FF2B5EF4-FFF2-40B4-BE49-F238E27FC236}">
+                <a16:creationId xmlns:a16="http://schemas.microsoft.com/office/drawing/2014/main" id="{8FC3E542-1D88-E46A-043C-DB00DC23BD23}"/>
+              </a:ext>
+            </a:extLst>
+          </p:cNvPr>
+          <p:cNvSpPr/>
+          <p:nvPr/>
+        </p:nvSpPr>
+        <p:spPr>
+          <a:xfrm>
+            <a:off x="8360077" y="3609892"/>
+            <a:ext cx="1407250" cy="563124"/>
+          </a:xfrm>
+          <a:prstGeom prst="borderCallout2">
+            <a:avLst>
+              <a:gd name="adj1" fmla="val 98737"/>
+              <a:gd name="adj2" fmla="val 32128"/>
+              <a:gd name="adj3" fmla="val 144032"/>
+              <a:gd name="adj4" fmla="val 42989"/>
+              <a:gd name="adj5" fmla="val 192360"/>
+              <a:gd name="adj6" fmla="val 83288"/>
+            </a:avLst>
+          </a:prstGeom>
+          <a:solidFill>
+            <a:schemeClr val="bg1"/>
+          </a:solidFill>
+          <a:ln w="12700">
+            <a:solidFill>
+              <a:srgbClr val="C00000"/>
+            </a:solidFill>
+          </a:ln>
+        </p:spPr>
+        <p:style>
+          <a:lnRef idx="2">
+            <a:schemeClr val="accent1">
+              <a:shade val="50000"/>
+            </a:schemeClr>
+          </a:lnRef>
+          <a:fillRef idx="1">
+            <a:schemeClr val="accent1"/>
+          </a:fillRef>
+          <a:effectRef idx="0">
+            <a:schemeClr val="accent1"/>
+          </a:effectRef>
+          <a:fontRef idx="minor">
+            <a:schemeClr val="lt1"/>
+          </a:fontRef>
+        </p:style>
+        <p:txBody>
+          <a:bodyPr lIns="72000" tIns="72000" rIns="72000" bIns="72000" rtlCol="0" anchor="ctr" anchorCtr="0"/>
+          <a:lstStyle/>
+          <a:p>
+            <a:r>
+              <a:rPr lang="en-US" altLang="zh-CN" sz="1000" dirty="0">
+                <a:solidFill>
+                  <a:srgbClr val="C00000"/>
+                </a:solidFill>
+              </a:rPr>
+              <a:t>Touch &amp; swipe out of the button boundary, trigger page swipe.</a:t>
+            </a:r>
+          </a:p>
+        </p:txBody>
+      </p:sp>
+      <p:sp>
+        <p:nvSpPr>
+          <p:cNvPr id="25" name="标注: 弯曲线形 24">
+            <a:extLst>
+              <a:ext uri="{FF2B5EF4-FFF2-40B4-BE49-F238E27FC236}">
+                <a16:creationId xmlns:a16="http://schemas.microsoft.com/office/drawing/2014/main" id="{1BD3268C-F57D-2E20-3B71-E34DB8780A1B}"/>
+              </a:ext>
+            </a:extLst>
+          </p:cNvPr>
+          <p:cNvSpPr/>
+          <p:nvPr/>
+        </p:nvSpPr>
+        <p:spPr>
+          <a:xfrm>
+            <a:off x="9380611" y="2234330"/>
+            <a:ext cx="1544897" cy="883256"/>
+          </a:xfrm>
+          <a:prstGeom prst="borderCallout2">
+            <a:avLst>
+              <a:gd name="adj1" fmla="val 100357"/>
+              <a:gd name="adj2" fmla="val 67622"/>
+              <a:gd name="adj3" fmla="val 159065"/>
+              <a:gd name="adj4" fmla="val 65380"/>
+              <a:gd name="adj5" fmla="val 249486"/>
+              <a:gd name="adj6" fmla="val 46894"/>
+            </a:avLst>
+          </a:prstGeom>
+          <a:solidFill>
+            <a:schemeClr val="bg1"/>
+          </a:solidFill>
+          <a:ln w="12700">
+            <a:solidFill>
+              <a:srgbClr val="C00000"/>
+            </a:solidFill>
+          </a:ln>
+        </p:spPr>
+        <p:style>
+          <a:lnRef idx="2">
+            <a:schemeClr val="accent1">
+              <a:shade val="50000"/>
+            </a:schemeClr>
+          </a:lnRef>
+          <a:fillRef idx="1">
+            <a:schemeClr val="accent1"/>
+          </a:fillRef>
+          <a:effectRef idx="0">
+            <a:schemeClr val="accent1"/>
+          </a:effectRef>
+          <a:fontRef idx="minor">
+            <a:schemeClr val="lt1"/>
+          </a:fontRef>
+        </p:style>
+        <p:txBody>
+          <a:bodyPr lIns="72000" tIns="72000" rIns="72000" bIns="72000" rtlCol="0" anchor="ctr" anchorCtr="0"/>
+          <a:lstStyle/>
+          <a:p>
+            <a:r>
+              <a:rPr lang="en-US" altLang="zh-CN" sz="1000" b="1" dirty="0">
+                <a:solidFill>
+                  <a:srgbClr val="C00000"/>
+                </a:solidFill>
+              </a:rPr>
+              <a:t>Floating button:</a:t>
+            </a:r>
+          </a:p>
+          <a:p>
+            <a:r>
+              <a:rPr lang="en-US" altLang="zh-CN" sz="1000" dirty="0">
+                <a:solidFill>
+                  <a:srgbClr val="C00000"/>
+                </a:solidFill>
+              </a:rPr>
+              <a:t>Click: scroll up</a:t>
+            </a:r>
+          </a:p>
+          <a:p>
+            <a:r>
+              <a:rPr lang="en-US" altLang="zh-CN" sz="1000" dirty="0">
+                <a:solidFill>
+                  <a:srgbClr val="C00000"/>
+                </a:solidFill>
+              </a:rPr>
+              <a:t>Double-click: auto-scroll</a:t>
+            </a:r>
+          </a:p>
+          <a:p>
+            <a:r>
+              <a:rPr lang="en-US" altLang="zh-CN" sz="1000" dirty="0">
+                <a:solidFill>
+                  <a:srgbClr val="C00000"/>
+                </a:solidFill>
+              </a:rPr>
+              <a:t>Long-click: drag &amp; move</a:t>
+            </a:r>
+          </a:p>
+          <a:p>
+            <a:r>
+              <a:rPr lang="en-US" altLang="zh-CN" sz="1000" dirty="0">
+                <a:solidFill>
+                  <a:srgbClr val="C00000"/>
+                </a:solidFill>
+              </a:rPr>
+              <a:t>Swipe-out: swipe page</a:t>
+            </a:r>
+            <a:endParaRPr lang="zh-CN" altLang="en-US" sz="1000" dirty="0">
+              <a:solidFill>
+                <a:srgbClr val="C00000"/>
+              </a:solidFill>
+            </a:endParaRPr>
+          </a:p>
+        </p:txBody>
+      </p:sp>
+      <p:pic>
+        <p:nvPicPr>
+          <p:cNvPr id="22" name="图片 21">
+            <a:extLst>
+              <a:ext uri="{FF2B5EF4-FFF2-40B4-BE49-F238E27FC236}">
+                <a16:creationId xmlns:a16="http://schemas.microsoft.com/office/drawing/2014/main" id="{32B9A7C5-AF72-21FA-916E-2774E3141640}"/>
+              </a:ext>
+            </a:extLst>
+          </p:cNvPr>
+          <p:cNvPicPr>
+            <a:picLocks noChangeAspect="1"/>
+          </p:cNvPicPr>
+          <p:nvPr/>
+        </p:nvPicPr>
+        <p:blipFill>
+          <a:blip r:embed="rId5">
+            <a:extLst>
+              <a:ext uri="{28A0092B-C50C-407E-A947-70E740481C1C}">
+                <a14:useLocalDpi xmlns:a14="http://schemas.microsoft.com/office/drawing/2010/main" val="0"/>
+              </a:ext>
+            </a:extLst>
+          </a:blip>
+          <a:stretch>
+            <a:fillRect/>
+          </a:stretch>
+        </p:blipFill>
+        <p:spPr>
+          <a:xfrm>
+            <a:off x="9898447" y="4641262"/>
+            <a:ext cx="336647" cy="336647"/>
+          </a:xfrm>
+          <a:prstGeom prst="rect">
+            <a:avLst/>
+          </a:prstGeom>
+          <a:noFill/>
+          <a:ln>
+            <a:noFill/>
+          </a:ln>
+        </p:spPr>
+      </p:pic>
+    </p:spTree>
+    <p:extLst>
+      <p:ext uri="{BB962C8B-B14F-4D97-AF65-F5344CB8AC3E}">
+        <p14:creationId xmlns:p14="http://schemas.microsoft.com/office/powerpoint/2010/main" val="7805284"/>
+      </p:ext>
+    </p:extLst>
+  </p:cSld>
+  <p:clrMapOvr>
+    <a:masterClrMapping/>
+  </p:clrMapOvr>
+</p:sld>
+</file>
+
+<file path=ppt/slides/slide4.xml><?xml version="1.0" encoding="utf-8"?>
+<p:sld xmlns:a="http://schemas.openxmlformats.org/drawingml/2006/main" xmlns:r="http://schemas.openxmlformats.org/officeDocument/2006/relationships" xmlns:p="http://schemas.openxmlformats.org/presentationml/2006/main">
+  <p:cSld>
+    <p:spTree>
+      <p:nvGrpSpPr>
+        <p:cNvPr id="1" name=""/>
+        <p:cNvGrpSpPr/>
+        <p:nvPr/>
+      </p:nvGrpSpPr>
+      <p:grpSpPr>
+        <a:xfrm>
+          <a:off x="0" y="0"/>
+          <a:ext cx="0" cy="0"/>
+          <a:chOff x="0" y="0"/>
+          <a:chExt cx="0" cy="0"/>
+        </a:xfrm>
+      </p:grpSpPr>
+      <p:sp>
+        <p:nvSpPr>
+          <p:cNvPr id="39" name="文本框 38">
+            <a:extLst>
+              <a:ext uri="{FF2B5EF4-FFF2-40B4-BE49-F238E27FC236}">
+                <a16:creationId xmlns:a16="http://schemas.microsoft.com/office/drawing/2014/main" id="{ECB87BF8-6EFF-80D5-3D5F-30988FB6F810}"/>
+              </a:ext>
+            </a:extLst>
+          </p:cNvPr>
+          <p:cNvSpPr txBox="1"/>
+          <p:nvPr/>
+        </p:nvSpPr>
+        <p:spPr>
+          <a:xfrm>
+            <a:off x="1109201" y="6351365"/>
+            <a:ext cx="2246244" cy="276999"/>
+          </a:xfrm>
+          <a:prstGeom prst="rect">
+            <a:avLst/>
+          </a:prstGeom>
+          <a:noFill/>
+        </p:spPr>
+        <p:txBody>
+          <a:bodyPr wrap="square" rtlCol="0">
+            <a:spAutoFit/>
+          </a:bodyPr>
+          <a:lstStyle/>
+          <a:p>
+            <a:pPr algn="ctr"/>
+            <a:r>
+              <a:rPr lang="en-US" altLang="zh-CN" sz="1200" b="1" dirty="0"/>
+              <a:t>4.Show hidden bookmarks</a:t>
+            </a:r>
+            <a:endParaRPr lang="zh-CN" altLang="en-US" sz="1200" b="1" dirty="0"/>
+          </a:p>
+        </p:txBody>
+      </p:sp>
+      <p:sp>
+        <p:nvSpPr>
+          <p:cNvPr id="41" name="文本框 40">
+            <a:extLst>
+              <a:ext uri="{FF2B5EF4-FFF2-40B4-BE49-F238E27FC236}">
+                <a16:creationId xmlns:a16="http://schemas.microsoft.com/office/drawing/2014/main" id="{338CD1C2-C9D6-79E8-FF1D-2407797D379A}"/>
+              </a:ext>
+            </a:extLst>
+          </p:cNvPr>
+          <p:cNvSpPr txBox="1"/>
+          <p:nvPr/>
+        </p:nvSpPr>
+        <p:spPr>
+          <a:xfrm>
+            <a:off x="5459739" y="6356113"/>
+            <a:ext cx="1794059" cy="276999"/>
+          </a:xfrm>
+          <a:prstGeom prst="rect">
+            <a:avLst/>
+          </a:prstGeom>
+          <a:noFill/>
+        </p:spPr>
+        <p:txBody>
+          <a:bodyPr wrap="square" rtlCol="0">
+            <a:spAutoFit/>
+          </a:bodyPr>
+          <a:lstStyle/>
+          <a:p>
+            <a:pPr algn="ctr"/>
+            <a:r>
+              <a:rPr lang="en-US" altLang="zh-CN" sz="1200" b="1" dirty="0"/>
+              <a:t>5.Javascript</a:t>
+            </a:r>
+            <a:r>
+              <a:rPr lang="zh-CN" altLang="en-US" sz="1200" b="1" dirty="0"/>
+              <a:t> </a:t>
+            </a:r>
+            <a:r>
+              <a:rPr lang="en-US" altLang="zh-CN" sz="1200" b="1" dirty="0"/>
+              <a:t>setup</a:t>
+            </a:r>
+            <a:endParaRPr lang="zh-CN" altLang="en-US" sz="1200" b="1" dirty="0"/>
+          </a:p>
+        </p:txBody>
+      </p:sp>
+      <p:pic>
+        <p:nvPicPr>
+          <p:cNvPr id="6" name="图片 5">
+            <a:extLst>
+              <a:ext uri="{FF2B5EF4-FFF2-40B4-BE49-F238E27FC236}">
+                <a16:creationId xmlns:a16="http://schemas.microsoft.com/office/drawing/2014/main" id="{C955AC19-06C3-A4AB-6E8C-8C47734938EC}"/>
+              </a:ext>
+            </a:extLst>
+          </p:cNvPr>
+          <p:cNvPicPr>
+            <a:picLocks noChangeAspect="1"/>
+          </p:cNvPicPr>
+          <p:nvPr/>
+        </p:nvPicPr>
+        <p:blipFill>
+          <a:blip r:embed="rId2">
+            <a:extLst>
+              <a:ext uri="{28A0092B-C50C-407E-A947-70E740481C1C}">
+                <a14:useLocalDpi xmlns:a14="http://schemas.microsoft.com/office/drawing/2010/main" val="0"/>
+              </a:ext>
+            </a:extLst>
+          </a:blip>
+          <a:stretch>
+            <a:fillRect/>
+          </a:stretch>
+        </p:blipFill>
+        <p:spPr>
+          <a:xfrm>
+            <a:off x="4841630" y="310449"/>
+            <a:ext cx="2786849" cy="6038172"/>
+          </a:xfrm>
+          <a:prstGeom prst="rect">
+            <a:avLst/>
+          </a:prstGeom>
+          <a:ln>
+            <a:solidFill>
+              <a:schemeClr val="tx1"/>
+            </a:solidFill>
+          </a:ln>
+        </p:spPr>
+      </p:pic>
+      <p:pic>
+        <p:nvPicPr>
+          <p:cNvPr id="9" name="图片 8">
+            <a:extLst>
+              <a:ext uri="{FF2B5EF4-FFF2-40B4-BE49-F238E27FC236}">
+                <a16:creationId xmlns:a16="http://schemas.microsoft.com/office/drawing/2014/main" id="{528EB386-7C37-B805-E741-DE603ED823F6}"/>
+              </a:ext>
+            </a:extLst>
+          </p:cNvPr>
+          <p:cNvPicPr>
+            <a:picLocks noChangeAspect="1"/>
+          </p:cNvPicPr>
+          <p:nvPr/>
+        </p:nvPicPr>
+        <p:blipFill>
+          <a:blip r:embed="rId3">
+            <a:extLst>
+              <a:ext uri="{28A0092B-C50C-407E-A947-70E740481C1C}">
+                <a14:useLocalDpi xmlns:a14="http://schemas.microsoft.com/office/drawing/2010/main" val="0"/>
+              </a:ext>
+            </a:extLst>
+          </a:blip>
+          <a:stretch>
+            <a:fillRect/>
+          </a:stretch>
+        </p:blipFill>
+        <p:spPr>
+          <a:xfrm>
+            <a:off x="885503" y="310449"/>
+            <a:ext cx="2786849" cy="6038173"/>
+          </a:xfrm>
+          <a:prstGeom prst="rect">
+            <a:avLst/>
+          </a:prstGeom>
+          <a:ln>
+            <a:solidFill>
+              <a:schemeClr val="tx1"/>
+            </a:solidFill>
+          </a:ln>
+        </p:spPr>
+      </p:pic>
+      <p:sp>
+        <p:nvSpPr>
+          <p:cNvPr id="19" name="标注: 弯曲线形 18">
+            <a:extLst>
+              <a:ext uri="{FF2B5EF4-FFF2-40B4-BE49-F238E27FC236}">
+                <a16:creationId xmlns:a16="http://schemas.microsoft.com/office/drawing/2014/main" id="{510CE099-146A-8CD1-E0A1-90BDBA4F0484}"/>
+              </a:ext>
+            </a:extLst>
+          </p:cNvPr>
+          <p:cNvSpPr/>
+          <p:nvPr/>
+        </p:nvSpPr>
+        <p:spPr>
+          <a:xfrm>
+            <a:off x="2329510" y="3429000"/>
+            <a:ext cx="1291035" cy="632898"/>
+          </a:xfrm>
+          <a:prstGeom prst="borderCallout2">
+            <a:avLst>
+              <a:gd name="adj1" fmla="val 101561"/>
+              <a:gd name="adj2" fmla="val 93002"/>
+              <a:gd name="adj3" fmla="val 160291"/>
+              <a:gd name="adj4" fmla="val 91000"/>
+              <a:gd name="adj5" fmla="val 224887"/>
+              <a:gd name="adj6" fmla="val 78761"/>
+            </a:avLst>
+          </a:prstGeom>
+          <a:solidFill>
+            <a:schemeClr val="bg1"/>
+          </a:solidFill>
+          <a:ln w="12700">
+            <a:solidFill>
+              <a:srgbClr val="C00000"/>
+            </a:solidFill>
+          </a:ln>
+        </p:spPr>
+        <p:style>
+          <a:lnRef idx="2">
+            <a:schemeClr val="accent1">
+              <a:shade val="50000"/>
+            </a:schemeClr>
+          </a:lnRef>
+          <a:fillRef idx="1">
+            <a:schemeClr val="accent1"/>
+          </a:fillRef>
+          <a:effectRef idx="0">
+            <a:schemeClr val="accent1"/>
+          </a:effectRef>
+          <a:fontRef idx="minor">
+            <a:schemeClr val="lt1"/>
+          </a:fontRef>
+        </p:style>
+        <p:txBody>
+          <a:bodyPr lIns="72000" tIns="72000" rIns="72000" bIns="72000" rtlCol="0" anchor="ctr" anchorCtr="0"/>
+          <a:lstStyle/>
+          <a:p>
+            <a:r>
+              <a:rPr lang="en-US" altLang="zh-CN" sz="1000" dirty="0">
+                <a:solidFill>
+                  <a:srgbClr val="C00000"/>
+                </a:solidFill>
+              </a:rPr>
+              <a:t>When showing hidden bookmarks, click to toggle status</a:t>
+            </a:r>
+            <a:endParaRPr lang="zh-CN" altLang="en-US" sz="1000" dirty="0">
+              <a:solidFill>
+                <a:srgbClr val="C00000"/>
+              </a:solidFill>
+            </a:endParaRPr>
+          </a:p>
+        </p:txBody>
+      </p:sp>
+      <p:sp>
+        <p:nvSpPr>
+          <p:cNvPr id="20" name="标注: 弯曲线形 19">
+            <a:extLst>
+              <a:ext uri="{FF2B5EF4-FFF2-40B4-BE49-F238E27FC236}">
+                <a16:creationId xmlns:a16="http://schemas.microsoft.com/office/drawing/2014/main" id="{562781F9-AE1C-A3A0-AD50-4F0D2D2A9026}"/>
+              </a:ext>
+            </a:extLst>
+          </p:cNvPr>
+          <p:cNvSpPr/>
+          <p:nvPr/>
+        </p:nvSpPr>
+        <p:spPr>
+          <a:xfrm>
+            <a:off x="2093290" y="1592580"/>
+            <a:ext cx="1291035" cy="259080"/>
+          </a:xfrm>
+          <a:prstGeom prst="borderCallout2">
+            <a:avLst>
+              <a:gd name="adj1" fmla="val 104502"/>
+              <a:gd name="adj2" fmla="val 65261"/>
+              <a:gd name="adj3" fmla="val 222056"/>
+              <a:gd name="adj4" fmla="val 59718"/>
+              <a:gd name="adj5" fmla="val 383710"/>
+              <a:gd name="adj6" fmla="val 24066"/>
+            </a:avLst>
+          </a:prstGeom>
+          <a:solidFill>
+            <a:schemeClr val="bg1"/>
+          </a:solidFill>
+          <a:ln w="12700">
+            <a:solidFill>
+              <a:srgbClr val="C00000"/>
+            </a:solidFill>
+          </a:ln>
+        </p:spPr>
+        <p:style>
+          <a:lnRef idx="2">
+            <a:schemeClr val="accent1">
+              <a:shade val="50000"/>
+            </a:schemeClr>
+          </a:lnRef>
+          <a:fillRef idx="1">
+            <a:schemeClr val="accent1"/>
+          </a:fillRef>
+          <a:effectRef idx="0">
+            <a:schemeClr val="accent1"/>
+          </a:effectRef>
+          <a:fontRef idx="minor">
+            <a:schemeClr val="lt1"/>
+          </a:fontRef>
+        </p:style>
+        <p:txBody>
+          <a:bodyPr lIns="72000" tIns="72000" rIns="72000" bIns="72000" rtlCol="0" anchor="ctr" anchorCtr="0"/>
+          <a:lstStyle/>
+          <a:p>
+            <a:r>
+              <a:rPr lang="zh-CN" altLang="en-US" sz="1000" dirty="0">
+                <a:solidFill>
+                  <a:srgbClr val="C00000"/>
+                </a:solidFill>
+              </a:rPr>
+              <a:t>双击显示隐藏的书签</a:t>
+            </a:r>
+          </a:p>
+        </p:txBody>
+      </p:sp>
+      <p:sp>
+        <p:nvSpPr>
+          <p:cNvPr id="21" name="标注: 弯曲线形 20">
+            <a:extLst>
+              <a:ext uri="{FF2B5EF4-FFF2-40B4-BE49-F238E27FC236}">
+                <a16:creationId xmlns:a16="http://schemas.microsoft.com/office/drawing/2014/main" id="{92664D8E-9383-3103-E205-7E90DCB32F99}"/>
+              </a:ext>
+            </a:extLst>
+          </p:cNvPr>
+          <p:cNvSpPr/>
+          <p:nvPr/>
+        </p:nvSpPr>
+        <p:spPr>
+          <a:xfrm>
+            <a:off x="1925320" y="1478943"/>
+            <a:ext cx="1625600" cy="365097"/>
+          </a:xfrm>
+          <a:prstGeom prst="borderCallout2">
+            <a:avLst>
+              <a:gd name="adj1" fmla="val 100090"/>
+              <a:gd name="adj2" fmla="val 37520"/>
+              <a:gd name="adj3" fmla="val 164703"/>
+              <a:gd name="adj4" fmla="val 18698"/>
+              <a:gd name="adj5" fmla="val 188744"/>
+              <a:gd name="adj6" fmla="val -7380"/>
+            </a:avLst>
+          </a:prstGeom>
+          <a:solidFill>
+            <a:schemeClr val="bg1"/>
+          </a:solidFill>
+          <a:ln w="12700">
+            <a:solidFill>
+              <a:srgbClr val="C00000"/>
+            </a:solidFill>
+          </a:ln>
+        </p:spPr>
+        <p:style>
+          <a:lnRef idx="2">
+            <a:schemeClr val="accent1">
+              <a:shade val="50000"/>
+            </a:schemeClr>
+          </a:lnRef>
+          <a:fillRef idx="1">
+            <a:schemeClr val="accent1"/>
+          </a:fillRef>
+          <a:effectRef idx="0">
+            <a:schemeClr val="accent1"/>
+          </a:effectRef>
+          <a:fontRef idx="minor">
+            <a:schemeClr val="lt1"/>
+          </a:fontRef>
+        </p:style>
+        <p:txBody>
+          <a:bodyPr lIns="72000" tIns="72000" rIns="72000" bIns="72000" rtlCol="0" anchor="ctr" anchorCtr="0"/>
+          <a:lstStyle/>
+          <a:p>
+            <a:r>
+              <a:rPr lang="en-US" altLang="zh-CN" sz="1000" dirty="0">
+                <a:solidFill>
+                  <a:srgbClr val="C00000"/>
+                </a:solidFill>
+              </a:rPr>
+              <a:t>Double-click the title to show hidden bookmarks</a:t>
+            </a:r>
+            <a:endParaRPr lang="zh-CN" altLang="en-US" sz="1000" dirty="0">
+              <a:solidFill>
+                <a:srgbClr val="C00000"/>
+              </a:solidFill>
+            </a:endParaRPr>
+          </a:p>
+        </p:txBody>
+      </p:sp>
+    </p:spTree>
+    <p:extLst>
+      <p:ext uri="{BB962C8B-B14F-4D97-AF65-F5344CB8AC3E}">
+        <p14:creationId xmlns:p14="http://schemas.microsoft.com/office/powerpoint/2010/main" val="1279963789"/>
+      </p:ext>
+    </p:extLst>
+  </p:cSld>
+  <p:clrMapOvr>
+    <a:masterClrMapping/>
+  </p:clrMapOvr>
+</p:sld>
+</file>
+
 <file path=ppt/theme/theme1.xml><?xml version="1.0" encoding="utf-8"?>
 <a:theme xmlns:a="http://schemas.openxmlformats.org/drawingml/2006/main" name="Office 主题​​">
   <a:themeElements>

</xml_diff>